<commit_message>
Just the conclusion to go!
</commit_message>
<xml_diff>
--- a/OS-sim figures/tissue-illumination.pptx
+++ b/OS-sim figures/tissue-illumination.pptx
@@ -2,18 +2,18 @@
 <file path=ppt/presentation.xml><?xml version="1.0" encoding="utf-8"?>
 <p:presentation xmlns:a="http://schemas.openxmlformats.org/drawingml/2006/main" xmlns:r="http://schemas.openxmlformats.org/officeDocument/2006/relationships" xmlns:p="http://schemas.openxmlformats.org/presentationml/2006/main" saveSubsetFonts="1">
   <p:sldMasterIdLst>
-    <p:sldMasterId id="2147483648" r:id="rId1"/>
+    <p:sldMasterId id="2147483660" r:id="rId1"/>
   </p:sldMasterIdLst>
   <p:sldIdLst>
     <p:sldId id="256" r:id="rId2"/>
   </p:sldIdLst>
-  <p:sldSz cx="12192000" cy="6858000"/>
+  <p:sldSz cx="7512050" cy="5418138"/>
   <p:notesSz cx="6858000" cy="9144000"/>
   <p:defaultTextStyle>
     <a:defPPr>
       <a:defRPr lang="en-US"/>
     </a:defPPr>
-    <a:lvl1pPr marL="0" algn="l" defTabSz="914400" rtl="0" eaLnBrk="1" latinLnBrk="0" hangingPunct="1">
+    <a:lvl1pPr marL="0" algn="l" defTabSz="457200" rtl="0" eaLnBrk="1" latinLnBrk="0" hangingPunct="1">
       <a:defRPr sz="1800" kern="1200">
         <a:solidFill>
           <a:schemeClr val="tx1"/>
@@ -23,7 +23,7 @@
         <a:cs typeface="+mn-cs"/>
       </a:defRPr>
     </a:lvl1pPr>
-    <a:lvl2pPr marL="457200" algn="l" defTabSz="914400" rtl="0" eaLnBrk="1" latinLnBrk="0" hangingPunct="1">
+    <a:lvl2pPr marL="457200" algn="l" defTabSz="457200" rtl="0" eaLnBrk="1" latinLnBrk="0" hangingPunct="1">
       <a:defRPr sz="1800" kern="1200">
         <a:solidFill>
           <a:schemeClr val="tx1"/>
@@ -33,7 +33,7 @@
         <a:cs typeface="+mn-cs"/>
       </a:defRPr>
     </a:lvl2pPr>
-    <a:lvl3pPr marL="914400" algn="l" defTabSz="914400" rtl="0" eaLnBrk="1" latinLnBrk="0" hangingPunct="1">
+    <a:lvl3pPr marL="914400" algn="l" defTabSz="457200" rtl="0" eaLnBrk="1" latinLnBrk="0" hangingPunct="1">
       <a:defRPr sz="1800" kern="1200">
         <a:solidFill>
           <a:schemeClr val="tx1"/>
@@ -43,7 +43,7 @@
         <a:cs typeface="+mn-cs"/>
       </a:defRPr>
     </a:lvl3pPr>
-    <a:lvl4pPr marL="1371600" algn="l" defTabSz="914400" rtl="0" eaLnBrk="1" latinLnBrk="0" hangingPunct="1">
+    <a:lvl4pPr marL="1371600" algn="l" defTabSz="457200" rtl="0" eaLnBrk="1" latinLnBrk="0" hangingPunct="1">
       <a:defRPr sz="1800" kern="1200">
         <a:solidFill>
           <a:schemeClr val="tx1"/>
@@ -53,7 +53,7 @@
         <a:cs typeface="+mn-cs"/>
       </a:defRPr>
     </a:lvl4pPr>
-    <a:lvl5pPr marL="1828800" algn="l" defTabSz="914400" rtl="0" eaLnBrk="1" latinLnBrk="0" hangingPunct="1">
+    <a:lvl5pPr marL="1828800" algn="l" defTabSz="457200" rtl="0" eaLnBrk="1" latinLnBrk="0" hangingPunct="1">
       <a:defRPr sz="1800" kern="1200">
         <a:solidFill>
           <a:schemeClr val="tx1"/>
@@ -63,7 +63,7 @@
         <a:cs typeface="+mn-cs"/>
       </a:defRPr>
     </a:lvl5pPr>
-    <a:lvl6pPr marL="2286000" algn="l" defTabSz="914400" rtl="0" eaLnBrk="1" latinLnBrk="0" hangingPunct="1">
+    <a:lvl6pPr marL="2286000" algn="l" defTabSz="457200" rtl="0" eaLnBrk="1" latinLnBrk="0" hangingPunct="1">
       <a:defRPr sz="1800" kern="1200">
         <a:solidFill>
           <a:schemeClr val="tx1"/>
@@ -73,7 +73,7 @@
         <a:cs typeface="+mn-cs"/>
       </a:defRPr>
     </a:lvl6pPr>
-    <a:lvl7pPr marL="2743200" algn="l" defTabSz="914400" rtl="0" eaLnBrk="1" latinLnBrk="0" hangingPunct="1">
+    <a:lvl7pPr marL="2743200" algn="l" defTabSz="457200" rtl="0" eaLnBrk="1" latinLnBrk="0" hangingPunct="1">
       <a:defRPr sz="1800" kern="1200">
         <a:solidFill>
           <a:schemeClr val="tx1"/>
@@ -83,7 +83,7 @@
         <a:cs typeface="+mn-cs"/>
       </a:defRPr>
     </a:lvl7pPr>
-    <a:lvl8pPr marL="3200400" algn="l" defTabSz="914400" rtl="0" eaLnBrk="1" latinLnBrk="0" hangingPunct="1">
+    <a:lvl8pPr marL="3200400" algn="l" defTabSz="457200" rtl="0" eaLnBrk="1" latinLnBrk="0" hangingPunct="1">
       <a:defRPr sz="1800" kern="1200">
         <a:solidFill>
           <a:schemeClr val="tx1"/>
@@ -93,7 +93,7 @@
         <a:cs typeface="+mn-cs"/>
       </a:defRPr>
     </a:lvl8pPr>
-    <a:lvl9pPr marL="3657600" algn="l" defTabSz="914400" rtl="0" eaLnBrk="1" latinLnBrk="0" hangingPunct="1">
+    <a:lvl9pPr marL="3657600" algn="l" defTabSz="457200" rtl="0" eaLnBrk="1" latinLnBrk="0" hangingPunct="1">
       <a:defRPr sz="1800" kern="1200">
         <a:solidFill>
           <a:schemeClr val="tx1"/>
@@ -131,13 +131,7 @@
       </p:grpSpPr>
       <p:sp>
         <p:nvSpPr>
-          <p:cNvPr id="2" name="Title 1">
-            <a:extLst>
-              <a:ext uri="{FF2B5EF4-FFF2-40B4-BE49-F238E27FC236}">
-                <a16:creationId xmlns:a16="http://schemas.microsoft.com/office/drawing/2014/main" id="{4D8BD8B1-CD92-47E5-9ADE-B1C71786AFE1}"/>
-              </a:ext>
-            </a:extLst>
-          </p:cNvPr>
+          <p:cNvPr id="2" name="Title 1"/>
           <p:cNvSpPr>
             <a:spLocks noGrp="1"/>
           </p:cNvSpPr>
@@ -147,15 +141,15 @@
         </p:nvSpPr>
         <p:spPr>
           <a:xfrm>
-            <a:off x="1524000" y="1122363"/>
-            <a:ext cx="9144000" cy="2387600"/>
+            <a:off x="563404" y="886719"/>
+            <a:ext cx="6385243" cy="1886315"/>
           </a:xfrm>
         </p:spPr>
         <p:txBody>
           <a:bodyPr anchor="b"/>
           <a:lstStyle>
             <a:lvl1pPr algn="ctr">
-              <a:defRPr sz="6000"/>
+              <a:defRPr sz="4740"/>
             </a:lvl1pPr>
           </a:lstStyle>
           <a:p>
@@ -163,19 +157,13 @@
               <a:rPr lang="en-US"/>
               <a:t>Click to edit Master title style</a:t>
             </a:r>
-            <a:endParaRPr lang="en-GB"/>
-          </a:p>
-        </p:txBody>
-      </p:sp>
-      <p:sp>
-        <p:nvSpPr>
-          <p:cNvPr id="3" name="Subtitle 2">
-            <a:extLst>
-              <a:ext uri="{FF2B5EF4-FFF2-40B4-BE49-F238E27FC236}">
-                <a16:creationId xmlns:a16="http://schemas.microsoft.com/office/drawing/2014/main" id="{87692A9A-AD26-4C89-8AE4-DFC4238F5FA9}"/>
-              </a:ext>
-            </a:extLst>
-          </p:cNvPr>
+            <a:endParaRPr lang="en-US" dirty="0"/>
+          </a:p>
+        </p:txBody>
+      </p:sp>
+      <p:sp>
+        <p:nvSpPr>
+          <p:cNvPr id="3" name="Subtitle 2"/>
           <p:cNvSpPr>
             <a:spLocks noGrp="1"/>
           </p:cNvSpPr>
@@ -185,8 +173,8 @@
         </p:nvSpPr>
         <p:spPr>
           <a:xfrm>
-            <a:off x="1524000" y="3602038"/>
-            <a:ext cx="9144000" cy="1655762"/>
+            <a:off x="939006" y="2845777"/>
+            <a:ext cx="5634038" cy="1308129"/>
           </a:xfrm>
         </p:spPr>
         <p:txBody>
@@ -194,39 +182,39 @@
           <a:lstStyle>
             <a:lvl1pPr marL="0" indent="0" algn="ctr">
               <a:buNone/>
-              <a:defRPr sz="2400"/>
+              <a:defRPr sz="1896"/>
             </a:lvl1pPr>
-            <a:lvl2pPr marL="457200" indent="0" algn="ctr">
-              <a:buNone/>
-              <a:defRPr sz="2000"/>
+            <a:lvl2pPr marL="361188" indent="0" algn="ctr">
+              <a:buNone/>
+              <a:defRPr sz="1580"/>
             </a:lvl2pPr>
-            <a:lvl3pPr marL="914400" indent="0" algn="ctr">
-              <a:buNone/>
-              <a:defRPr sz="1800"/>
+            <a:lvl3pPr marL="722376" indent="0" algn="ctr">
+              <a:buNone/>
+              <a:defRPr sz="1422"/>
             </a:lvl3pPr>
-            <a:lvl4pPr marL="1371600" indent="0" algn="ctr">
-              <a:buNone/>
-              <a:defRPr sz="1600"/>
+            <a:lvl4pPr marL="1083564" indent="0" algn="ctr">
+              <a:buNone/>
+              <a:defRPr sz="1264"/>
             </a:lvl4pPr>
-            <a:lvl5pPr marL="1828800" indent="0" algn="ctr">
-              <a:buNone/>
-              <a:defRPr sz="1600"/>
+            <a:lvl5pPr marL="1444752" indent="0" algn="ctr">
+              <a:buNone/>
+              <a:defRPr sz="1264"/>
             </a:lvl5pPr>
-            <a:lvl6pPr marL="2286000" indent="0" algn="ctr">
-              <a:buNone/>
-              <a:defRPr sz="1600"/>
+            <a:lvl6pPr marL="1805940" indent="0" algn="ctr">
+              <a:buNone/>
+              <a:defRPr sz="1264"/>
             </a:lvl6pPr>
-            <a:lvl7pPr marL="2743200" indent="0" algn="ctr">
-              <a:buNone/>
-              <a:defRPr sz="1600"/>
+            <a:lvl7pPr marL="2167128" indent="0" algn="ctr">
+              <a:buNone/>
+              <a:defRPr sz="1264"/>
             </a:lvl7pPr>
-            <a:lvl8pPr marL="3200400" indent="0" algn="ctr">
-              <a:buNone/>
-              <a:defRPr sz="1600"/>
+            <a:lvl8pPr marL="2528316" indent="0" algn="ctr">
+              <a:buNone/>
+              <a:defRPr sz="1264"/>
             </a:lvl8pPr>
-            <a:lvl9pPr marL="3657600" indent="0" algn="ctr">
-              <a:buNone/>
-              <a:defRPr sz="1600"/>
+            <a:lvl9pPr marL="2889504" indent="0" algn="ctr">
+              <a:buNone/>
+              <a:defRPr sz="1264"/>
             </a:lvl9pPr>
           </a:lstStyle>
           <a:p>
@@ -234,19 +222,13 @@
               <a:rPr lang="en-US"/>
               <a:t>Click to edit Master subtitle style</a:t>
             </a:r>
-            <a:endParaRPr lang="en-GB"/>
-          </a:p>
-        </p:txBody>
-      </p:sp>
-      <p:sp>
-        <p:nvSpPr>
-          <p:cNvPr id="4" name="Date Placeholder 3">
-            <a:extLst>
-              <a:ext uri="{FF2B5EF4-FFF2-40B4-BE49-F238E27FC236}">
-                <a16:creationId xmlns:a16="http://schemas.microsoft.com/office/drawing/2014/main" id="{5C8BC488-6562-4B5F-B12A-165E7D02CE1C}"/>
-              </a:ext>
-            </a:extLst>
-          </p:cNvPr>
+            <a:endParaRPr lang="en-US" dirty="0"/>
+          </a:p>
+        </p:txBody>
+      </p:sp>
+      <p:sp>
+        <p:nvSpPr>
+          <p:cNvPr id="4" name="Date Placeholder 3"/>
           <p:cNvSpPr>
             <a:spLocks noGrp="1"/>
           </p:cNvSpPr>
@@ -261,7 +243,7 @@
           <a:p>
             <a:fld id="{E535F51F-8871-4246-9489-4500232AE892}" type="datetimeFigureOut">
               <a:rPr lang="en-GB" smtClean="0"/>
-              <a:t>13/12/2018</a:t>
+              <a:t>14/12/2018</a:t>
             </a:fld>
             <a:endParaRPr lang="en-GB"/>
           </a:p>
@@ -269,13 +251,7 @@
       </p:sp>
       <p:sp>
         <p:nvSpPr>
-          <p:cNvPr id="5" name="Footer Placeholder 4">
-            <a:extLst>
-              <a:ext uri="{FF2B5EF4-FFF2-40B4-BE49-F238E27FC236}">
-                <a16:creationId xmlns:a16="http://schemas.microsoft.com/office/drawing/2014/main" id="{98BB06CB-E92E-4C7E-B8A5-26FC318E0E61}"/>
-              </a:ext>
-            </a:extLst>
-          </p:cNvPr>
+          <p:cNvPr id="5" name="Footer Placeholder 4"/>
           <p:cNvSpPr>
             <a:spLocks noGrp="1"/>
           </p:cNvSpPr>
@@ -294,13 +270,7 @@
       </p:sp>
       <p:sp>
         <p:nvSpPr>
-          <p:cNvPr id="6" name="Slide Number Placeholder 5">
-            <a:extLst>
-              <a:ext uri="{FF2B5EF4-FFF2-40B4-BE49-F238E27FC236}">
-                <a16:creationId xmlns:a16="http://schemas.microsoft.com/office/drawing/2014/main" id="{C1EB99C8-8D4F-436C-9080-B2C11130FE85}"/>
-              </a:ext>
-            </a:extLst>
-          </p:cNvPr>
+          <p:cNvPr id="6" name="Slide Number Placeholder 5"/>
           <p:cNvSpPr>
             <a:spLocks noGrp="1"/>
           </p:cNvSpPr>
@@ -324,7 +294,7 @@
     </p:spTree>
     <p:extLst>
       <p:ext uri="{BB962C8B-B14F-4D97-AF65-F5344CB8AC3E}">
-        <p14:creationId xmlns:p14="http://schemas.microsoft.com/office/powerpoint/2010/main" val="1631235254"/>
+        <p14:creationId xmlns:p14="http://schemas.microsoft.com/office/powerpoint/2010/main" val="2187997465"/>
       </p:ext>
     </p:extLst>
   </p:cSld>
@@ -353,13 +323,7 @@
       </p:grpSpPr>
       <p:sp>
         <p:nvSpPr>
-          <p:cNvPr id="2" name="Title 1">
-            <a:extLst>
-              <a:ext uri="{FF2B5EF4-FFF2-40B4-BE49-F238E27FC236}">
-                <a16:creationId xmlns:a16="http://schemas.microsoft.com/office/drawing/2014/main" id="{4C183C3B-1CAB-4E1C-AF5F-605E01D035F7}"/>
-              </a:ext>
-            </a:extLst>
-          </p:cNvPr>
+          <p:cNvPr id="2" name="Title 1"/>
           <p:cNvSpPr>
             <a:spLocks noGrp="1"/>
           </p:cNvSpPr>
@@ -376,19 +340,13 @@
               <a:rPr lang="en-US"/>
               <a:t>Click to edit Master title style</a:t>
             </a:r>
-            <a:endParaRPr lang="en-GB"/>
-          </a:p>
-        </p:txBody>
-      </p:sp>
-      <p:sp>
-        <p:nvSpPr>
-          <p:cNvPr id="3" name="Vertical Text Placeholder 2">
-            <a:extLst>
-              <a:ext uri="{FF2B5EF4-FFF2-40B4-BE49-F238E27FC236}">
-                <a16:creationId xmlns:a16="http://schemas.microsoft.com/office/drawing/2014/main" id="{081DB9C7-05B6-4C43-8BFF-6AAD218DF87D}"/>
-              </a:ext>
-            </a:extLst>
-          </p:cNvPr>
+            <a:endParaRPr lang="en-US" dirty="0"/>
+          </a:p>
+        </p:txBody>
+      </p:sp>
+      <p:sp>
+        <p:nvSpPr>
+          <p:cNvPr id="3" name="Vertical Text Placeholder 2"/>
           <p:cNvSpPr>
             <a:spLocks noGrp="1"/>
           </p:cNvSpPr>
@@ -434,19 +392,13 @@
               <a:rPr lang="en-US"/>
               <a:t>Fifth level</a:t>
             </a:r>
-            <a:endParaRPr lang="en-GB"/>
-          </a:p>
-        </p:txBody>
-      </p:sp>
-      <p:sp>
-        <p:nvSpPr>
-          <p:cNvPr id="4" name="Date Placeholder 3">
-            <a:extLst>
-              <a:ext uri="{FF2B5EF4-FFF2-40B4-BE49-F238E27FC236}">
-                <a16:creationId xmlns:a16="http://schemas.microsoft.com/office/drawing/2014/main" id="{0428FDFB-55B2-4518-98BC-E0F2B52994FC}"/>
-              </a:ext>
-            </a:extLst>
-          </p:cNvPr>
+            <a:endParaRPr lang="en-US" dirty="0"/>
+          </a:p>
+        </p:txBody>
+      </p:sp>
+      <p:sp>
+        <p:nvSpPr>
+          <p:cNvPr id="4" name="Date Placeholder 3"/>
           <p:cNvSpPr>
             <a:spLocks noGrp="1"/>
           </p:cNvSpPr>
@@ -461,7 +413,7 @@
           <a:p>
             <a:fld id="{E535F51F-8871-4246-9489-4500232AE892}" type="datetimeFigureOut">
               <a:rPr lang="en-GB" smtClean="0"/>
-              <a:t>13/12/2018</a:t>
+              <a:t>14/12/2018</a:t>
             </a:fld>
             <a:endParaRPr lang="en-GB"/>
           </a:p>
@@ -469,13 +421,7 @@
       </p:sp>
       <p:sp>
         <p:nvSpPr>
-          <p:cNvPr id="5" name="Footer Placeholder 4">
-            <a:extLst>
-              <a:ext uri="{FF2B5EF4-FFF2-40B4-BE49-F238E27FC236}">
-                <a16:creationId xmlns:a16="http://schemas.microsoft.com/office/drawing/2014/main" id="{7AF48842-AF7D-4BCE-94AB-4191D8377EAE}"/>
-              </a:ext>
-            </a:extLst>
-          </p:cNvPr>
+          <p:cNvPr id="5" name="Footer Placeholder 4"/>
           <p:cNvSpPr>
             <a:spLocks noGrp="1"/>
           </p:cNvSpPr>
@@ -494,13 +440,7 @@
       </p:sp>
       <p:sp>
         <p:nvSpPr>
-          <p:cNvPr id="6" name="Slide Number Placeholder 5">
-            <a:extLst>
-              <a:ext uri="{FF2B5EF4-FFF2-40B4-BE49-F238E27FC236}">
-                <a16:creationId xmlns:a16="http://schemas.microsoft.com/office/drawing/2014/main" id="{E8ECC0C0-1A06-40CD-8418-324C3F2F090F}"/>
-              </a:ext>
-            </a:extLst>
-          </p:cNvPr>
+          <p:cNvPr id="6" name="Slide Number Placeholder 5"/>
           <p:cNvSpPr>
             <a:spLocks noGrp="1"/>
           </p:cNvSpPr>
@@ -524,7 +464,7 @@
     </p:spTree>
     <p:extLst>
       <p:ext uri="{BB962C8B-B14F-4D97-AF65-F5344CB8AC3E}">
-        <p14:creationId xmlns:p14="http://schemas.microsoft.com/office/powerpoint/2010/main" val="4070982233"/>
+        <p14:creationId xmlns:p14="http://schemas.microsoft.com/office/powerpoint/2010/main" val="1738247319"/>
       </p:ext>
     </p:extLst>
   </p:cSld>
@@ -553,13 +493,7 @@
       </p:grpSpPr>
       <p:sp>
         <p:nvSpPr>
-          <p:cNvPr id="2" name="Vertical Title 1">
-            <a:extLst>
-              <a:ext uri="{FF2B5EF4-FFF2-40B4-BE49-F238E27FC236}">
-                <a16:creationId xmlns:a16="http://schemas.microsoft.com/office/drawing/2014/main" id="{650808F0-B3DD-4386-88BF-B3BEECD4BFBD}"/>
-              </a:ext>
-            </a:extLst>
-          </p:cNvPr>
+          <p:cNvPr id="2" name="Vertical Title 1"/>
           <p:cNvSpPr>
             <a:spLocks noGrp="1"/>
           </p:cNvSpPr>
@@ -569,8 +503,8 @@
         </p:nvSpPr>
         <p:spPr>
           <a:xfrm>
-            <a:off x="8724900" y="365125"/>
-            <a:ext cx="2628900" cy="5811838"/>
+            <a:off x="5375811" y="288465"/>
+            <a:ext cx="1619786" cy="4591622"/>
           </a:xfrm>
         </p:spPr>
         <p:txBody>
@@ -581,19 +515,13 @@
               <a:rPr lang="en-US"/>
               <a:t>Click to edit Master title style</a:t>
             </a:r>
-            <a:endParaRPr lang="en-GB"/>
-          </a:p>
-        </p:txBody>
-      </p:sp>
-      <p:sp>
-        <p:nvSpPr>
-          <p:cNvPr id="3" name="Vertical Text Placeholder 2">
-            <a:extLst>
-              <a:ext uri="{FF2B5EF4-FFF2-40B4-BE49-F238E27FC236}">
-                <a16:creationId xmlns:a16="http://schemas.microsoft.com/office/drawing/2014/main" id="{72314B5D-E890-4C0E-89BE-D544D5F2A8DC}"/>
-              </a:ext>
-            </a:extLst>
-          </p:cNvPr>
+            <a:endParaRPr lang="en-US" dirty="0"/>
+          </a:p>
+        </p:txBody>
+      </p:sp>
+      <p:sp>
+        <p:nvSpPr>
+          <p:cNvPr id="3" name="Vertical Text Placeholder 2"/>
           <p:cNvSpPr>
             <a:spLocks noGrp="1"/>
           </p:cNvSpPr>
@@ -603,8 +531,8 @@
         </p:nvSpPr>
         <p:spPr>
           <a:xfrm>
-            <a:off x="838200" y="365125"/>
-            <a:ext cx="7734300" cy="5811838"/>
+            <a:off x="516454" y="288465"/>
+            <a:ext cx="4765457" cy="4591622"/>
           </a:xfrm>
         </p:spPr>
         <p:txBody>
@@ -644,19 +572,13 @@
               <a:rPr lang="en-US"/>
               <a:t>Fifth level</a:t>
             </a:r>
-            <a:endParaRPr lang="en-GB"/>
-          </a:p>
-        </p:txBody>
-      </p:sp>
-      <p:sp>
-        <p:nvSpPr>
-          <p:cNvPr id="4" name="Date Placeholder 3">
-            <a:extLst>
-              <a:ext uri="{FF2B5EF4-FFF2-40B4-BE49-F238E27FC236}">
-                <a16:creationId xmlns:a16="http://schemas.microsoft.com/office/drawing/2014/main" id="{AA92B5D0-93E7-4BDB-96A4-B63B589D43D5}"/>
-              </a:ext>
-            </a:extLst>
-          </p:cNvPr>
+            <a:endParaRPr lang="en-US" dirty="0"/>
+          </a:p>
+        </p:txBody>
+      </p:sp>
+      <p:sp>
+        <p:nvSpPr>
+          <p:cNvPr id="4" name="Date Placeholder 3"/>
           <p:cNvSpPr>
             <a:spLocks noGrp="1"/>
           </p:cNvSpPr>
@@ -671,7 +593,7 @@
           <a:p>
             <a:fld id="{E535F51F-8871-4246-9489-4500232AE892}" type="datetimeFigureOut">
               <a:rPr lang="en-GB" smtClean="0"/>
-              <a:t>13/12/2018</a:t>
+              <a:t>14/12/2018</a:t>
             </a:fld>
             <a:endParaRPr lang="en-GB"/>
           </a:p>
@@ -679,13 +601,7 @@
       </p:sp>
       <p:sp>
         <p:nvSpPr>
-          <p:cNvPr id="5" name="Footer Placeholder 4">
-            <a:extLst>
-              <a:ext uri="{FF2B5EF4-FFF2-40B4-BE49-F238E27FC236}">
-                <a16:creationId xmlns:a16="http://schemas.microsoft.com/office/drawing/2014/main" id="{AD0AF6F0-B0D4-4AC1-8BEE-2BE615A8ECDE}"/>
-              </a:ext>
-            </a:extLst>
-          </p:cNvPr>
+          <p:cNvPr id="5" name="Footer Placeholder 4"/>
           <p:cNvSpPr>
             <a:spLocks noGrp="1"/>
           </p:cNvSpPr>
@@ -704,13 +620,7 @@
       </p:sp>
       <p:sp>
         <p:nvSpPr>
-          <p:cNvPr id="6" name="Slide Number Placeholder 5">
-            <a:extLst>
-              <a:ext uri="{FF2B5EF4-FFF2-40B4-BE49-F238E27FC236}">
-                <a16:creationId xmlns:a16="http://schemas.microsoft.com/office/drawing/2014/main" id="{5A175EA4-8CD5-46EB-AFFC-D432BC417577}"/>
-              </a:ext>
-            </a:extLst>
-          </p:cNvPr>
+          <p:cNvPr id="6" name="Slide Number Placeholder 5"/>
           <p:cNvSpPr>
             <a:spLocks noGrp="1"/>
           </p:cNvSpPr>
@@ -734,7 +644,7 @@
     </p:spTree>
     <p:extLst>
       <p:ext uri="{BB962C8B-B14F-4D97-AF65-F5344CB8AC3E}">
-        <p14:creationId xmlns:p14="http://schemas.microsoft.com/office/powerpoint/2010/main" val="4287746256"/>
+        <p14:creationId xmlns:p14="http://schemas.microsoft.com/office/powerpoint/2010/main" val="144489858"/>
       </p:ext>
     </p:extLst>
   </p:cSld>
@@ -763,13 +673,7 @@
       </p:grpSpPr>
       <p:sp>
         <p:nvSpPr>
-          <p:cNvPr id="2" name="Title 1">
-            <a:extLst>
-              <a:ext uri="{FF2B5EF4-FFF2-40B4-BE49-F238E27FC236}">
-                <a16:creationId xmlns:a16="http://schemas.microsoft.com/office/drawing/2014/main" id="{45E24BEB-E0E1-4DEA-BB9B-BCCA1ED7C3FB}"/>
-              </a:ext>
-            </a:extLst>
-          </p:cNvPr>
+          <p:cNvPr id="2" name="Title 1"/>
           <p:cNvSpPr>
             <a:spLocks noGrp="1"/>
           </p:cNvSpPr>
@@ -786,19 +690,13 @@
               <a:rPr lang="en-US"/>
               <a:t>Click to edit Master title style</a:t>
             </a:r>
-            <a:endParaRPr lang="en-GB"/>
-          </a:p>
-        </p:txBody>
-      </p:sp>
-      <p:sp>
-        <p:nvSpPr>
-          <p:cNvPr id="3" name="Content Placeholder 2">
-            <a:extLst>
-              <a:ext uri="{FF2B5EF4-FFF2-40B4-BE49-F238E27FC236}">
-                <a16:creationId xmlns:a16="http://schemas.microsoft.com/office/drawing/2014/main" id="{7944BD3D-3240-48E3-9C6C-9DB5A787EC7E}"/>
-              </a:ext>
-            </a:extLst>
-          </p:cNvPr>
+            <a:endParaRPr lang="en-US" dirty="0"/>
+          </a:p>
+        </p:txBody>
+      </p:sp>
+      <p:sp>
+        <p:nvSpPr>
+          <p:cNvPr id="3" name="Content Placeholder 2"/>
           <p:cNvSpPr>
             <a:spLocks noGrp="1"/>
           </p:cNvSpPr>
@@ -844,19 +742,13 @@
               <a:rPr lang="en-US"/>
               <a:t>Fifth level</a:t>
             </a:r>
-            <a:endParaRPr lang="en-GB"/>
-          </a:p>
-        </p:txBody>
-      </p:sp>
-      <p:sp>
-        <p:nvSpPr>
-          <p:cNvPr id="4" name="Date Placeholder 3">
-            <a:extLst>
-              <a:ext uri="{FF2B5EF4-FFF2-40B4-BE49-F238E27FC236}">
-                <a16:creationId xmlns:a16="http://schemas.microsoft.com/office/drawing/2014/main" id="{8B3E3528-873C-4506-912B-FA667E514386}"/>
-              </a:ext>
-            </a:extLst>
-          </p:cNvPr>
+            <a:endParaRPr lang="en-US" dirty="0"/>
+          </a:p>
+        </p:txBody>
+      </p:sp>
+      <p:sp>
+        <p:nvSpPr>
+          <p:cNvPr id="4" name="Date Placeholder 3"/>
           <p:cNvSpPr>
             <a:spLocks noGrp="1"/>
           </p:cNvSpPr>
@@ -871,7 +763,7 @@
           <a:p>
             <a:fld id="{E535F51F-8871-4246-9489-4500232AE892}" type="datetimeFigureOut">
               <a:rPr lang="en-GB" smtClean="0"/>
-              <a:t>13/12/2018</a:t>
+              <a:t>14/12/2018</a:t>
             </a:fld>
             <a:endParaRPr lang="en-GB"/>
           </a:p>
@@ -879,13 +771,7 @@
       </p:sp>
       <p:sp>
         <p:nvSpPr>
-          <p:cNvPr id="5" name="Footer Placeholder 4">
-            <a:extLst>
-              <a:ext uri="{FF2B5EF4-FFF2-40B4-BE49-F238E27FC236}">
-                <a16:creationId xmlns:a16="http://schemas.microsoft.com/office/drawing/2014/main" id="{276366CB-F1A0-4F89-A94C-5ED803786687}"/>
-              </a:ext>
-            </a:extLst>
-          </p:cNvPr>
+          <p:cNvPr id="5" name="Footer Placeholder 4"/>
           <p:cNvSpPr>
             <a:spLocks noGrp="1"/>
           </p:cNvSpPr>
@@ -904,13 +790,7 @@
       </p:sp>
       <p:sp>
         <p:nvSpPr>
-          <p:cNvPr id="6" name="Slide Number Placeholder 5">
-            <a:extLst>
-              <a:ext uri="{FF2B5EF4-FFF2-40B4-BE49-F238E27FC236}">
-                <a16:creationId xmlns:a16="http://schemas.microsoft.com/office/drawing/2014/main" id="{E4272CB8-7FE8-4216-B663-B8EAB748215C}"/>
-              </a:ext>
-            </a:extLst>
-          </p:cNvPr>
+          <p:cNvPr id="6" name="Slide Number Placeholder 5"/>
           <p:cNvSpPr>
             <a:spLocks noGrp="1"/>
           </p:cNvSpPr>
@@ -934,7 +814,7 @@
     </p:spTree>
     <p:extLst>
       <p:ext uri="{BB962C8B-B14F-4D97-AF65-F5344CB8AC3E}">
-        <p14:creationId xmlns:p14="http://schemas.microsoft.com/office/powerpoint/2010/main" val="690466302"/>
+        <p14:creationId xmlns:p14="http://schemas.microsoft.com/office/powerpoint/2010/main" val="80975897"/>
       </p:ext>
     </p:extLst>
   </p:cSld>
@@ -963,13 +843,7 @@
       </p:grpSpPr>
       <p:sp>
         <p:nvSpPr>
-          <p:cNvPr id="2" name="Title 1">
-            <a:extLst>
-              <a:ext uri="{FF2B5EF4-FFF2-40B4-BE49-F238E27FC236}">
-                <a16:creationId xmlns:a16="http://schemas.microsoft.com/office/drawing/2014/main" id="{09CD5697-B229-4E2A-8B01-EEFD770A6985}"/>
-              </a:ext>
-            </a:extLst>
-          </p:cNvPr>
+          <p:cNvPr id="2" name="Title 1"/>
           <p:cNvSpPr>
             <a:spLocks noGrp="1"/>
           </p:cNvSpPr>
@@ -979,15 +853,15 @@
         </p:nvSpPr>
         <p:spPr>
           <a:xfrm>
-            <a:off x="831850" y="1709738"/>
-            <a:ext cx="10515600" cy="2852737"/>
+            <a:off x="512541" y="1350773"/>
+            <a:ext cx="6479143" cy="2253795"/>
           </a:xfrm>
         </p:spPr>
         <p:txBody>
           <a:bodyPr anchor="b"/>
           <a:lstStyle>
             <a:lvl1pPr>
-              <a:defRPr sz="6000"/>
+              <a:defRPr sz="4740"/>
             </a:lvl1pPr>
           </a:lstStyle>
           <a:p>
@@ -995,19 +869,13 @@
               <a:rPr lang="en-US"/>
               <a:t>Click to edit Master title style</a:t>
             </a:r>
-            <a:endParaRPr lang="en-GB"/>
-          </a:p>
-        </p:txBody>
-      </p:sp>
-      <p:sp>
-        <p:nvSpPr>
-          <p:cNvPr id="3" name="Text Placeholder 2">
-            <a:extLst>
-              <a:ext uri="{FF2B5EF4-FFF2-40B4-BE49-F238E27FC236}">
-                <a16:creationId xmlns:a16="http://schemas.microsoft.com/office/drawing/2014/main" id="{459CE33C-6D47-4446-A821-CB4720CF823F}"/>
-              </a:ext>
-            </a:extLst>
-          </p:cNvPr>
+            <a:endParaRPr lang="en-US" dirty="0"/>
+          </a:p>
+        </p:txBody>
+      </p:sp>
+      <p:sp>
+        <p:nvSpPr>
+          <p:cNvPr id="3" name="Text Placeholder 2"/>
           <p:cNvSpPr>
             <a:spLocks noGrp="1"/>
           </p:cNvSpPr>
@@ -1017,8 +885,8 @@
         </p:nvSpPr>
         <p:spPr>
           <a:xfrm>
-            <a:off x="831850" y="4589463"/>
-            <a:ext cx="10515600" cy="1500187"/>
+            <a:off x="512541" y="3625890"/>
+            <a:ext cx="6479143" cy="1185217"/>
           </a:xfrm>
         </p:spPr>
         <p:txBody>
@@ -1026,17 +894,15 @@
           <a:lstStyle>
             <a:lvl1pPr marL="0" indent="0">
               <a:buNone/>
-              <a:defRPr sz="2400">
+              <a:defRPr sz="1896">
                 <a:solidFill>
-                  <a:schemeClr val="tx1">
-                    <a:tint val="75000"/>
-                  </a:schemeClr>
+                  <a:schemeClr val="tx1"/>
                 </a:solidFill>
               </a:defRPr>
             </a:lvl1pPr>
-            <a:lvl2pPr marL="457200" indent="0">
-              <a:buNone/>
-              <a:defRPr sz="2000">
+            <a:lvl2pPr marL="361188" indent="0">
+              <a:buNone/>
+              <a:defRPr sz="1580">
                 <a:solidFill>
                   <a:schemeClr val="tx1">
                     <a:tint val="75000"/>
@@ -1044,9 +910,9 @@
                 </a:solidFill>
               </a:defRPr>
             </a:lvl2pPr>
-            <a:lvl3pPr marL="914400" indent="0">
-              <a:buNone/>
-              <a:defRPr sz="1800">
+            <a:lvl3pPr marL="722376" indent="0">
+              <a:buNone/>
+              <a:defRPr sz="1422">
                 <a:solidFill>
                   <a:schemeClr val="tx1">
                     <a:tint val="75000"/>
@@ -1054,9 +920,9 @@
                 </a:solidFill>
               </a:defRPr>
             </a:lvl3pPr>
-            <a:lvl4pPr marL="1371600" indent="0">
-              <a:buNone/>
-              <a:defRPr sz="1600">
+            <a:lvl4pPr marL="1083564" indent="0">
+              <a:buNone/>
+              <a:defRPr sz="1264">
                 <a:solidFill>
                   <a:schemeClr val="tx1">
                     <a:tint val="75000"/>
@@ -1064,9 +930,9 @@
                 </a:solidFill>
               </a:defRPr>
             </a:lvl4pPr>
-            <a:lvl5pPr marL="1828800" indent="0">
-              <a:buNone/>
-              <a:defRPr sz="1600">
+            <a:lvl5pPr marL="1444752" indent="0">
+              <a:buNone/>
+              <a:defRPr sz="1264">
                 <a:solidFill>
                   <a:schemeClr val="tx1">
                     <a:tint val="75000"/>
@@ -1074,9 +940,9 @@
                 </a:solidFill>
               </a:defRPr>
             </a:lvl5pPr>
-            <a:lvl6pPr marL="2286000" indent="0">
-              <a:buNone/>
-              <a:defRPr sz="1600">
+            <a:lvl6pPr marL="1805940" indent="0">
+              <a:buNone/>
+              <a:defRPr sz="1264">
                 <a:solidFill>
                   <a:schemeClr val="tx1">
                     <a:tint val="75000"/>
@@ -1084,9 +950,9 @@
                 </a:solidFill>
               </a:defRPr>
             </a:lvl6pPr>
-            <a:lvl7pPr marL="2743200" indent="0">
-              <a:buNone/>
-              <a:defRPr sz="1600">
+            <a:lvl7pPr marL="2167128" indent="0">
+              <a:buNone/>
+              <a:defRPr sz="1264">
                 <a:solidFill>
                   <a:schemeClr val="tx1">
                     <a:tint val="75000"/>
@@ -1094,9 +960,9 @@
                 </a:solidFill>
               </a:defRPr>
             </a:lvl7pPr>
-            <a:lvl8pPr marL="3200400" indent="0">
-              <a:buNone/>
-              <a:defRPr sz="1600">
+            <a:lvl8pPr marL="2528316" indent="0">
+              <a:buNone/>
+              <a:defRPr sz="1264">
                 <a:solidFill>
                   <a:schemeClr val="tx1">
                     <a:tint val="75000"/>
@@ -1104,9 +970,9 @@
                 </a:solidFill>
               </a:defRPr>
             </a:lvl8pPr>
-            <a:lvl9pPr marL="3657600" indent="0">
-              <a:buNone/>
-              <a:defRPr sz="1600">
+            <a:lvl9pPr marL="2889504" indent="0">
+              <a:buNone/>
+              <a:defRPr sz="1264">
                 <a:solidFill>
                   <a:schemeClr val="tx1">
                     <a:tint val="75000"/>
@@ -1126,13 +992,7 @@
       </p:sp>
       <p:sp>
         <p:nvSpPr>
-          <p:cNvPr id="4" name="Date Placeholder 3">
-            <a:extLst>
-              <a:ext uri="{FF2B5EF4-FFF2-40B4-BE49-F238E27FC236}">
-                <a16:creationId xmlns:a16="http://schemas.microsoft.com/office/drawing/2014/main" id="{BDFD949D-9661-455C-AF45-ECC316D10C3E}"/>
-              </a:ext>
-            </a:extLst>
-          </p:cNvPr>
+          <p:cNvPr id="4" name="Date Placeholder 3"/>
           <p:cNvSpPr>
             <a:spLocks noGrp="1"/>
           </p:cNvSpPr>
@@ -1147,7 +1007,7 @@
           <a:p>
             <a:fld id="{E535F51F-8871-4246-9489-4500232AE892}" type="datetimeFigureOut">
               <a:rPr lang="en-GB" smtClean="0"/>
-              <a:t>13/12/2018</a:t>
+              <a:t>14/12/2018</a:t>
             </a:fld>
             <a:endParaRPr lang="en-GB"/>
           </a:p>
@@ -1155,13 +1015,7 @@
       </p:sp>
       <p:sp>
         <p:nvSpPr>
-          <p:cNvPr id="5" name="Footer Placeholder 4">
-            <a:extLst>
-              <a:ext uri="{FF2B5EF4-FFF2-40B4-BE49-F238E27FC236}">
-                <a16:creationId xmlns:a16="http://schemas.microsoft.com/office/drawing/2014/main" id="{DA834BA7-08B9-4F20-A41F-7C2FFC6C7005}"/>
-              </a:ext>
-            </a:extLst>
-          </p:cNvPr>
+          <p:cNvPr id="5" name="Footer Placeholder 4"/>
           <p:cNvSpPr>
             <a:spLocks noGrp="1"/>
           </p:cNvSpPr>
@@ -1180,13 +1034,7 @@
       </p:sp>
       <p:sp>
         <p:nvSpPr>
-          <p:cNvPr id="6" name="Slide Number Placeholder 5">
-            <a:extLst>
-              <a:ext uri="{FF2B5EF4-FFF2-40B4-BE49-F238E27FC236}">
-                <a16:creationId xmlns:a16="http://schemas.microsoft.com/office/drawing/2014/main" id="{675204DE-7CEF-436B-AEA5-9F5ED252E35C}"/>
-              </a:ext>
-            </a:extLst>
-          </p:cNvPr>
+          <p:cNvPr id="6" name="Slide Number Placeholder 5"/>
           <p:cNvSpPr>
             <a:spLocks noGrp="1"/>
           </p:cNvSpPr>
@@ -1210,7 +1058,7 @@
     </p:spTree>
     <p:extLst>
       <p:ext uri="{BB962C8B-B14F-4D97-AF65-F5344CB8AC3E}">
-        <p14:creationId xmlns:p14="http://schemas.microsoft.com/office/powerpoint/2010/main" val="1231066463"/>
+        <p14:creationId xmlns:p14="http://schemas.microsoft.com/office/powerpoint/2010/main" val="3284921805"/>
       </p:ext>
     </p:extLst>
   </p:cSld>
@@ -1239,13 +1087,7 @@
       </p:grpSpPr>
       <p:sp>
         <p:nvSpPr>
-          <p:cNvPr id="2" name="Title 1">
-            <a:extLst>
-              <a:ext uri="{FF2B5EF4-FFF2-40B4-BE49-F238E27FC236}">
-                <a16:creationId xmlns:a16="http://schemas.microsoft.com/office/drawing/2014/main" id="{3A75BF81-0A1C-4DAD-8274-9C23A17FF245}"/>
-              </a:ext>
-            </a:extLst>
-          </p:cNvPr>
+          <p:cNvPr id="2" name="Title 1"/>
           <p:cNvSpPr>
             <a:spLocks noGrp="1"/>
           </p:cNvSpPr>
@@ -1262,19 +1104,13 @@
               <a:rPr lang="en-US"/>
               <a:t>Click to edit Master title style</a:t>
             </a:r>
-            <a:endParaRPr lang="en-GB"/>
-          </a:p>
-        </p:txBody>
-      </p:sp>
-      <p:sp>
-        <p:nvSpPr>
-          <p:cNvPr id="3" name="Content Placeholder 2">
-            <a:extLst>
-              <a:ext uri="{FF2B5EF4-FFF2-40B4-BE49-F238E27FC236}">
-                <a16:creationId xmlns:a16="http://schemas.microsoft.com/office/drawing/2014/main" id="{6C0B8201-B49F-4C89-89B7-5CB9EA1508C8}"/>
-              </a:ext>
-            </a:extLst>
-          </p:cNvPr>
+            <a:endParaRPr lang="en-US" dirty="0"/>
+          </a:p>
+        </p:txBody>
+      </p:sp>
+      <p:sp>
+        <p:nvSpPr>
+          <p:cNvPr id="3" name="Content Placeholder 2"/>
           <p:cNvSpPr>
             <a:spLocks noGrp="1"/>
           </p:cNvSpPr>
@@ -1284,8 +1120,8 @@
         </p:nvSpPr>
         <p:spPr>
           <a:xfrm>
-            <a:off x="838200" y="1825625"/>
-            <a:ext cx="5181600" cy="4351338"/>
+            <a:off x="516454" y="1442328"/>
+            <a:ext cx="3192621" cy="3437759"/>
           </a:xfrm>
         </p:spPr>
         <p:txBody>
@@ -1325,19 +1161,13 @@
               <a:rPr lang="en-US"/>
               <a:t>Fifth level</a:t>
             </a:r>
-            <a:endParaRPr lang="en-GB"/>
-          </a:p>
-        </p:txBody>
-      </p:sp>
-      <p:sp>
-        <p:nvSpPr>
-          <p:cNvPr id="4" name="Content Placeholder 3">
-            <a:extLst>
-              <a:ext uri="{FF2B5EF4-FFF2-40B4-BE49-F238E27FC236}">
-                <a16:creationId xmlns:a16="http://schemas.microsoft.com/office/drawing/2014/main" id="{A5BF3F3A-200D-4117-A101-282D656565B6}"/>
-              </a:ext>
-            </a:extLst>
-          </p:cNvPr>
+            <a:endParaRPr lang="en-US" dirty="0"/>
+          </a:p>
+        </p:txBody>
+      </p:sp>
+      <p:sp>
+        <p:nvSpPr>
+          <p:cNvPr id="4" name="Content Placeholder 3"/>
           <p:cNvSpPr>
             <a:spLocks noGrp="1"/>
           </p:cNvSpPr>
@@ -1347,8 +1177,8 @@
         </p:nvSpPr>
         <p:spPr>
           <a:xfrm>
-            <a:off x="6172200" y="1825625"/>
-            <a:ext cx="5181600" cy="4351338"/>
+            <a:off x="3802975" y="1442328"/>
+            <a:ext cx="3192621" cy="3437759"/>
           </a:xfrm>
         </p:spPr>
         <p:txBody>
@@ -1388,19 +1218,13 @@
               <a:rPr lang="en-US"/>
               <a:t>Fifth level</a:t>
             </a:r>
-            <a:endParaRPr lang="en-GB"/>
-          </a:p>
-        </p:txBody>
-      </p:sp>
-      <p:sp>
-        <p:nvSpPr>
-          <p:cNvPr id="5" name="Date Placeholder 4">
-            <a:extLst>
-              <a:ext uri="{FF2B5EF4-FFF2-40B4-BE49-F238E27FC236}">
-                <a16:creationId xmlns:a16="http://schemas.microsoft.com/office/drawing/2014/main" id="{7B2BB60C-2115-4F76-9A34-85CE3D74A01C}"/>
-              </a:ext>
-            </a:extLst>
-          </p:cNvPr>
+            <a:endParaRPr lang="en-US" dirty="0"/>
+          </a:p>
+        </p:txBody>
+      </p:sp>
+      <p:sp>
+        <p:nvSpPr>
+          <p:cNvPr id="5" name="Date Placeholder 4"/>
           <p:cNvSpPr>
             <a:spLocks noGrp="1"/>
           </p:cNvSpPr>
@@ -1415,7 +1239,7 @@
           <a:p>
             <a:fld id="{E535F51F-8871-4246-9489-4500232AE892}" type="datetimeFigureOut">
               <a:rPr lang="en-GB" smtClean="0"/>
-              <a:t>13/12/2018</a:t>
+              <a:t>14/12/2018</a:t>
             </a:fld>
             <a:endParaRPr lang="en-GB"/>
           </a:p>
@@ -1423,13 +1247,7 @@
       </p:sp>
       <p:sp>
         <p:nvSpPr>
-          <p:cNvPr id="6" name="Footer Placeholder 5">
-            <a:extLst>
-              <a:ext uri="{FF2B5EF4-FFF2-40B4-BE49-F238E27FC236}">
-                <a16:creationId xmlns:a16="http://schemas.microsoft.com/office/drawing/2014/main" id="{3ED01E58-88C8-48B5-BA1A-1E952B9F1A24}"/>
-              </a:ext>
-            </a:extLst>
-          </p:cNvPr>
+          <p:cNvPr id="6" name="Footer Placeholder 5"/>
           <p:cNvSpPr>
             <a:spLocks noGrp="1"/>
           </p:cNvSpPr>
@@ -1448,13 +1266,7 @@
       </p:sp>
       <p:sp>
         <p:nvSpPr>
-          <p:cNvPr id="7" name="Slide Number Placeholder 6">
-            <a:extLst>
-              <a:ext uri="{FF2B5EF4-FFF2-40B4-BE49-F238E27FC236}">
-                <a16:creationId xmlns:a16="http://schemas.microsoft.com/office/drawing/2014/main" id="{CE2AE8D3-9CB1-4F74-9E05-2707EAA76829}"/>
-              </a:ext>
-            </a:extLst>
-          </p:cNvPr>
+          <p:cNvPr id="7" name="Slide Number Placeholder 6"/>
           <p:cNvSpPr>
             <a:spLocks noGrp="1"/>
           </p:cNvSpPr>
@@ -1478,7 +1290,7 @@
     </p:spTree>
     <p:extLst>
       <p:ext uri="{BB962C8B-B14F-4D97-AF65-F5344CB8AC3E}">
-        <p14:creationId xmlns:p14="http://schemas.microsoft.com/office/powerpoint/2010/main" val="1035494340"/>
+        <p14:creationId xmlns:p14="http://schemas.microsoft.com/office/powerpoint/2010/main" val="1209898401"/>
       </p:ext>
     </p:extLst>
   </p:cSld>
@@ -1507,13 +1319,7 @@
       </p:grpSpPr>
       <p:sp>
         <p:nvSpPr>
-          <p:cNvPr id="2" name="Title 1">
-            <a:extLst>
-              <a:ext uri="{FF2B5EF4-FFF2-40B4-BE49-F238E27FC236}">
-                <a16:creationId xmlns:a16="http://schemas.microsoft.com/office/drawing/2014/main" id="{61D261EA-8989-4337-822C-75319A0973C9}"/>
-              </a:ext>
-            </a:extLst>
-          </p:cNvPr>
+          <p:cNvPr id="2" name="Title 1"/>
           <p:cNvSpPr>
             <a:spLocks noGrp="1"/>
           </p:cNvSpPr>
@@ -1523,8 +1329,8 @@
         </p:nvSpPr>
         <p:spPr>
           <a:xfrm>
-            <a:off x="839788" y="365125"/>
-            <a:ext cx="10515600" cy="1325563"/>
+            <a:off x="517432" y="288467"/>
+            <a:ext cx="6479143" cy="1047256"/>
           </a:xfrm>
         </p:spPr>
         <p:txBody>
@@ -1535,19 +1341,13 @@
               <a:rPr lang="en-US"/>
               <a:t>Click to edit Master title style</a:t>
             </a:r>
-            <a:endParaRPr lang="en-GB"/>
-          </a:p>
-        </p:txBody>
-      </p:sp>
-      <p:sp>
-        <p:nvSpPr>
-          <p:cNvPr id="3" name="Text Placeholder 2">
-            <a:extLst>
-              <a:ext uri="{FF2B5EF4-FFF2-40B4-BE49-F238E27FC236}">
-                <a16:creationId xmlns:a16="http://schemas.microsoft.com/office/drawing/2014/main" id="{11819C60-9A27-4EEB-914A-85AAC6386432}"/>
-              </a:ext>
-            </a:extLst>
-          </p:cNvPr>
+            <a:endParaRPr lang="en-US" dirty="0"/>
+          </a:p>
+        </p:txBody>
+      </p:sp>
+      <p:sp>
+        <p:nvSpPr>
+          <p:cNvPr id="3" name="Text Placeholder 2"/>
           <p:cNvSpPr>
             <a:spLocks noGrp="1"/>
           </p:cNvSpPr>
@@ -1557,8 +1357,8 @@
         </p:nvSpPr>
         <p:spPr>
           <a:xfrm>
-            <a:off x="839788" y="1681163"/>
-            <a:ext cx="5157787" cy="823912"/>
+            <a:off x="517433" y="1328197"/>
+            <a:ext cx="3177949" cy="650929"/>
           </a:xfrm>
         </p:spPr>
         <p:txBody>
@@ -1566,39 +1366,39 @@
           <a:lstStyle>
             <a:lvl1pPr marL="0" indent="0">
               <a:buNone/>
-              <a:defRPr sz="2400" b="1"/>
+              <a:defRPr sz="1896" b="1"/>
             </a:lvl1pPr>
-            <a:lvl2pPr marL="457200" indent="0">
-              <a:buNone/>
-              <a:defRPr sz="2000" b="1"/>
+            <a:lvl2pPr marL="361188" indent="0">
+              <a:buNone/>
+              <a:defRPr sz="1580" b="1"/>
             </a:lvl2pPr>
-            <a:lvl3pPr marL="914400" indent="0">
-              <a:buNone/>
-              <a:defRPr sz="1800" b="1"/>
+            <a:lvl3pPr marL="722376" indent="0">
+              <a:buNone/>
+              <a:defRPr sz="1422" b="1"/>
             </a:lvl3pPr>
-            <a:lvl4pPr marL="1371600" indent="0">
-              <a:buNone/>
-              <a:defRPr sz="1600" b="1"/>
+            <a:lvl4pPr marL="1083564" indent="0">
+              <a:buNone/>
+              <a:defRPr sz="1264" b="1"/>
             </a:lvl4pPr>
-            <a:lvl5pPr marL="1828800" indent="0">
-              <a:buNone/>
-              <a:defRPr sz="1600" b="1"/>
+            <a:lvl5pPr marL="1444752" indent="0">
+              <a:buNone/>
+              <a:defRPr sz="1264" b="1"/>
             </a:lvl5pPr>
-            <a:lvl6pPr marL="2286000" indent="0">
-              <a:buNone/>
-              <a:defRPr sz="1600" b="1"/>
+            <a:lvl6pPr marL="1805940" indent="0">
+              <a:buNone/>
+              <a:defRPr sz="1264" b="1"/>
             </a:lvl6pPr>
-            <a:lvl7pPr marL="2743200" indent="0">
-              <a:buNone/>
-              <a:defRPr sz="1600" b="1"/>
+            <a:lvl7pPr marL="2167128" indent="0">
+              <a:buNone/>
+              <a:defRPr sz="1264" b="1"/>
             </a:lvl7pPr>
-            <a:lvl8pPr marL="3200400" indent="0">
-              <a:buNone/>
-              <a:defRPr sz="1600" b="1"/>
+            <a:lvl8pPr marL="2528316" indent="0">
+              <a:buNone/>
+              <a:defRPr sz="1264" b="1"/>
             </a:lvl8pPr>
-            <a:lvl9pPr marL="3657600" indent="0">
-              <a:buNone/>
-              <a:defRPr sz="1600" b="1"/>
+            <a:lvl9pPr marL="2889504" indent="0">
+              <a:buNone/>
+              <a:defRPr sz="1264" b="1"/>
             </a:lvl9pPr>
           </a:lstStyle>
           <a:p>
@@ -1612,13 +1412,7 @@
       </p:sp>
       <p:sp>
         <p:nvSpPr>
-          <p:cNvPr id="4" name="Content Placeholder 3">
-            <a:extLst>
-              <a:ext uri="{FF2B5EF4-FFF2-40B4-BE49-F238E27FC236}">
-                <a16:creationId xmlns:a16="http://schemas.microsoft.com/office/drawing/2014/main" id="{F85C5D82-8173-4CA2-8946-79CDC389EE89}"/>
-              </a:ext>
-            </a:extLst>
-          </p:cNvPr>
+          <p:cNvPr id="4" name="Content Placeholder 3"/>
           <p:cNvSpPr>
             <a:spLocks noGrp="1"/>
           </p:cNvSpPr>
@@ -1628,8 +1422,8 @@
         </p:nvSpPr>
         <p:spPr>
           <a:xfrm>
-            <a:off x="839788" y="2505075"/>
-            <a:ext cx="5157787" cy="3684588"/>
+            <a:off x="517433" y="1979126"/>
+            <a:ext cx="3177949" cy="2910995"/>
           </a:xfrm>
         </p:spPr>
         <p:txBody>
@@ -1669,19 +1463,13 @@
               <a:rPr lang="en-US"/>
               <a:t>Fifth level</a:t>
             </a:r>
-            <a:endParaRPr lang="en-GB"/>
-          </a:p>
-        </p:txBody>
-      </p:sp>
-      <p:sp>
-        <p:nvSpPr>
-          <p:cNvPr id="5" name="Text Placeholder 4">
-            <a:extLst>
-              <a:ext uri="{FF2B5EF4-FFF2-40B4-BE49-F238E27FC236}">
-                <a16:creationId xmlns:a16="http://schemas.microsoft.com/office/drawing/2014/main" id="{43034544-8A6C-428D-B551-B687EB8E201F}"/>
-              </a:ext>
-            </a:extLst>
-          </p:cNvPr>
+            <a:endParaRPr lang="en-US" dirty="0"/>
+          </a:p>
+        </p:txBody>
+      </p:sp>
+      <p:sp>
+        <p:nvSpPr>
+          <p:cNvPr id="5" name="Text Placeholder 4"/>
           <p:cNvSpPr>
             <a:spLocks noGrp="1"/>
           </p:cNvSpPr>
@@ -1691,8 +1479,8 @@
         </p:nvSpPr>
         <p:spPr>
           <a:xfrm>
-            <a:off x="6172200" y="1681163"/>
-            <a:ext cx="5183188" cy="823912"/>
+            <a:off x="3802976" y="1328197"/>
+            <a:ext cx="3193600" cy="650929"/>
           </a:xfrm>
         </p:spPr>
         <p:txBody>
@@ -1700,39 +1488,39 @@
           <a:lstStyle>
             <a:lvl1pPr marL="0" indent="0">
               <a:buNone/>
-              <a:defRPr sz="2400" b="1"/>
+              <a:defRPr sz="1896" b="1"/>
             </a:lvl1pPr>
-            <a:lvl2pPr marL="457200" indent="0">
-              <a:buNone/>
-              <a:defRPr sz="2000" b="1"/>
+            <a:lvl2pPr marL="361188" indent="0">
+              <a:buNone/>
+              <a:defRPr sz="1580" b="1"/>
             </a:lvl2pPr>
-            <a:lvl3pPr marL="914400" indent="0">
-              <a:buNone/>
-              <a:defRPr sz="1800" b="1"/>
+            <a:lvl3pPr marL="722376" indent="0">
+              <a:buNone/>
+              <a:defRPr sz="1422" b="1"/>
             </a:lvl3pPr>
-            <a:lvl4pPr marL="1371600" indent="0">
-              <a:buNone/>
-              <a:defRPr sz="1600" b="1"/>
+            <a:lvl4pPr marL="1083564" indent="0">
+              <a:buNone/>
+              <a:defRPr sz="1264" b="1"/>
             </a:lvl4pPr>
-            <a:lvl5pPr marL="1828800" indent="0">
-              <a:buNone/>
-              <a:defRPr sz="1600" b="1"/>
+            <a:lvl5pPr marL="1444752" indent="0">
+              <a:buNone/>
+              <a:defRPr sz="1264" b="1"/>
             </a:lvl5pPr>
-            <a:lvl6pPr marL="2286000" indent="0">
-              <a:buNone/>
-              <a:defRPr sz="1600" b="1"/>
+            <a:lvl6pPr marL="1805940" indent="0">
+              <a:buNone/>
+              <a:defRPr sz="1264" b="1"/>
             </a:lvl6pPr>
-            <a:lvl7pPr marL="2743200" indent="0">
-              <a:buNone/>
-              <a:defRPr sz="1600" b="1"/>
+            <a:lvl7pPr marL="2167128" indent="0">
+              <a:buNone/>
+              <a:defRPr sz="1264" b="1"/>
             </a:lvl7pPr>
-            <a:lvl8pPr marL="3200400" indent="0">
-              <a:buNone/>
-              <a:defRPr sz="1600" b="1"/>
+            <a:lvl8pPr marL="2528316" indent="0">
+              <a:buNone/>
+              <a:defRPr sz="1264" b="1"/>
             </a:lvl8pPr>
-            <a:lvl9pPr marL="3657600" indent="0">
-              <a:buNone/>
-              <a:defRPr sz="1600" b="1"/>
+            <a:lvl9pPr marL="2889504" indent="0">
+              <a:buNone/>
+              <a:defRPr sz="1264" b="1"/>
             </a:lvl9pPr>
           </a:lstStyle>
           <a:p>
@@ -1746,13 +1534,7 @@
       </p:sp>
       <p:sp>
         <p:nvSpPr>
-          <p:cNvPr id="6" name="Content Placeholder 5">
-            <a:extLst>
-              <a:ext uri="{FF2B5EF4-FFF2-40B4-BE49-F238E27FC236}">
-                <a16:creationId xmlns:a16="http://schemas.microsoft.com/office/drawing/2014/main" id="{FED0B61D-6D24-4F1A-89A8-1D90E31B23C1}"/>
-              </a:ext>
-            </a:extLst>
-          </p:cNvPr>
+          <p:cNvPr id="6" name="Content Placeholder 5"/>
           <p:cNvSpPr>
             <a:spLocks noGrp="1"/>
           </p:cNvSpPr>
@@ -1762,8 +1544,8 @@
         </p:nvSpPr>
         <p:spPr>
           <a:xfrm>
-            <a:off x="6172200" y="2505075"/>
-            <a:ext cx="5183188" cy="3684588"/>
+            <a:off x="3802976" y="1979126"/>
+            <a:ext cx="3193600" cy="2910995"/>
           </a:xfrm>
         </p:spPr>
         <p:txBody>
@@ -1803,19 +1585,13 @@
               <a:rPr lang="en-US"/>
               <a:t>Fifth level</a:t>
             </a:r>
-            <a:endParaRPr lang="en-GB"/>
-          </a:p>
-        </p:txBody>
-      </p:sp>
-      <p:sp>
-        <p:nvSpPr>
-          <p:cNvPr id="7" name="Date Placeholder 6">
-            <a:extLst>
-              <a:ext uri="{FF2B5EF4-FFF2-40B4-BE49-F238E27FC236}">
-                <a16:creationId xmlns:a16="http://schemas.microsoft.com/office/drawing/2014/main" id="{6A123C22-6A4C-4B3C-91DD-E0534A1F400A}"/>
-              </a:ext>
-            </a:extLst>
-          </p:cNvPr>
+            <a:endParaRPr lang="en-US" dirty="0"/>
+          </a:p>
+        </p:txBody>
+      </p:sp>
+      <p:sp>
+        <p:nvSpPr>
+          <p:cNvPr id="7" name="Date Placeholder 6"/>
           <p:cNvSpPr>
             <a:spLocks noGrp="1"/>
           </p:cNvSpPr>
@@ -1830,7 +1606,7 @@
           <a:p>
             <a:fld id="{E535F51F-8871-4246-9489-4500232AE892}" type="datetimeFigureOut">
               <a:rPr lang="en-GB" smtClean="0"/>
-              <a:t>13/12/2018</a:t>
+              <a:t>14/12/2018</a:t>
             </a:fld>
             <a:endParaRPr lang="en-GB"/>
           </a:p>
@@ -1838,13 +1614,7 @@
       </p:sp>
       <p:sp>
         <p:nvSpPr>
-          <p:cNvPr id="8" name="Footer Placeholder 7">
-            <a:extLst>
-              <a:ext uri="{FF2B5EF4-FFF2-40B4-BE49-F238E27FC236}">
-                <a16:creationId xmlns:a16="http://schemas.microsoft.com/office/drawing/2014/main" id="{1FA70FF8-433A-4819-8B3D-FF9584F63D2D}"/>
-              </a:ext>
-            </a:extLst>
-          </p:cNvPr>
+          <p:cNvPr id="8" name="Footer Placeholder 7"/>
           <p:cNvSpPr>
             <a:spLocks noGrp="1"/>
           </p:cNvSpPr>
@@ -1863,13 +1633,7 @@
       </p:sp>
       <p:sp>
         <p:nvSpPr>
-          <p:cNvPr id="9" name="Slide Number Placeholder 8">
-            <a:extLst>
-              <a:ext uri="{FF2B5EF4-FFF2-40B4-BE49-F238E27FC236}">
-                <a16:creationId xmlns:a16="http://schemas.microsoft.com/office/drawing/2014/main" id="{85E40276-9C57-4EDF-B09C-CDB63DBE90D4}"/>
-              </a:ext>
-            </a:extLst>
-          </p:cNvPr>
+          <p:cNvPr id="9" name="Slide Number Placeholder 8"/>
           <p:cNvSpPr>
             <a:spLocks noGrp="1"/>
           </p:cNvSpPr>
@@ -1893,7 +1657,7 @@
     </p:spTree>
     <p:extLst>
       <p:ext uri="{BB962C8B-B14F-4D97-AF65-F5344CB8AC3E}">
-        <p14:creationId xmlns:p14="http://schemas.microsoft.com/office/powerpoint/2010/main" val="1293767891"/>
+        <p14:creationId xmlns:p14="http://schemas.microsoft.com/office/powerpoint/2010/main" val="3821447693"/>
       </p:ext>
     </p:extLst>
   </p:cSld>
@@ -1922,13 +1686,7 @@
       </p:grpSpPr>
       <p:sp>
         <p:nvSpPr>
-          <p:cNvPr id="2" name="Title 1">
-            <a:extLst>
-              <a:ext uri="{FF2B5EF4-FFF2-40B4-BE49-F238E27FC236}">
-                <a16:creationId xmlns:a16="http://schemas.microsoft.com/office/drawing/2014/main" id="{A2F8F86D-4A50-4CDC-AE73-03D153DAC6AC}"/>
-              </a:ext>
-            </a:extLst>
-          </p:cNvPr>
+          <p:cNvPr id="2" name="Title 1"/>
           <p:cNvSpPr>
             <a:spLocks noGrp="1"/>
           </p:cNvSpPr>
@@ -1945,19 +1703,13 @@
               <a:rPr lang="en-US"/>
               <a:t>Click to edit Master title style</a:t>
             </a:r>
-            <a:endParaRPr lang="en-GB"/>
-          </a:p>
-        </p:txBody>
-      </p:sp>
-      <p:sp>
-        <p:nvSpPr>
-          <p:cNvPr id="3" name="Date Placeholder 2">
-            <a:extLst>
-              <a:ext uri="{FF2B5EF4-FFF2-40B4-BE49-F238E27FC236}">
-                <a16:creationId xmlns:a16="http://schemas.microsoft.com/office/drawing/2014/main" id="{2B956EA8-1493-408A-8C2A-C6419E0DCB1E}"/>
-              </a:ext>
-            </a:extLst>
-          </p:cNvPr>
+            <a:endParaRPr lang="en-US" dirty="0"/>
+          </a:p>
+        </p:txBody>
+      </p:sp>
+      <p:sp>
+        <p:nvSpPr>
+          <p:cNvPr id="3" name="Date Placeholder 2"/>
           <p:cNvSpPr>
             <a:spLocks noGrp="1"/>
           </p:cNvSpPr>
@@ -1972,7 +1724,7 @@
           <a:p>
             <a:fld id="{E535F51F-8871-4246-9489-4500232AE892}" type="datetimeFigureOut">
               <a:rPr lang="en-GB" smtClean="0"/>
-              <a:t>13/12/2018</a:t>
+              <a:t>14/12/2018</a:t>
             </a:fld>
             <a:endParaRPr lang="en-GB"/>
           </a:p>
@@ -1980,13 +1732,7 @@
       </p:sp>
       <p:sp>
         <p:nvSpPr>
-          <p:cNvPr id="4" name="Footer Placeholder 3">
-            <a:extLst>
-              <a:ext uri="{FF2B5EF4-FFF2-40B4-BE49-F238E27FC236}">
-                <a16:creationId xmlns:a16="http://schemas.microsoft.com/office/drawing/2014/main" id="{2BCC2E7F-1E5B-402E-BDC9-F585336CF1FB}"/>
-              </a:ext>
-            </a:extLst>
-          </p:cNvPr>
+          <p:cNvPr id="4" name="Footer Placeholder 3"/>
           <p:cNvSpPr>
             <a:spLocks noGrp="1"/>
           </p:cNvSpPr>
@@ -2005,13 +1751,7 @@
       </p:sp>
       <p:sp>
         <p:nvSpPr>
-          <p:cNvPr id="5" name="Slide Number Placeholder 4">
-            <a:extLst>
-              <a:ext uri="{FF2B5EF4-FFF2-40B4-BE49-F238E27FC236}">
-                <a16:creationId xmlns:a16="http://schemas.microsoft.com/office/drawing/2014/main" id="{D96FC65D-211E-4E56-993B-5E545955D67C}"/>
-              </a:ext>
-            </a:extLst>
-          </p:cNvPr>
+          <p:cNvPr id="5" name="Slide Number Placeholder 4"/>
           <p:cNvSpPr>
             <a:spLocks noGrp="1"/>
           </p:cNvSpPr>
@@ -2035,7 +1775,7 @@
     </p:spTree>
     <p:extLst>
       <p:ext uri="{BB962C8B-B14F-4D97-AF65-F5344CB8AC3E}">
-        <p14:creationId xmlns:p14="http://schemas.microsoft.com/office/powerpoint/2010/main" val="3818600429"/>
+        <p14:creationId xmlns:p14="http://schemas.microsoft.com/office/powerpoint/2010/main" val="1759329489"/>
       </p:ext>
     </p:extLst>
   </p:cSld>
@@ -2064,13 +1804,7 @@
       </p:grpSpPr>
       <p:sp>
         <p:nvSpPr>
-          <p:cNvPr id="2" name="Date Placeholder 1">
-            <a:extLst>
-              <a:ext uri="{FF2B5EF4-FFF2-40B4-BE49-F238E27FC236}">
-                <a16:creationId xmlns:a16="http://schemas.microsoft.com/office/drawing/2014/main" id="{72956EF4-6A3E-4F29-8F64-9800B250BE57}"/>
-              </a:ext>
-            </a:extLst>
-          </p:cNvPr>
+          <p:cNvPr id="2" name="Date Placeholder 1"/>
           <p:cNvSpPr>
             <a:spLocks noGrp="1"/>
           </p:cNvSpPr>
@@ -2085,7 +1819,7 @@
           <a:p>
             <a:fld id="{E535F51F-8871-4246-9489-4500232AE892}" type="datetimeFigureOut">
               <a:rPr lang="en-GB" smtClean="0"/>
-              <a:t>13/12/2018</a:t>
+              <a:t>14/12/2018</a:t>
             </a:fld>
             <a:endParaRPr lang="en-GB"/>
           </a:p>
@@ -2093,13 +1827,7 @@
       </p:sp>
       <p:sp>
         <p:nvSpPr>
-          <p:cNvPr id="3" name="Footer Placeholder 2">
-            <a:extLst>
-              <a:ext uri="{FF2B5EF4-FFF2-40B4-BE49-F238E27FC236}">
-                <a16:creationId xmlns:a16="http://schemas.microsoft.com/office/drawing/2014/main" id="{ABB17EDC-C6E0-4976-8D29-712292F368EF}"/>
-              </a:ext>
-            </a:extLst>
-          </p:cNvPr>
+          <p:cNvPr id="3" name="Footer Placeholder 2"/>
           <p:cNvSpPr>
             <a:spLocks noGrp="1"/>
           </p:cNvSpPr>
@@ -2118,13 +1846,7 @@
       </p:sp>
       <p:sp>
         <p:nvSpPr>
-          <p:cNvPr id="4" name="Slide Number Placeholder 3">
-            <a:extLst>
-              <a:ext uri="{FF2B5EF4-FFF2-40B4-BE49-F238E27FC236}">
-                <a16:creationId xmlns:a16="http://schemas.microsoft.com/office/drawing/2014/main" id="{D291F2A3-EE83-4526-8EE6-A25C8D280B7C}"/>
-              </a:ext>
-            </a:extLst>
-          </p:cNvPr>
+          <p:cNvPr id="4" name="Slide Number Placeholder 3"/>
           <p:cNvSpPr>
             <a:spLocks noGrp="1"/>
           </p:cNvSpPr>
@@ -2148,7 +1870,7 @@
     </p:spTree>
     <p:extLst>
       <p:ext uri="{BB962C8B-B14F-4D97-AF65-F5344CB8AC3E}">
-        <p14:creationId xmlns:p14="http://schemas.microsoft.com/office/powerpoint/2010/main" val="1578799491"/>
+        <p14:creationId xmlns:p14="http://schemas.microsoft.com/office/powerpoint/2010/main" val="1739658225"/>
       </p:ext>
     </p:extLst>
   </p:cSld>
@@ -2177,13 +1899,7 @@
       </p:grpSpPr>
       <p:sp>
         <p:nvSpPr>
-          <p:cNvPr id="2" name="Title 1">
-            <a:extLst>
-              <a:ext uri="{FF2B5EF4-FFF2-40B4-BE49-F238E27FC236}">
-                <a16:creationId xmlns:a16="http://schemas.microsoft.com/office/drawing/2014/main" id="{C905D95A-2565-40A2-920E-26E7385D9C89}"/>
-              </a:ext>
-            </a:extLst>
-          </p:cNvPr>
+          <p:cNvPr id="2" name="Title 1"/>
           <p:cNvSpPr>
             <a:spLocks noGrp="1"/>
           </p:cNvSpPr>
@@ -2193,15 +1909,15 @@
         </p:nvSpPr>
         <p:spPr>
           <a:xfrm>
-            <a:off x="839788" y="457200"/>
-            <a:ext cx="3932237" cy="1600200"/>
+            <a:off x="517432" y="361209"/>
+            <a:ext cx="2422832" cy="1264232"/>
           </a:xfrm>
         </p:spPr>
         <p:txBody>
           <a:bodyPr anchor="b"/>
           <a:lstStyle>
             <a:lvl1pPr>
-              <a:defRPr sz="3200"/>
+              <a:defRPr sz="2528"/>
             </a:lvl1pPr>
           </a:lstStyle>
           <a:p>
@@ -2209,19 +1925,13 @@
               <a:rPr lang="en-US"/>
               <a:t>Click to edit Master title style</a:t>
             </a:r>
-            <a:endParaRPr lang="en-GB"/>
-          </a:p>
-        </p:txBody>
-      </p:sp>
-      <p:sp>
-        <p:nvSpPr>
-          <p:cNvPr id="3" name="Content Placeholder 2">
-            <a:extLst>
-              <a:ext uri="{FF2B5EF4-FFF2-40B4-BE49-F238E27FC236}">
-                <a16:creationId xmlns:a16="http://schemas.microsoft.com/office/drawing/2014/main" id="{DF84D73C-07D2-434B-B577-1DBD88D1EB1B}"/>
-              </a:ext>
-            </a:extLst>
-          </p:cNvPr>
+            <a:endParaRPr lang="en-US" dirty="0"/>
+          </a:p>
+        </p:txBody>
+      </p:sp>
+      <p:sp>
+        <p:nvSpPr>
+          <p:cNvPr id="3" name="Content Placeholder 2"/>
           <p:cNvSpPr>
             <a:spLocks noGrp="1"/>
           </p:cNvSpPr>
@@ -2231,39 +1941,39 @@
         </p:nvSpPr>
         <p:spPr>
           <a:xfrm>
-            <a:off x="5183188" y="987425"/>
-            <a:ext cx="6172200" cy="4873625"/>
+            <a:off x="3193600" y="780113"/>
+            <a:ext cx="3802975" cy="3850390"/>
           </a:xfrm>
         </p:spPr>
         <p:txBody>
           <a:bodyPr/>
           <a:lstStyle>
             <a:lvl1pPr>
-              <a:defRPr sz="3200"/>
+              <a:defRPr sz="2528"/>
             </a:lvl1pPr>
             <a:lvl2pPr>
-              <a:defRPr sz="2800"/>
+              <a:defRPr sz="2212"/>
             </a:lvl2pPr>
             <a:lvl3pPr>
-              <a:defRPr sz="2400"/>
+              <a:defRPr sz="1896"/>
             </a:lvl3pPr>
             <a:lvl4pPr>
-              <a:defRPr sz="2000"/>
+              <a:defRPr sz="1580"/>
             </a:lvl4pPr>
             <a:lvl5pPr>
-              <a:defRPr sz="2000"/>
+              <a:defRPr sz="1580"/>
             </a:lvl5pPr>
             <a:lvl6pPr>
-              <a:defRPr sz="2000"/>
+              <a:defRPr sz="1580"/>
             </a:lvl6pPr>
             <a:lvl7pPr>
-              <a:defRPr sz="2000"/>
+              <a:defRPr sz="1580"/>
             </a:lvl7pPr>
             <a:lvl8pPr>
-              <a:defRPr sz="2000"/>
+              <a:defRPr sz="1580"/>
             </a:lvl8pPr>
             <a:lvl9pPr>
-              <a:defRPr sz="2000"/>
+              <a:defRPr sz="1580"/>
             </a:lvl9pPr>
           </a:lstStyle>
           <a:p>
@@ -2300,19 +2010,13 @@
               <a:rPr lang="en-US"/>
               <a:t>Fifth level</a:t>
             </a:r>
-            <a:endParaRPr lang="en-GB"/>
-          </a:p>
-        </p:txBody>
-      </p:sp>
-      <p:sp>
-        <p:nvSpPr>
-          <p:cNvPr id="4" name="Text Placeholder 3">
-            <a:extLst>
-              <a:ext uri="{FF2B5EF4-FFF2-40B4-BE49-F238E27FC236}">
-                <a16:creationId xmlns:a16="http://schemas.microsoft.com/office/drawing/2014/main" id="{633821A7-02FD-4B37-8484-F52242C9EF4C}"/>
-              </a:ext>
-            </a:extLst>
-          </p:cNvPr>
+            <a:endParaRPr lang="en-US" dirty="0"/>
+          </a:p>
+        </p:txBody>
+      </p:sp>
+      <p:sp>
+        <p:nvSpPr>
+          <p:cNvPr id="4" name="Text Placeholder 3"/>
           <p:cNvSpPr>
             <a:spLocks noGrp="1"/>
           </p:cNvSpPr>
@@ -2322,8 +2026,8 @@
         </p:nvSpPr>
         <p:spPr>
           <a:xfrm>
-            <a:off x="839788" y="2057400"/>
-            <a:ext cx="3932237" cy="3811588"/>
+            <a:off x="517432" y="1625442"/>
+            <a:ext cx="2422832" cy="3011331"/>
           </a:xfrm>
         </p:spPr>
         <p:txBody>
@@ -2331,39 +2035,39 @@
           <a:lstStyle>
             <a:lvl1pPr marL="0" indent="0">
               <a:buNone/>
-              <a:defRPr sz="1600"/>
+              <a:defRPr sz="1264"/>
             </a:lvl1pPr>
-            <a:lvl2pPr marL="457200" indent="0">
-              <a:buNone/>
-              <a:defRPr sz="1400"/>
+            <a:lvl2pPr marL="361188" indent="0">
+              <a:buNone/>
+              <a:defRPr sz="1106"/>
             </a:lvl2pPr>
-            <a:lvl3pPr marL="914400" indent="0">
-              <a:buNone/>
-              <a:defRPr sz="1200"/>
+            <a:lvl3pPr marL="722376" indent="0">
+              <a:buNone/>
+              <a:defRPr sz="948"/>
             </a:lvl3pPr>
-            <a:lvl4pPr marL="1371600" indent="0">
-              <a:buNone/>
-              <a:defRPr sz="1000"/>
+            <a:lvl4pPr marL="1083564" indent="0">
+              <a:buNone/>
+              <a:defRPr sz="790"/>
             </a:lvl4pPr>
-            <a:lvl5pPr marL="1828800" indent="0">
-              <a:buNone/>
-              <a:defRPr sz="1000"/>
+            <a:lvl5pPr marL="1444752" indent="0">
+              <a:buNone/>
+              <a:defRPr sz="790"/>
             </a:lvl5pPr>
-            <a:lvl6pPr marL="2286000" indent="0">
-              <a:buNone/>
-              <a:defRPr sz="1000"/>
+            <a:lvl6pPr marL="1805940" indent="0">
+              <a:buNone/>
+              <a:defRPr sz="790"/>
             </a:lvl6pPr>
-            <a:lvl7pPr marL="2743200" indent="0">
-              <a:buNone/>
-              <a:defRPr sz="1000"/>
+            <a:lvl7pPr marL="2167128" indent="0">
+              <a:buNone/>
+              <a:defRPr sz="790"/>
             </a:lvl7pPr>
-            <a:lvl8pPr marL="3200400" indent="0">
-              <a:buNone/>
-              <a:defRPr sz="1000"/>
+            <a:lvl8pPr marL="2528316" indent="0">
+              <a:buNone/>
+              <a:defRPr sz="790"/>
             </a:lvl8pPr>
-            <a:lvl9pPr marL="3657600" indent="0">
-              <a:buNone/>
-              <a:defRPr sz="1000"/>
+            <a:lvl9pPr marL="2889504" indent="0">
+              <a:buNone/>
+              <a:defRPr sz="790"/>
             </a:lvl9pPr>
           </a:lstStyle>
           <a:p>
@@ -2377,13 +2081,7 @@
       </p:sp>
       <p:sp>
         <p:nvSpPr>
-          <p:cNvPr id="5" name="Date Placeholder 4">
-            <a:extLst>
-              <a:ext uri="{FF2B5EF4-FFF2-40B4-BE49-F238E27FC236}">
-                <a16:creationId xmlns:a16="http://schemas.microsoft.com/office/drawing/2014/main" id="{CC3F48EF-75D0-40E5-91E3-6504D48425DC}"/>
-              </a:ext>
-            </a:extLst>
-          </p:cNvPr>
+          <p:cNvPr id="5" name="Date Placeholder 4"/>
           <p:cNvSpPr>
             <a:spLocks noGrp="1"/>
           </p:cNvSpPr>
@@ -2398,7 +2096,7 @@
           <a:p>
             <a:fld id="{E535F51F-8871-4246-9489-4500232AE892}" type="datetimeFigureOut">
               <a:rPr lang="en-GB" smtClean="0"/>
-              <a:t>13/12/2018</a:t>
+              <a:t>14/12/2018</a:t>
             </a:fld>
             <a:endParaRPr lang="en-GB"/>
           </a:p>
@@ -2406,13 +2104,7 @@
       </p:sp>
       <p:sp>
         <p:nvSpPr>
-          <p:cNvPr id="6" name="Footer Placeholder 5">
-            <a:extLst>
-              <a:ext uri="{FF2B5EF4-FFF2-40B4-BE49-F238E27FC236}">
-                <a16:creationId xmlns:a16="http://schemas.microsoft.com/office/drawing/2014/main" id="{2FD175D6-FC62-4ADA-9443-C4F9CC324B0D}"/>
-              </a:ext>
-            </a:extLst>
-          </p:cNvPr>
+          <p:cNvPr id="6" name="Footer Placeholder 5"/>
           <p:cNvSpPr>
             <a:spLocks noGrp="1"/>
           </p:cNvSpPr>
@@ -2431,13 +2123,7 @@
       </p:sp>
       <p:sp>
         <p:nvSpPr>
-          <p:cNvPr id="7" name="Slide Number Placeholder 6">
-            <a:extLst>
-              <a:ext uri="{FF2B5EF4-FFF2-40B4-BE49-F238E27FC236}">
-                <a16:creationId xmlns:a16="http://schemas.microsoft.com/office/drawing/2014/main" id="{0531F8B1-5F65-41E9-BEF8-1ADD49EA5617}"/>
-              </a:ext>
-            </a:extLst>
-          </p:cNvPr>
+          <p:cNvPr id="7" name="Slide Number Placeholder 6"/>
           <p:cNvSpPr>
             <a:spLocks noGrp="1"/>
           </p:cNvSpPr>
@@ -2461,7 +2147,7 @@
     </p:spTree>
     <p:extLst>
       <p:ext uri="{BB962C8B-B14F-4D97-AF65-F5344CB8AC3E}">
-        <p14:creationId xmlns:p14="http://schemas.microsoft.com/office/powerpoint/2010/main" val="3801584953"/>
+        <p14:creationId xmlns:p14="http://schemas.microsoft.com/office/powerpoint/2010/main" val="305894708"/>
       </p:ext>
     </p:extLst>
   </p:cSld>
@@ -2490,13 +2176,7 @@
       </p:grpSpPr>
       <p:sp>
         <p:nvSpPr>
-          <p:cNvPr id="2" name="Title 1">
-            <a:extLst>
-              <a:ext uri="{FF2B5EF4-FFF2-40B4-BE49-F238E27FC236}">
-                <a16:creationId xmlns:a16="http://schemas.microsoft.com/office/drawing/2014/main" id="{73602AA3-1EF9-467D-AC00-A4EE0E205556}"/>
-              </a:ext>
-            </a:extLst>
-          </p:cNvPr>
+          <p:cNvPr id="2" name="Title 1"/>
           <p:cNvSpPr>
             <a:spLocks noGrp="1"/>
           </p:cNvSpPr>
@@ -2506,15 +2186,15 @@
         </p:nvSpPr>
         <p:spPr>
           <a:xfrm>
-            <a:off x="839788" y="457200"/>
-            <a:ext cx="3932237" cy="1600200"/>
+            <a:off x="517432" y="361209"/>
+            <a:ext cx="2422832" cy="1264232"/>
           </a:xfrm>
         </p:spPr>
         <p:txBody>
           <a:bodyPr anchor="b"/>
           <a:lstStyle>
             <a:lvl1pPr>
-              <a:defRPr sz="3200"/>
+              <a:defRPr sz="2528"/>
             </a:lvl1pPr>
           </a:lstStyle>
           <a:p>
@@ -2522,21 +2202,15 @@
               <a:rPr lang="en-US"/>
               <a:t>Click to edit Master title style</a:t>
             </a:r>
-            <a:endParaRPr lang="en-GB"/>
-          </a:p>
-        </p:txBody>
-      </p:sp>
-      <p:sp>
-        <p:nvSpPr>
-          <p:cNvPr id="3" name="Picture Placeholder 2">
-            <a:extLst>
-              <a:ext uri="{FF2B5EF4-FFF2-40B4-BE49-F238E27FC236}">
-                <a16:creationId xmlns:a16="http://schemas.microsoft.com/office/drawing/2014/main" id="{4F42F4C1-EEBD-4199-8353-15AD51B5FEE8}"/>
-              </a:ext>
-            </a:extLst>
-          </p:cNvPr>
-          <p:cNvSpPr>
-            <a:spLocks noGrp="1"/>
+            <a:endParaRPr lang="en-US" dirty="0"/>
+          </a:p>
+        </p:txBody>
+      </p:sp>
+      <p:sp>
+        <p:nvSpPr>
+          <p:cNvPr id="3" name="Picture Placeholder 2"/>
+          <p:cNvSpPr>
+            <a:spLocks noGrp="1" noChangeAspect="1"/>
           </p:cNvSpPr>
           <p:nvPr>
             <p:ph type="pic" idx="1"/>
@@ -2544,8 +2218,73 @@
         </p:nvSpPr>
         <p:spPr>
           <a:xfrm>
-            <a:off x="5183188" y="987425"/>
-            <a:ext cx="6172200" cy="4873625"/>
+            <a:off x="3193600" y="780113"/>
+            <a:ext cx="3802975" cy="3850390"/>
+          </a:xfrm>
+        </p:spPr>
+        <p:txBody>
+          <a:bodyPr anchor="t"/>
+          <a:lstStyle>
+            <a:lvl1pPr marL="0" indent="0">
+              <a:buNone/>
+              <a:defRPr sz="2528"/>
+            </a:lvl1pPr>
+            <a:lvl2pPr marL="361188" indent="0">
+              <a:buNone/>
+              <a:defRPr sz="2212"/>
+            </a:lvl2pPr>
+            <a:lvl3pPr marL="722376" indent="0">
+              <a:buNone/>
+              <a:defRPr sz="1896"/>
+            </a:lvl3pPr>
+            <a:lvl4pPr marL="1083564" indent="0">
+              <a:buNone/>
+              <a:defRPr sz="1580"/>
+            </a:lvl4pPr>
+            <a:lvl5pPr marL="1444752" indent="0">
+              <a:buNone/>
+              <a:defRPr sz="1580"/>
+            </a:lvl5pPr>
+            <a:lvl6pPr marL="1805940" indent="0">
+              <a:buNone/>
+              <a:defRPr sz="1580"/>
+            </a:lvl6pPr>
+            <a:lvl7pPr marL="2167128" indent="0">
+              <a:buNone/>
+              <a:defRPr sz="1580"/>
+            </a:lvl7pPr>
+            <a:lvl8pPr marL="2528316" indent="0">
+              <a:buNone/>
+              <a:defRPr sz="1580"/>
+            </a:lvl8pPr>
+            <a:lvl9pPr marL="2889504" indent="0">
+              <a:buNone/>
+              <a:defRPr sz="1580"/>
+            </a:lvl9pPr>
+          </a:lstStyle>
+          <a:p>
+            <a:r>
+              <a:rPr lang="en-US"/>
+              <a:t>Click icon to add picture</a:t>
+            </a:r>
+            <a:endParaRPr lang="en-US" dirty="0"/>
+          </a:p>
+        </p:txBody>
+      </p:sp>
+      <p:sp>
+        <p:nvSpPr>
+          <p:cNvPr id="4" name="Text Placeholder 3"/>
+          <p:cNvSpPr>
+            <a:spLocks noGrp="1"/>
+          </p:cNvSpPr>
+          <p:nvPr>
+            <p:ph type="body" sz="half" idx="2"/>
+          </p:nvPr>
+        </p:nvSpPr>
+        <p:spPr>
+          <a:xfrm>
+            <a:off x="517432" y="1625442"/>
+            <a:ext cx="2422832" cy="3011331"/>
           </a:xfrm>
         </p:spPr>
         <p:txBody>
@@ -2553,109 +2292,42 @@
           <a:lstStyle>
             <a:lvl1pPr marL="0" indent="0">
               <a:buNone/>
-              <a:defRPr sz="3200"/>
+              <a:defRPr sz="1264"/>
             </a:lvl1pPr>
-            <a:lvl2pPr marL="457200" indent="0">
-              <a:buNone/>
-              <a:defRPr sz="2800"/>
+            <a:lvl2pPr marL="361188" indent="0">
+              <a:buNone/>
+              <a:defRPr sz="1106"/>
             </a:lvl2pPr>
-            <a:lvl3pPr marL="914400" indent="0">
-              <a:buNone/>
-              <a:defRPr sz="2400"/>
+            <a:lvl3pPr marL="722376" indent="0">
+              <a:buNone/>
+              <a:defRPr sz="948"/>
             </a:lvl3pPr>
-            <a:lvl4pPr marL="1371600" indent="0">
-              <a:buNone/>
-              <a:defRPr sz="2000"/>
+            <a:lvl4pPr marL="1083564" indent="0">
+              <a:buNone/>
+              <a:defRPr sz="790"/>
             </a:lvl4pPr>
-            <a:lvl5pPr marL="1828800" indent="0">
-              <a:buNone/>
-              <a:defRPr sz="2000"/>
+            <a:lvl5pPr marL="1444752" indent="0">
+              <a:buNone/>
+              <a:defRPr sz="790"/>
             </a:lvl5pPr>
-            <a:lvl6pPr marL="2286000" indent="0">
-              <a:buNone/>
-              <a:defRPr sz="2000"/>
+            <a:lvl6pPr marL="1805940" indent="0">
+              <a:buNone/>
+              <a:defRPr sz="790"/>
             </a:lvl6pPr>
-            <a:lvl7pPr marL="2743200" indent="0">
-              <a:buNone/>
-              <a:defRPr sz="2000"/>
+            <a:lvl7pPr marL="2167128" indent="0">
+              <a:buNone/>
+              <a:defRPr sz="790"/>
             </a:lvl7pPr>
-            <a:lvl8pPr marL="3200400" indent="0">
-              <a:buNone/>
-              <a:defRPr sz="2000"/>
+            <a:lvl8pPr marL="2528316" indent="0">
+              <a:buNone/>
+              <a:defRPr sz="790"/>
             </a:lvl8pPr>
-            <a:lvl9pPr marL="3657600" indent="0">
-              <a:buNone/>
-              <a:defRPr sz="2000"/>
+            <a:lvl9pPr marL="2889504" indent="0">
+              <a:buNone/>
+              <a:defRPr sz="790"/>
             </a:lvl9pPr>
           </a:lstStyle>
           <a:p>
-            <a:endParaRPr lang="en-GB"/>
-          </a:p>
-        </p:txBody>
-      </p:sp>
-      <p:sp>
-        <p:nvSpPr>
-          <p:cNvPr id="4" name="Text Placeholder 3">
-            <a:extLst>
-              <a:ext uri="{FF2B5EF4-FFF2-40B4-BE49-F238E27FC236}">
-                <a16:creationId xmlns:a16="http://schemas.microsoft.com/office/drawing/2014/main" id="{5B38BBF5-DD0D-4438-BC5A-C38BAEBEB990}"/>
-              </a:ext>
-            </a:extLst>
-          </p:cNvPr>
-          <p:cNvSpPr>
-            <a:spLocks noGrp="1"/>
-          </p:cNvSpPr>
-          <p:nvPr>
-            <p:ph type="body" sz="half" idx="2"/>
-          </p:nvPr>
-        </p:nvSpPr>
-        <p:spPr>
-          <a:xfrm>
-            <a:off x="839788" y="2057400"/>
-            <a:ext cx="3932237" cy="3811588"/>
-          </a:xfrm>
-        </p:spPr>
-        <p:txBody>
-          <a:bodyPr/>
-          <a:lstStyle>
-            <a:lvl1pPr marL="0" indent="0">
-              <a:buNone/>
-              <a:defRPr sz="1600"/>
-            </a:lvl1pPr>
-            <a:lvl2pPr marL="457200" indent="0">
-              <a:buNone/>
-              <a:defRPr sz="1400"/>
-            </a:lvl2pPr>
-            <a:lvl3pPr marL="914400" indent="0">
-              <a:buNone/>
-              <a:defRPr sz="1200"/>
-            </a:lvl3pPr>
-            <a:lvl4pPr marL="1371600" indent="0">
-              <a:buNone/>
-              <a:defRPr sz="1000"/>
-            </a:lvl4pPr>
-            <a:lvl5pPr marL="1828800" indent="0">
-              <a:buNone/>
-              <a:defRPr sz="1000"/>
-            </a:lvl5pPr>
-            <a:lvl6pPr marL="2286000" indent="0">
-              <a:buNone/>
-              <a:defRPr sz="1000"/>
-            </a:lvl6pPr>
-            <a:lvl7pPr marL="2743200" indent="0">
-              <a:buNone/>
-              <a:defRPr sz="1000"/>
-            </a:lvl7pPr>
-            <a:lvl8pPr marL="3200400" indent="0">
-              <a:buNone/>
-              <a:defRPr sz="1000"/>
-            </a:lvl8pPr>
-            <a:lvl9pPr marL="3657600" indent="0">
-              <a:buNone/>
-              <a:defRPr sz="1000"/>
-            </a:lvl9pPr>
-          </a:lstStyle>
-          <a:p>
             <a:pPr lvl="0"/>
             <a:r>
               <a:rPr lang="en-US"/>
@@ -2666,13 +2338,7 @@
       </p:sp>
       <p:sp>
         <p:nvSpPr>
-          <p:cNvPr id="5" name="Date Placeholder 4">
-            <a:extLst>
-              <a:ext uri="{FF2B5EF4-FFF2-40B4-BE49-F238E27FC236}">
-                <a16:creationId xmlns:a16="http://schemas.microsoft.com/office/drawing/2014/main" id="{E70D69E0-2414-4583-97EF-3CCB1BD11726}"/>
-              </a:ext>
-            </a:extLst>
-          </p:cNvPr>
+          <p:cNvPr id="5" name="Date Placeholder 4"/>
           <p:cNvSpPr>
             <a:spLocks noGrp="1"/>
           </p:cNvSpPr>
@@ -2687,7 +2353,7 @@
           <a:p>
             <a:fld id="{E535F51F-8871-4246-9489-4500232AE892}" type="datetimeFigureOut">
               <a:rPr lang="en-GB" smtClean="0"/>
-              <a:t>13/12/2018</a:t>
+              <a:t>14/12/2018</a:t>
             </a:fld>
             <a:endParaRPr lang="en-GB"/>
           </a:p>
@@ -2695,13 +2361,7 @@
       </p:sp>
       <p:sp>
         <p:nvSpPr>
-          <p:cNvPr id="6" name="Footer Placeholder 5">
-            <a:extLst>
-              <a:ext uri="{FF2B5EF4-FFF2-40B4-BE49-F238E27FC236}">
-                <a16:creationId xmlns:a16="http://schemas.microsoft.com/office/drawing/2014/main" id="{396AB3B7-4C5D-41E7-ACBD-80E1E719F0C0}"/>
-              </a:ext>
-            </a:extLst>
-          </p:cNvPr>
+          <p:cNvPr id="6" name="Footer Placeholder 5"/>
           <p:cNvSpPr>
             <a:spLocks noGrp="1"/>
           </p:cNvSpPr>
@@ -2720,13 +2380,7 @@
       </p:sp>
       <p:sp>
         <p:nvSpPr>
-          <p:cNvPr id="7" name="Slide Number Placeholder 6">
-            <a:extLst>
-              <a:ext uri="{FF2B5EF4-FFF2-40B4-BE49-F238E27FC236}">
-                <a16:creationId xmlns:a16="http://schemas.microsoft.com/office/drawing/2014/main" id="{C9260FAC-5B1D-4CE0-AA8E-70D53E63F442}"/>
-              </a:ext>
-            </a:extLst>
-          </p:cNvPr>
+          <p:cNvPr id="7" name="Slide Number Placeholder 6"/>
           <p:cNvSpPr>
             <a:spLocks noGrp="1"/>
           </p:cNvSpPr>
@@ -2750,7 +2404,7 @@
     </p:spTree>
     <p:extLst>
       <p:ext uri="{BB962C8B-B14F-4D97-AF65-F5344CB8AC3E}">
-        <p14:creationId xmlns:p14="http://schemas.microsoft.com/office/powerpoint/2010/main" val="111999489"/>
+        <p14:creationId xmlns:p14="http://schemas.microsoft.com/office/powerpoint/2010/main" val="1920427633"/>
       </p:ext>
     </p:extLst>
   </p:cSld>
@@ -2784,13 +2438,7 @@
       </p:grpSpPr>
       <p:sp>
         <p:nvSpPr>
-          <p:cNvPr id="2" name="Title Placeholder 1">
-            <a:extLst>
-              <a:ext uri="{FF2B5EF4-FFF2-40B4-BE49-F238E27FC236}">
-                <a16:creationId xmlns:a16="http://schemas.microsoft.com/office/drawing/2014/main" id="{DF1870E3-02B0-4630-8EEC-3E85DFEC6091}"/>
-              </a:ext>
-            </a:extLst>
-          </p:cNvPr>
+          <p:cNvPr id="2" name="Title Placeholder 1"/>
           <p:cNvSpPr>
             <a:spLocks noGrp="1"/>
           </p:cNvSpPr>
@@ -2800,8 +2448,8 @@
         </p:nvSpPr>
         <p:spPr>
           <a:xfrm>
-            <a:off x="838200" y="365125"/>
-            <a:ext cx="10515600" cy="1325563"/>
+            <a:off x="516454" y="288467"/>
+            <a:ext cx="6479143" cy="1047256"/>
           </a:xfrm>
           <a:prstGeom prst="rect">
             <a:avLst/>
@@ -2817,19 +2465,13 @@
               <a:rPr lang="en-US"/>
               <a:t>Click to edit Master title style</a:t>
             </a:r>
-            <a:endParaRPr lang="en-GB"/>
-          </a:p>
-        </p:txBody>
-      </p:sp>
-      <p:sp>
-        <p:nvSpPr>
-          <p:cNvPr id="3" name="Text Placeholder 2">
-            <a:extLst>
-              <a:ext uri="{FF2B5EF4-FFF2-40B4-BE49-F238E27FC236}">
-                <a16:creationId xmlns:a16="http://schemas.microsoft.com/office/drawing/2014/main" id="{64EF3C89-EC87-4C98-94FC-03094BA429CD}"/>
-              </a:ext>
-            </a:extLst>
-          </p:cNvPr>
+            <a:endParaRPr lang="en-US" dirty="0"/>
+          </a:p>
+        </p:txBody>
+      </p:sp>
+      <p:sp>
+        <p:nvSpPr>
+          <p:cNvPr id="3" name="Text Placeholder 2"/>
           <p:cNvSpPr>
             <a:spLocks noGrp="1"/>
           </p:cNvSpPr>
@@ -2839,8 +2481,8 @@
         </p:nvSpPr>
         <p:spPr>
           <a:xfrm>
-            <a:off x="838200" y="1825625"/>
-            <a:ext cx="10515600" cy="4351338"/>
+            <a:off x="516454" y="1442328"/>
+            <a:ext cx="6479143" cy="3437759"/>
           </a:xfrm>
           <a:prstGeom prst="rect">
             <a:avLst/>
@@ -2885,19 +2527,13 @@
               <a:rPr lang="en-US"/>
               <a:t>Fifth level</a:t>
             </a:r>
-            <a:endParaRPr lang="en-GB"/>
-          </a:p>
-        </p:txBody>
-      </p:sp>
-      <p:sp>
-        <p:nvSpPr>
-          <p:cNvPr id="4" name="Date Placeholder 3">
-            <a:extLst>
-              <a:ext uri="{FF2B5EF4-FFF2-40B4-BE49-F238E27FC236}">
-                <a16:creationId xmlns:a16="http://schemas.microsoft.com/office/drawing/2014/main" id="{8CEA8CCF-6398-475B-A462-7992A3B80BB1}"/>
-              </a:ext>
-            </a:extLst>
-          </p:cNvPr>
+            <a:endParaRPr lang="en-US" dirty="0"/>
+          </a:p>
+        </p:txBody>
+      </p:sp>
+      <p:sp>
+        <p:nvSpPr>
+          <p:cNvPr id="4" name="Date Placeholder 3"/>
           <p:cNvSpPr>
             <a:spLocks noGrp="1"/>
           </p:cNvSpPr>
@@ -2907,8 +2543,8 @@
         </p:nvSpPr>
         <p:spPr>
           <a:xfrm>
-            <a:off x="838200" y="6356350"/>
-            <a:ext cx="2743200" cy="365125"/>
+            <a:off x="516454" y="5021812"/>
+            <a:ext cx="1690211" cy="288466"/>
           </a:xfrm>
           <a:prstGeom prst="rect">
             <a:avLst/>
@@ -2918,7 +2554,7 @@
           <a:bodyPr vert="horz" lIns="91440" tIns="45720" rIns="91440" bIns="45720" rtlCol="0" anchor="ctr"/>
           <a:lstStyle>
             <a:lvl1pPr algn="l">
-              <a:defRPr sz="1200">
+              <a:defRPr sz="948">
                 <a:solidFill>
                   <a:schemeClr val="tx1">
                     <a:tint val="75000"/>
@@ -2930,7 +2566,7 @@
           <a:p>
             <a:fld id="{E535F51F-8871-4246-9489-4500232AE892}" type="datetimeFigureOut">
               <a:rPr lang="en-GB" smtClean="0"/>
-              <a:t>13/12/2018</a:t>
+              <a:t>14/12/2018</a:t>
             </a:fld>
             <a:endParaRPr lang="en-GB"/>
           </a:p>
@@ -2938,13 +2574,7 @@
       </p:sp>
       <p:sp>
         <p:nvSpPr>
-          <p:cNvPr id="5" name="Footer Placeholder 4">
-            <a:extLst>
-              <a:ext uri="{FF2B5EF4-FFF2-40B4-BE49-F238E27FC236}">
-                <a16:creationId xmlns:a16="http://schemas.microsoft.com/office/drawing/2014/main" id="{87C1C246-C089-4F25-9730-7A8AE6EC7A6F}"/>
-              </a:ext>
-            </a:extLst>
-          </p:cNvPr>
+          <p:cNvPr id="5" name="Footer Placeholder 4"/>
           <p:cNvSpPr>
             <a:spLocks noGrp="1"/>
           </p:cNvSpPr>
@@ -2954,8 +2584,8 @@
         </p:nvSpPr>
         <p:spPr>
           <a:xfrm>
-            <a:off x="4038600" y="6356350"/>
-            <a:ext cx="4114800" cy="365125"/>
+            <a:off x="2488367" y="5021812"/>
+            <a:ext cx="2535317" cy="288466"/>
           </a:xfrm>
           <a:prstGeom prst="rect">
             <a:avLst/>
@@ -2965,7 +2595,7 @@
           <a:bodyPr vert="horz" lIns="91440" tIns="45720" rIns="91440" bIns="45720" rtlCol="0" anchor="ctr"/>
           <a:lstStyle>
             <a:lvl1pPr algn="ctr">
-              <a:defRPr sz="1200">
+              <a:defRPr sz="948">
                 <a:solidFill>
                   <a:schemeClr val="tx1">
                     <a:tint val="75000"/>
@@ -2981,13 +2611,7 @@
       </p:sp>
       <p:sp>
         <p:nvSpPr>
-          <p:cNvPr id="6" name="Slide Number Placeholder 5">
-            <a:extLst>
-              <a:ext uri="{FF2B5EF4-FFF2-40B4-BE49-F238E27FC236}">
-                <a16:creationId xmlns:a16="http://schemas.microsoft.com/office/drawing/2014/main" id="{7305E53B-3446-47B9-A5C9-FEBCBA7DE19E}"/>
-              </a:ext>
-            </a:extLst>
-          </p:cNvPr>
+          <p:cNvPr id="6" name="Slide Number Placeholder 5"/>
           <p:cNvSpPr>
             <a:spLocks noGrp="1"/>
           </p:cNvSpPr>
@@ -2997,8 +2621,8 @@
         </p:nvSpPr>
         <p:spPr>
           <a:xfrm>
-            <a:off x="8610600" y="6356350"/>
-            <a:ext cx="2743200" cy="365125"/>
+            <a:off x="5305385" y="5021812"/>
+            <a:ext cx="1690211" cy="288466"/>
           </a:xfrm>
           <a:prstGeom prst="rect">
             <a:avLst/>
@@ -3008,7 +2632,7 @@
           <a:bodyPr vert="horz" lIns="91440" tIns="45720" rIns="91440" bIns="45720" rtlCol="0" anchor="ctr"/>
           <a:lstStyle>
             <a:lvl1pPr algn="r">
-              <a:defRPr sz="1200">
+              <a:defRPr sz="948">
                 <a:solidFill>
                   <a:schemeClr val="tx1">
                     <a:tint val="75000"/>
@@ -3029,27 +2653,27 @@
     </p:spTree>
     <p:extLst>
       <p:ext uri="{BB962C8B-B14F-4D97-AF65-F5344CB8AC3E}">
-        <p14:creationId xmlns:p14="http://schemas.microsoft.com/office/powerpoint/2010/main" val="688414107"/>
+        <p14:creationId xmlns:p14="http://schemas.microsoft.com/office/powerpoint/2010/main" val="3074050487"/>
       </p:ext>
     </p:extLst>
   </p:cSld>
   <p:clrMap bg1="lt1" tx1="dk1" bg2="lt2" tx2="dk2" accent1="accent1" accent2="accent2" accent3="accent3" accent4="accent4" accent5="accent5" accent6="accent6" hlink="hlink" folHlink="folHlink"/>
   <p:sldLayoutIdLst>
-    <p:sldLayoutId id="2147483649" r:id="rId1"/>
-    <p:sldLayoutId id="2147483650" r:id="rId2"/>
-    <p:sldLayoutId id="2147483651" r:id="rId3"/>
-    <p:sldLayoutId id="2147483652" r:id="rId4"/>
-    <p:sldLayoutId id="2147483653" r:id="rId5"/>
-    <p:sldLayoutId id="2147483654" r:id="rId6"/>
-    <p:sldLayoutId id="2147483655" r:id="rId7"/>
-    <p:sldLayoutId id="2147483656" r:id="rId8"/>
-    <p:sldLayoutId id="2147483657" r:id="rId9"/>
-    <p:sldLayoutId id="2147483658" r:id="rId10"/>
-    <p:sldLayoutId id="2147483659" r:id="rId11"/>
+    <p:sldLayoutId id="2147483661" r:id="rId1"/>
+    <p:sldLayoutId id="2147483662" r:id="rId2"/>
+    <p:sldLayoutId id="2147483663" r:id="rId3"/>
+    <p:sldLayoutId id="2147483664" r:id="rId4"/>
+    <p:sldLayoutId id="2147483665" r:id="rId5"/>
+    <p:sldLayoutId id="2147483666" r:id="rId6"/>
+    <p:sldLayoutId id="2147483667" r:id="rId7"/>
+    <p:sldLayoutId id="2147483668" r:id="rId8"/>
+    <p:sldLayoutId id="2147483669" r:id="rId9"/>
+    <p:sldLayoutId id="2147483670" r:id="rId10"/>
+    <p:sldLayoutId id="2147483671" r:id="rId11"/>
   </p:sldLayoutIdLst>
   <p:txStyles>
     <p:titleStyle>
-      <a:lvl1pPr algn="l" defTabSz="914400" rtl="0" eaLnBrk="1" latinLnBrk="0" hangingPunct="1">
+      <a:lvl1pPr algn="l" defTabSz="722376" rtl="0" eaLnBrk="1" latinLnBrk="0" hangingPunct="1">
         <a:lnSpc>
           <a:spcPct val="90000"/>
         </a:lnSpc>
@@ -3057,7 +2681,7 @@
           <a:spcPct val="0"/>
         </a:spcBef>
         <a:buNone/>
-        <a:defRPr sz="4400" kern="1200">
+        <a:defRPr sz="3476" kern="1200">
           <a:solidFill>
             <a:schemeClr val="tx1"/>
           </a:solidFill>
@@ -3068,16 +2692,16 @@
       </a:lvl1pPr>
     </p:titleStyle>
     <p:bodyStyle>
-      <a:lvl1pPr marL="228600" indent="-228600" algn="l" defTabSz="914400" rtl="0" eaLnBrk="1" latinLnBrk="0" hangingPunct="1">
+      <a:lvl1pPr marL="180594" indent="-180594" algn="l" defTabSz="722376" rtl="0" eaLnBrk="1" latinLnBrk="0" hangingPunct="1">
         <a:lnSpc>
           <a:spcPct val="90000"/>
         </a:lnSpc>
         <a:spcBef>
-          <a:spcPts val="1000"/>
+          <a:spcPts val="790"/>
         </a:spcBef>
         <a:buFont typeface="Arial" panose="020B0604020202020204" pitchFamily="34" charset="0"/>
         <a:buChar char="•"/>
-        <a:defRPr sz="2800" kern="1200">
+        <a:defRPr sz="2212" kern="1200">
           <a:solidFill>
             <a:schemeClr val="tx1"/>
           </a:solidFill>
@@ -3086,16 +2710,16 @@
           <a:cs typeface="+mn-cs"/>
         </a:defRPr>
       </a:lvl1pPr>
-      <a:lvl2pPr marL="685800" indent="-228600" algn="l" defTabSz="914400" rtl="0" eaLnBrk="1" latinLnBrk="0" hangingPunct="1">
+      <a:lvl2pPr marL="541782" indent="-180594" algn="l" defTabSz="722376" rtl="0" eaLnBrk="1" latinLnBrk="0" hangingPunct="1">
         <a:lnSpc>
           <a:spcPct val="90000"/>
         </a:lnSpc>
         <a:spcBef>
-          <a:spcPts val="500"/>
+          <a:spcPts val="395"/>
         </a:spcBef>
         <a:buFont typeface="Arial" panose="020B0604020202020204" pitchFamily="34" charset="0"/>
         <a:buChar char="•"/>
-        <a:defRPr sz="2400" kern="1200">
+        <a:defRPr sz="1896" kern="1200">
           <a:solidFill>
             <a:schemeClr val="tx1"/>
           </a:solidFill>
@@ -3104,16 +2728,16 @@
           <a:cs typeface="+mn-cs"/>
         </a:defRPr>
       </a:lvl2pPr>
-      <a:lvl3pPr marL="1143000" indent="-228600" algn="l" defTabSz="914400" rtl="0" eaLnBrk="1" latinLnBrk="0" hangingPunct="1">
+      <a:lvl3pPr marL="902970" indent="-180594" algn="l" defTabSz="722376" rtl="0" eaLnBrk="1" latinLnBrk="0" hangingPunct="1">
         <a:lnSpc>
           <a:spcPct val="90000"/>
         </a:lnSpc>
         <a:spcBef>
-          <a:spcPts val="500"/>
+          <a:spcPts val="395"/>
         </a:spcBef>
         <a:buFont typeface="Arial" panose="020B0604020202020204" pitchFamily="34" charset="0"/>
         <a:buChar char="•"/>
-        <a:defRPr sz="2000" kern="1200">
+        <a:defRPr sz="1580" kern="1200">
           <a:solidFill>
             <a:schemeClr val="tx1"/>
           </a:solidFill>
@@ -3122,16 +2746,16 @@
           <a:cs typeface="+mn-cs"/>
         </a:defRPr>
       </a:lvl3pPr>
-      <a:lvl4pPr marL="1600200" indent="-228600" algn="l" defTabSz="914400" rtl="0" eaLnBrk="1" latinLnBrk="0" hangingPunct="1">
+      <a:lvl4pPr marL="1264158" indent="-180594" algn="l" defTabSz="722376" rtl="0" eaLnBrk="1" latinLnBrk="0" hangingPunct="1">
         <a:lnSpc>
           <a:spcPct val="90000"/>
         </a:lnSpc>
         <a:spcBef>
-          <a:spcPts val="500"/>
+          <a:spcPts val="395"/>
         </a:spcBef>
         <a:buFont typeface="Arial" panose="020B0604020202020204" pitchFamily="34" charset="0"/>
         <a:buChar char="•"/>
-        <a:defRPr sz="1800" kern="1200">
+        <a:defRPr sz="1422" kern="1200">
           <a:solidFill>
             <a:schemeClr val="tx1"/>
           </a:solidFill>
@@ -3140,16 +2764,16 @@
           <a:cs typeface="+mn-cs"/>
         </a:defRPr>
       </a:lvl4pPr>
-      <a:lvl5pPr marL="2057400" indent="-228600" algn="l" defTabSz="914400" rtl="0" eaLnBrk="1" latinLnBrk="0" hangingPunct="1">
+      <a:lvl5pPr marL="1625346" indent="-180594" algn="l" defTabSz="722376" rtl="0" eaLnBrk="1" latinLnBrk="0" hangingPunct="1">
         <a:lnSpc>
           <a:spcPct val="90000"/>
         </a:lnSpc>
         <a:spcBef>
-          <a:spcPts val="500"/>
+          <a:spcPts val="395"/>
         </a:spcBef>
         <a:buFont typeface="Arial" panose="020B0604020202020204" pitchFamily="34" charset="0"/>
         <a:buChar char="•"/>
-        <a:defRPr sz="1800" kern="1200">
+        <a:defRPr sz="1422" kern="1200">
           <a:solidFill>
             <a:schemeClr val="tx1"/>
           </a:solidFill>
@@ -3158,16 +2782,16 @@
           <a:cs typeface="+mn-cs"/>
         </a:defRPr>
       </a:lvl5pPr>
-      <a:lvl6pPr marL="2514600" indent="-228600" algn="l" defTabSz="914400" rtl="0" eaLnBrk="1" latinLnBrk="0" hangingPunct="1">
+      <a:lvl6pPr marL="1986534" indent="-180594" algn="l" defTabSz="722376" rtl="0" eaLnBrk="1" latinLnBrk="0" hangingPunct="1">
         <a:lnSpc>
           <a:spcPct val="90000"/>
         </a:lnSpc>
         <a:spcBef>
-          <a:spcPts val="500"/>
+          <a:spcPts val="395"/>
         </a:spcBef>
         <a:buFont typeface="Arial" panose="020B0604020202020204" pitchFamily="34" charset="0"/>
         <a:buChar char="•"/>
-        <a:defRPr sz="1800" kern="1200">
+        <a:defRPr sz="1422" kern="1200">
           <a:solidFill>
             <a:schemeClr val="tx1"/>
           </a:solidFill>
@@ -3176,16 +2800,16 @@
           <a:cs typeface="+mn-cs"/>
         </a:defRPr>
       </a:lvl6pPr>
-      <a:lvl7pPr marL="2971800" indent="-228600" algn="l" defTabSz="914400" rtl="0" eaLnBrk="1" latinLnBrk="0" hangingPunct="1">
+      <a:lvl7pPr marL="2347722" indent="-180594" algn="l" defTabSz="722376" rtl="0" eaLnBrk="1" latinLnBrk="0" hangingPunct="1">
         <a:lnSpc>
           <a:spcPct val="90000"/>
         </a:lnSpc>
         <a:spcBef>
-          <a:spcPts val="500"/>
+          <a:spcPts val="395"/>
         </a:spcBef>
         <a:buFont typeface="Arial" panose="020B0604020202020204" pitchFamily="34" charset="0"/>
         <a:buChar char="•"/>
-        <a:defRPr sz="1800" kern="1200">
+        <a:defRPr sz="1422" kern="1200">
           <a:solidFill>
             <a:schemeClr val="tx1"/>
           </a:solidFill>
@@ -3194,16 +2818,16 @@
           <a:cs typeface="+mn-cs"/>
         </a:defRPr>
       </a:lvl7pPr>
-      <a:lvl8pPr marL="3429000" indent="-228600" algn="l" defTabSz="914400" rtl="0" eaLnBrk="1" latinLnBrk="0" hangingPunct="1">
+      <a:lvl8pPr marL="2708910" indent="-180594" algn="l" defTabSz="722376" rtl="0" eaLnBrk="1" latinLnBrk="0" hangingPunct="1">
         <a:lnSpc>
           <a:spcPct val="90000"/>
         </a:lnSpc>
         <a:spcBef>
-          <a:spcPts val="500"/>
+          <a:spcPts val="395"/>
         </a:spcBef>
         <a:buFont typeface="Arial" panose="020B0604020202020204" pitchFamily="34" charset="0"/>
         <a:buChar char="•"/>
-        <a:defRPr sz="1800" kern="1200">
+        <a:defRPr sz="1422" kern="1200">
           <a:solidFill>
             <a:schemeClr val="tx1"/>
           </a:solidFill>
@@ -3212,16 +2836,16 @@
           <a:cs typeface="+mn-cs"/>
         </a:defRPr>
       </a:lvl8pPr>
-      <a:lvl9pPr marL="3886200" indent="-228600" algn="l" defTabSz="914400" rtl="0" eaLnBrk="1" latinLnBrk="0" hangingPunct="1">
+      <a:lvl9pPr marL="3070098" indent="-180594" algn="l" defTabSz="722376" rtl="0" eaLnBrk="1" latinLnBrk="0" hangingPunct="1">
         <a:lnSpc>
           <a:spcPct val="90000"/>
         </a:lnSpc>
         <a:spcBef>
-          <a:spcPts val="500"/>
+          <a:spcPts val="395"/>
         </a:spcBef>
         <a:buFont typeface="Arial" panose="020B0604020202020204" pitchFamily="34" charset="0"/>
         <a:buChar char="•"/>
-        <a:defRPr sz="1800" kern="1200">
+        <a:defRPr sz="1422" kern="1200">
           <a:solidFill>
             <a:schemeClr val="tx1"/>
           </a:solidFill>
@@ -3235,8 +2859,8 @@
       <a:defPPr>
         <a:defRPr lang="en-US"/>
       </a:defPPr>
-      <a:lvl1pPr marL="0" algn="l" defTabSz="914400" rtl="0" eaLnBrk="1" latinLnBrk="0" hangingPunct="1">
-        <a:defRPr sz="1800" kern="1200">
+      <a:lvl1pPr marL="0" algn="l" defTabSz="722376" rtl="0" eaLnBrk="1" latinLnBrk="0" hangingPunct="1">
+        <a:defRPr sz="1422" kern="1200">
           <a:solidFill>
             <a:schemeClr val="tx1"/>
           </a:solidFill>
@@ -3245,8 +2869,8 @@
           <a:cs typeface="+mn-cs"/>
         </a:defRPr>
       </a:lvl1pPr>
-      <a:lvl2pPr marL="457200" algn="l" defTabSz="914400" rtl="0" eaLnBrk="1" latinLnBrk="0" hangingPunct="1">
-        <a:defRPr sz="1800" kern="1200">
+      <a:lvl2pPr marL="361188" algn="l" defTabSz="722376" rtl="0" eaLnBrk="1" latinLnBrk="0" hangingPunct="1">
+        <a:defRPr sz="1422" kern="1200">
           <a:solidFill>
             <a:schemeClr val="tx1"/>
           </a:solidFill>
@@ -3255,8 +2879,8 @@
           <a:cs typeface="+mn-cs"/>
         </a:defRPr>
       </a:lvl2pPr>
-      <a:lvl3pPr marL="914400" algn="l" defTabSz="914400" rtl="0" eaLnBrk="1" latinLnBrk="0" hangingPunct="1">
-        <a:defRPr sz="1800" kern="1200">
+      <a:lvl3pPr marL="722376" algn="l" defTabSz="722376" rtl="0" eaLnBrk="1" latinLnBrk="0" hangingPunct="1">
+        <a:defRPr sz="1422" kern="1200">
           <a:solidFill>
             <a:schemeClr val="tx1"/>
           </a:solidFill>
@@ -3265,8 +2889,8 @@
           <a:cs typeface="+mn-cs"/>
         </a:defRPr>
       </a:lvl3pPr>
-      <a:lvl4pPr marL="1371600" algn="l" defTabSz="914400" rtl="0" eaLnBrk="1" latinLnBrk="0" hangingPunct="1">
-        <a:defRPr sz="1800" kern="1200">
+      <a:lvl4pPr marL="1083564" algn="l" defTabSz="722376" rtl="0" eaLnBrk="1" latinLnBrk="0" hangingPunct="1">
+        <a:defRPr sz="1422" kern="1200">
           <a:solidFill>
             <a:schemeClr val="tx1"/>
           </a:solidFill>
@@ -3275,8 +2899,8 @@
           <a:cs typeface="+mn-cs"/>
         </a:defRPr>
       </a:lvl4pPr>
-      <a:lvl5pPr marL="1828800" algn="l" defTabSz="914400" rtl="0" eaLnBrk="1" latinLnBrk="0" hangingPunct="1">
-        <a:defRPr sz="1800" kern="1200">
+      <a:lvl5pPr marL="1444752" algn="l" defTabSz="722376" rtl="0" eaLnBrk="1" latinLnBrk="0" hangingPunct="1">
+        <a:defRPr sz="1422" kern="1200">
           <a:solidFill>
             <a:schemeClr val="tx1"/>
           </a:solidFill>
@@ -3285,8 +2909,8 @@
           <a:cs typeface="+mn-cs"/>
         </a:defRPr>
       </a:lvl5pPr>
-      <a:lvl6pPr marL="2286000" algn="l" defTabSz="914400" rtl="0" eaLnBrk="1" latinLnBrk="0" hangingPunct="1">
-        <a:defRPr sz="1800" kern="1200">
+      <a:lvl6pPr marL="1805940" algn="l" defTabSz="722376" rtl="0" eaLnBrk="1" latinLnBrk="0" hangingPunct="1">
+        <a:defRPr sz="1422" kern="1200">
           <a:solidFill>
             <a:schemeClr val="tx1"/>
           </a:solidFill>
@@ -3295,8 +2919,8 @@
           <a:cs typeface="+mn-cs"/>
         </a:defRPr>
       </a:lvl6pPr>
-      <a:lvl7pPr marL="2743200" algn="l" defTabSz="914400" rtl="0" eaLnBrk="1" latinLnBrk="0" hangingPunct="1">
-        <a:defRPr sz="1800" kern="1200">
+      <a:lvl7pPr marL="2167128" algn="l" defTabSz="722376" rtl="0" eaLnBrk="1" latinLnBrk="0" hangingPunct="1">
+        <a:defRPr sz="1422" kern="1200">
           <a:solidFill>
             <a:schemeClr val="tx1"/>
           </a:solidFill>
@@ -3305,8 +2929,8 @@
           <a:cs typeface="+mn-cs"/>
         </a:defRPr>
       </a:lvl7pPr>
-      <a:lvl8pPr marL="3200400" algn="l" defTabSz="914400" rtl="0" eaLnBrk="1" latinLnBrk="0" hangingPunct="1">
-        <a:defRPr sz="1800" kern="1200">
+      <a:lvl8pPr marL="2528316" algn="l" defTabSz="722376" rtl="0" eaLnBrk="1" latinLnBrk="0" hangingPunct="1">
+        <a:defRPr sz="1422" kern="1200">
           <a:solidFill>
             <a:schemeClr val="tx1"/>
           </a:solidFill>
@@ -3315,8 +2939,8 @@
           <a:cs typeface="+mn-cs"/>
         </a:defRPr>
       </a:lvl8pPr>
-      <a:lvl9pPr marL="3657600" algn="l" defTabSz="914400" rtl="0" eaLnBrk="1" latinLnBrk="0" hangingPunct="1">
-        <a:defRPr sz="1800" kern="1200">
+      <a:lvl9pPr marL="2889504" algn="l" defTabSz="722376" rtl="0" eaLnBrk="1" latinLnBrk="0" hangingPunct="1">
+        <a:defRPr sz="1422" kern="1200">
           <a:solidFill>
             <a:schemeClr val="tx1"/>
           </a:solidFill>
@@ -3369,7 +2993,7 @@
         </p:nvSpPr>
         <p:spPr>
           <a:xfrm>
-            <a:off x="3567112" y="2625284"/>
+            <a:off x="1227138" y="2660427"/>
             <a:ext cx="5057775" cy="409303"/>
           </a:xfrm>
           <a:prstGeom prst="rect">
@@ -3423,7 +3047,7 @@
         </p:nvSpPr>
         <p:spPr>
           <a:xfrm rot="17977153">
-            <a:off x="-595386" y="2566505"/>
+            <a:off x="-2935361" y="2601647"/>
             <a:ext cx="11532042" cy="1766212"/>
           </a:xfrm>
           <a:prstGeom prst="rect">
@@ -3477,16 +3101,16 @@
         </p:nvSpPr>
         <p:spPr>
           <a:xfrm rot="3600000">
-            <a:off x="1559198" y="2312228"/>
+            <a:off x="-780777" y="2347370"/>
             <a:ext cx="11033906" cy="1766212"/>
           </a:xfrm>
           <a:prstGeom prst="rect">
             <a:avLst/>
           </a:prstGeom>
           <a:solidFill>
-            <a:srgbClr val="FA654C">
+            <a:schemeClr val="accent3">
               <a:alpha val="60000"/>
-            </a:srgbClr>
+            </a:schemeClr>
           </a:solidFill>
           <a:ln>
             <a:noFill/>
@@ -3531,11 +3155,16 @@
         </p:nvGrpSpPr>
         <p:grpSpPr>
           <a:xfrm>
-            <a:off x="4471867" y="950321"/>
-            <a:ext cx="3706451" cy="1757342"/>
-            <a:chOff x="4515440" y="925222"/>
-            <a:chExt cx="3706451" cy="1757342"/>
+            <a:off x="2104850" y="1258253"/>
+            <a:ext cx="3733494" cy="1484552"/>
+            <a:chOff x="4488397" y="1198012"/>
+            <a:chExt cx="3733494" cy="1484552"/>
           </a:xfrm>
+          <a:solidFill>
+            <a:srgbClr val="936CC0">
+              <a:alpha val="60000"/>
+            </a:srgbClr>
+          </a:solidFill>
         </p:grpSpPr>
         <p:sp>
           <p:nvSpPr>
@@ -3557,11 +3186,14 @@
             <a:prstGeom prst="ellipse">
               <a:avLst/>
             </a:prstGeom>
-            <a:solidFill>
-              <a:srgbClr val="FEBE4C">
-                <a:alpha val="40000"/>
-              </a:srgbClr>
-            </a:solidFill>
+            <a:grpFill/>
+            <a:ln>
+              <a:solidFill>
+                <a:srgbClr val="7030A0">
+                  <a:alpha val="60000"/>
+                </a:srgbClr>
+              </a:solidFill>
+            </a:ln>
           </p:spPr>
           <p:style>
             <a:lnRef idx="2">
@@ -3602,11 +3234,12 @@
           </p:nvGrpSpPr>
           <p:grpSpPr>
             <a:xfrm>
-              <a:off x="4515440" y="925222"/>
-              <a:ext cx="3706451" cy="1757342"/>
-              <a:chOff x="4515440" y="925222"/>
-              <a:chExt cx="3706451" cy="1757342"/>
+              <a:off x="4488397" y="1198012"/>
+              <a:ext cx="3733494" cy="1484552"/>
+              <a:chOff x="4488397" y="1198012"/>
+              <a:chExt cx="3733494" cy="1484552"/>
             </a:xfrm>
+            <a:grpFill/>
           </p:grpSpPr>
           <p:sp>
             <p:nvSpPr>
@@ -3622,17 +3255,20 @@
             </p:nvSpPr>
             <p:spPr>
               <a:xfrm>
-                <a:off x="6243865" y="2236579"/>
-                <a:ext cx="1301256" cy="373657"/>
+                <a:off x="6320064" y="2208479"/>
+                <a:ext cx="1028196" cy="380974"/>
               </a:xfrm>
               <a:prstGeom prst="ellipse">
                 <a:avLst/>
               </a:prstGeom>
-              <a:solidFill>
-                <a:srgbClr val="FEBE4C">
-                  <a:alpha val="40000"/>
-                </a:srgbClr>
-              </a:solidFill>
+              <a:grpFill/>
+              <a:ln>
+                <a:solidFill>
+                  <a:srgbClr val="7030A0">
+                    <a:alpha val="60000"/>
+                  </a:srgbClr>
+                </a:solidFill>
+              </a:ln>
             </p:spPr>
             <p:style>
               <a:lnRef idx="2">
@@ -3679,11 +3315,14 @@
               <a:prstGeom prst="ellipse">
                 <a:avLst/>
               </a:prstGeom>
-              <a:solidFill>
-                <a:srgbClr val="FEBE4C">
-                  <a:alpha val="40000"/>
-                </a:srgbClr>
-              </a:solidFill>
+              <a:grpFill/>
+              <a:ln>
+                <a:solidFill>
+                  <a:srgbClr val="7030A0">
+                    <a:alpha val="60000"/>
+                  </a:srgbClr>
+                </a:solidFill>
+              </a:ln>
             </p:spPr>
             <p:style>
               <a:lnRef idx="2">
@@ -3724,17 +3363,20 @@
             </p:nvSpPr>
             <p:spPr>
               <a:xfrm>
-                <a:off x="6041987" y="1443990"/>
-                <a:ext cx="1301256" cy="373657"/>
+                <a:off x="6090478" y="1437063"/>
+                <a:ext cx="1148033" cy="373657"/>
               </a:xfrm>
               <a:prstGeom prst="ellipse">
                 <a:avLst/>
               </a:prstGeom>
-              <a:solidFill>
-                <a:srgbClr val="FEBE4C">
-                  <a:alpha val="40000"/>
-                </a:srgbClr>
-              </a:solidFill>
+              <a:grpFill/>
+              <a:ln>
+                <a:solidFill>
+                  <a:srgbClr val="7030A0">
+                    <a:alpha val="60000"/>
+                  </a:srgbClr>
+                </a:solidFill>
+              </a:ln>
             </p:spPr>
             <p:style>
               <a:lnRef idx="2">
@@ -3757,7 +3399,7 @@
               <a:lstStyle/>
               <a:p>
                 <a:pPr algn="ctr"/>
-                <a:endParaRPr lang="en-GB"/>
+                <a:endParaRPr lang="en-GB" dirty="0"/>
               </a:p>
             </p:txBody>
           </p:sp>
@@ -3775,11 +3417,12 @@
             </p:nvGrpSpPr>
             <p:grpSpPr>
               <a:xfrm>
-                <a:off x="4515440" y="925222"/>
-                <a:ext cx="3706451" cy="1757342"/>
-                <a:chOff x="4515440" y="925222"/>
-                <a:chExt cx="3706451" cy="1757342"/>
+                <a:off x="4488397" y="1198012"/>
+                <a:ext cx="3733494" cy="1484552"/>
+                <a:chOff x="4488397" y="1198012"/>
+                <a:chExt cx="3733494" cy="1484552"/>
               </a:xfrm>
+              <a:grpFill/>
             </p:grpSpPr>
             <p:sp>
               <p:nvSpPr>
@@ -3801,11 +3444,14 @@
                 <a:prstGeom prst="ellipse">
                   <a:avLst/>
                 </a:prstGeom>
-                <a:solidFill>
-                  <a:srgbClr val="FEBE4C">
-                    <a:alpha val="40000"/>
-                  </a:srgbClr>
-                </a:solidFill>
+                <a:grpFill/>
+                <a:ln>
+                  <a:solidFill>
+                    <a:srgbClr val="7030A0">
+                      <a:alpha val="60000"/>
+                    </a:srgbClr>
+                  </a:solidFill>
+                </a:ln>
               </p:spPr>
               <p:style>
                 <a:lnRef idx="2">
@@ -3852,11 +3498,14 @@
                 <a:prstGeom prst="ellipse">
                   <a:avLst/>
                 </a:prstGeom>
-                <a:solidFill>
-                  <a:srgbClr val="FEBE4C">
-                    <a:alpha val="40000"/>
-                  </a:srgbClr>
-                </a:solidFill>
+                <a:grpFill/>
+                <a:ln>
+                  <a:solidFill>
+                    <a:srgbClr val="7030A0">
+                      <a:alpha val="60000"/>
+                    </a:srgbClr>
+                  </a:solidFill>
+                </a:ln>
               </p:spPr>
               <p:style>
                 <a:lnRef idx="2">
@@ -3903,11 +3552,14 @@
                 <a:prstGeom prst="ellipse">
                   <a:avLst/>
                 </a:prstGeom>
-                <a:solidFill>
-                  <a:srgbClr val="FEBE4C">
-                    <a:alpha val="40000"/>
-                  </a:srgbClr>
-                </a:solidFill>
+                <a:grpFill/>
+                <a:ln>
+                  <a:solidFill>
+                    <a:srgbClr val="7030A0">
+                      <a:alpha val="60000"/>
+                    </a:srgbClr>
+                  </a:solidFill>
+                </a:ln>
               </p:spPr>
               <p:style>
                 <a:lnRef idx="2">
@@ -3954,11 +3606,14 @@
                 <a:prstGeom prst="ellipse">
                   <a:avLst/>
                 </a:prstGeom>
-                <a:solidFill>
-                  <a:srgbClr val="FEBE4C">
-                    <a:alpha val="40000"/>
-                  </a:srgbClr>
-                </a:solidFill>
+                <a:grpFill/>
+                <a:ln>
+                  <a:solidFill>
+                    <a:srgbClr val="7030A0">
+                      <a:alpha val="60000"/>
+                    </a:srgbClr>
+                  </a:solidFill>
+                </a:ln>
               </p:spPr>
               <p:style>
                 <a:lnRef idx="2">
@@ -4005,11 +3660,14 @@
                 <a:prstGeom prst="ellipse">
                   <a:avLst/>
                 </a:prstGeom>
-                <a:solidFill>
-                  <a:srgbClr val="FEBE4C">
-                    <a:alpha val="40000"/>
-                  </a:srgbClr>
-                </a:solidFill>
+                <a:grpFill/>
+                <a:ln>
+                  <a:solidFill>
+                    <a:srgbClr val="7030A0">
+                      <a:alpha val="60000"/>
+                    </a:srgbClr>
+                  </a:solidFill>
+                </a:ln>
               </p:spPr>
               <p:style>
                 <a:lnRef idx="2">
@@ -4056,11 +3714,14 @@
                 <a:prstGeom prst="ellipse">
                   <a:avLst/>
                 </a:prstGeom>
-                <a:solidFill>
-                  <a:srgbClr val="FEBE4C">
-                    <a:alpha val="40000"/>
-                  </a:srgbClr>
-                </a:solidFill>
+                <a:grpFill/>
+                <a:ln>
+                  <a:solidFill>
+                    <a:srgbClr val="7030A0">
+                      <a:alpha val="60000"/>
+                    </a:srgbClr>
+                  </a:solidFill>
+                </a:ln>
               </p:spPr>
               <p:style>
                 <a:lnRef idx="2">
@@ -4107,11 +3768,14 @@
                 <a:prstGeom prst="ellipse">
                   <a:avLst/>
                 </a:prstGeom>
-                <a:solidFill>
-                  <a:srgbClr val="FEBE4C">
-                    <a:alpha val="40000"/>
-                  </a:srgbClr>
-                </a:solidFill>
+                <a:grpFill/>
+                <a:ln>
+                  <a:solidFill>
+                    <a:srgbClr val="7030A0">
+                      <a:alpha val="60000"/>
+                    </a:srgbClr>
+                  </a:solidFill>
+                </a:ln>
               </p:spPr>
               <p:style>
                 <a:lnRef idx="2">
@@ -4158,11 +3822,14 @@
                 <a:prstGeom prst="ellipse">
                   <a:avLst/>
                 </a:prstGeom>
-                <a:solidFill>
-                  <a:srgbClr val="FEBE4C">
-                    <a:alpha val="40000"/>
-                  </a:srgbClr>
-                </a:solidFill>
+                <a:grpFill/>
+                <a:ln>
+                  <a:solidFill>
+                    <a:srgbClr val="7030A0">
+                      <a:alpha val="60000"/>
+                    </a:srgbClr>
+                  </a:solidFill>
+                </a:ln>
               </p:spPr>
               <p:style>
                 <a:lnRef idx="2">
@@ -4209,11 +3876,14 @@
                 <a:prstGeom prst="ellipse">
                   <a:avLst/>
                 </a:prstGeom>
-                <a:solidFill>
-                  <a:srgbClr val="FEBE4C">
-                    <a:alpha val="40000"/>
-                  </a:srgbClr>
-                </a:solidFill>
+                <a:grpFill/>
+                <a:ln>
+                  <a:solidFill>
+                    <a:srgbClr val="7030A0">
+                      <a:alpha val="60000"/>
+                    </a:srgbClr>
+                  </a:solidFill>
+                </a:ln>
               </p:spPr>
               <p:style>
                 <a:lnRef idx="2">
@@ -4253,18 +3923,21 @@
                 <p:nvPr/>
               </p:nvSpPr>
               <p:spPr>
-                <a:xfrm rot="20379567">
-                  <a:off x="4525917" y="1877516"/>
-                  <a:ext cx="1301256" cy="373657"/>
+                <a:xfrm rot="20760653">
+                  <a:off x="4488397" y="1904708"/>
+                  <a:ext cx="841969" cy="373657"/>
                 </a:xfrm>
                 <a:prstGeom prst="ellipse">
                   <a:avLst/>
                 </a:prstGeom>
-                <a:solidFill>
-                  <a:srgbClr val="FEBE4C">
-                    <a:alpha val="40000"/>
-                  </a:srgbClr>
-                </a:solidFill>
+                <a:grpFill/>
+                <a:ln>
+                  <a:solidFill>
+                    <a:srgbClr val="7030A0">
+                      <a:alpha val="60000"/>
+                    </a:srgbClr>
+                  </a:solidFill>
+                </a:ln>
               </p:spPr>
               <p:style>
                 <a:lnRef idx="2">
@@ -4311,164 +3984,14 @@
                 <a:prstGeom prst="ellipse">
                   <a:avLst/>
                 </a:prstGeom>
-                <a:solidFill>
-                  <a:srgbClr val="FEBE4C">
-                    <a:alpha val="40000"/>
-                  </a:srgbClr>
-                </a:solidFill>
-              </p:spPr>
-              <p:style>
-                <a:lnRef idx="2">
-                  <a:schemeClr val="accent3">
-                    <a:shade val="50000"/>
-                  </a:schemeClr>
-                </a:lnRef>
-                <a:fillRef idx="1">
-                  <a:schemeClr val="accent3"/>
-                </a:fillRef>
-                <a:effectRef idx="0">
-                  <a:schemeClr val="accent3"/>
-                </a:effectRef>
-                <a:fontRef idx="minor">
-                  <a:schemeClr val="lt1"/>
-                </a:fontRef>
-              </p:style>
-              <p:txBody>
-                <a:bodyPr rtlCol="0" anchor="ctr"/>
-                <a:lstStyle/>
-                <a:p>
-                  <a:pPr algn="ctr"/>
-                  <a:endParaRPr lang="en-GB"/>
-                </a:p>
-              </p:txBody>
-            </p:sp>
-            <p:sp>
-              <p:nvSpPr>
-                <p:cNvPr id="46" name="Oval 45">
-                  <a:extLst>
-                    <a:ext uri="{FF2B5EF4-FFF2-40B4-BE49-F238E27FC236}">
-                      <a16:creationId xmlns:a16="http://schemas.microsoft.com/office/drawing/2014/main" id="{16643B61-922C-4395-A55F-171F8D8AF219}"/>
-                    </a:ext>
-                  </a:extLst>
-                </p:cNvPr>
-                <p:cNvSpPr/>
-                <p:nvPr/>
-              </p:nvSpPr>
-              <p:spPr>
-                <a:xfrm>
-                  <a:off x="4998157" y="1046933"/>
-                  <a:ext cx="1067380" cy="373657"/>
-                </a:xfrm>
-                <a:prstGeom prst="ellipse">
-                  <a:avLst/>
-                </a:prstGeom>
-                <a:solidFill>
-                  <a:srgbClr val="FEBE4C">
-                    <a:alpha val="40000"/>
-                  </a:srgbClr>
-                </a:solidFill>
-              </p:spPr>
-              <p:style>
-                <a:lnRef idx="2">
-                  <a:schemeClr val="accent3">
-                    <a:shade val="50000"/>
-                  </a:schemeClr>
-                </a:lnRef>
-                <a:fillRef idx="1">
-                  <a:schemeClr val="accent3"/>
-                </a:fillRef>
-                <a:effectRef idx="0">
-                  <a:schemeClr val="accent3"/>
-                </a:effectRef>
-                <a:fontRef idx="minor">
-                  <a:schemeClr val="lt1"/>
-                </a:fontRef>
-              </p:style>
-              <p:txBody>
-                <a:bodyPr rtlCol="0" anchor="ctr"/>
-                <a:lstStyle/>
-                <a:p>
-                  <a:pPr algn="ctr"/>
-                  <a:endParaRPr lang="en-GB"/>
-                </a:p>
-              </p:txBody>
-            </p:sp>
-            <p:sp>
-              <p:nvSpPr>
-                <p:cNvPr id="47" name="Oval 46">
-                  <a:extLst>
-                    <a:ext uri="{FF2B5EF4-FFF2-40B4-BE49-F238E27FC236}">
-                      <a16:creationId xmlns:a16="http://schemas.microsoft.com/office/drawing/2014/main" id="{4943A0F9-C2B2-430A-ACA7-7FE40F2C3DB9}"/>
-                    </a:ext>
-                  </a:extLst>
-                </p:cNvPr>
-                <p:cNvSpPr/>
-                <p:nvPr/>
-              </p:nvSpPr>
-              <p:spPr>
-                <a:xfrm rot="21322322">
-                  <a:off x="5855365" y="925222"/>
-                  <a:ext cx="1046235" cy="373657"/>
-                </a:xfrm>
-                <a:prstGeom prst="ellipse">
-                  <a:avLst/>
-                </a:prstGeom>
-                <a:solidFill>
-                  <a:srgbClr val="FEBE4C">
-                    <a:alpha val="40000"/>
-                  </a:srgbClr>
-                </a:solidFill>
-              </p:spPr>
-              <p:style>
-                <a:lnRef idx="2">
-                  <a:schemeClr val="accent3">
-                    <a:shade val="50000"/>
-                  </a:schemeClr>
-                </a:lnRef>
-                <a:fillRef idx="1">
-                  <a:schemeClr val="accent3"/>
-                </a:fillRef>
-                <a:effectRef idx="0">
-                  <a:schemeClr val="accent3"/>
-                </a:effectRef>
-                <a:fontRef idx="minor">
-                  <a:schemeClr val="lt1"/>
-                </a:fontRef>
-              </p:style>
-              <p:txBody>
-                <a:bodyPr rtlCol="0" anchor="ctr"/>
-                <a:lstStyle/>
-                <a:p>
-                  <a:pPr algn="ctr"/>
-                  <a:endParaRPr lang="en-GB"/>
-                </a:p>
-              </p:txBody>
-            </p:sp>
-            <p:sp>
-              <p:nvSpPr>
-                <p:cNvPr id="48" name="Oval 47">
-                  <a:extLst>
-                    <a:ext uri="{FF2B5EF4-FFF2-40B4-BE49-F238E27FC236}">
-                      <a16:creationId xmlns:a16="http://schemas.microsoft.com/office/drawing/2014/main" id="{F80A27A8-1462-42C1-BC6C-49A8E5985507}"/>
-                    </a:ext>
-                  </a:extLst>
-                </p:cNvPr>
-                <p:cNvSpPr/>
-                <p:nvPr/>
-              </p:nvSpPr>
-              <p:spPr>
-                <a:xfrm rot="1389919">
-                  <a:off x="6645690" y="1025952"/>
-                  <a:ext cx="930107" cy="373657"/>
-                </a:xfrm>
-                <a:prstGeom prst="ellipse">
-                  <a:avLst/>
-                </a:prstGeom>
-                <a:solidFill>
-                  <a:srgbClr val="FEBE4C">
-                    <a:alpha val="40000"/>
-                  </a:srgbClr>
-                </a:solidFill>
+                <a:grpFill/>
+                <a:ln>
+                  <a:solidFill>
+                    <a:srgbClr val="7030A0">
+                      <a:alpha val="60000"/>
+                    </a:srgbClr>
+                  </a:solidFill>
+                </a:ln>
               </p:spPr>
               <p:style>
                 <a:lnRef idx="2">
@@ -4514,7 +4037,7 @@
         </p:nvCxnSpPr>
         <p:spPr>
           <a:xfrm rot="19800000" flipV="1">
-            <a:off x="8619848" y="5286098"/>
+            <a:off x="5439611" y="3626448"/>
             <a:ext cx="0" cy="1620000"/>
           </a:xfrm>
           <a:prstGeom prst="straightConnector1">
@@ -4522,9 +4045,7 @@
           </a:prstGeom>
           <a:ln w="123825">
             <a:solidFill>
-              <a:schemeClr val="accent2">
-                <a:lumMod val="50000"/>
-              </a:schemeClr>
+              <a:srgbClr val="000000"/>
             </a:solidFill>
             <a:tailEnd type="triangle"/>
           </a:ln>
@@ -4538,123 +4059,6 @@
           </a:fillRef>
           <a:effectRef idx="0">
             <a:schemeClr val="accent1"/>
-          </a:effectRef>
-          <a:fontRef idx="minor">
-            <a:schemeClr val="tx1"/>
-          </a:fontRef>
-        </p:style>
-      </p:cxnSp>
-      <p:cxnSp>
-        <p:nvCxnSpPr>
-          <p:cNvPr id="14" name="Straight Connector 13">
-            <a:extLst>
-              <a:ext uri="{FF2B5EF4-FFF2-40B4-BE49-F238E27FC236}">
-                <a16:creationId xmlns:a16="http://schemas.microsoft.com/office/drawing/2014/main" id="{282F4C9F-27E0-496A-8657-34ABD0028B9B}"/>
-              </a:ext>
-            </a:extLst>
-          </p:cNvPr>
-          <p:cNvCxnSpPr>
-            <a:cxnSpLocks/>
-          </p:cNvCxnSpPr>
-          <p:nvPr/>
-        </p:nvCxnSpPr>
-        <p:spPr>
-          <a:xfrm rot="19800000">
-            <a:off x="7110160" y="4811463"/>
-            <a:ext cx="1767600" cy="0"/>
-          </a:xfrm>
-          <a:prstGeom prst="line">
-            <a:avLst/>
-          </a:prstGeom>
-          <a:ln w="76200"/>
-        </p:spPr>
-        <p:style>
-          <a:lnRef idx="1">
-            <a:schemeClr val="accent2"/>
-          </a:lnRef>
-          <a:fillRef idx="0">
-            <a:schemeClr val="accent2"/>
-          </a:fillRef>
-          <a:effectRef idx="0">
-            <a:schemeClr val="accent2"/>
-          </a:effectRef>
-          <a:fontRef idx="minor">
-            <a:schemeClr val="tx1"/>
-          </a:fontRef>
-        </p:style>
-      </p:cxnSp>
-      <p:cxnSp>
-        <p:nvCxnSpPr>
-          <p:cNvPr id="15" name="Straight Connector 14">
-            <a:extLst>
-              <a:ext uri="{FF2B5EF4-FFF2-40B4-BE49-F238E27FC236}">
-                <a16:creationId xmlns:a16="http://schemas.microsoft.com/office/drawing/2014/main" id="{3926046B-5F29-4CC8-AE98-209B9AE62449}"/>
-              </a:ext>
-            </a:extLst>
-          </p:cNvPr>
-          <p:cNvCxnSpPr>
-            <a:cxnSpLocks/>
-          </p:cNvCxnSpPr>
-          <p:nvPr/>
-        </p:nvCxnSpPr>
-        <p:spPr>
-          <a:xfrm rot="19800000">
-            <a:off x="6714886" y="4130739"/>
-            <a:ext cx="1767600" cy="0"/>
-          </a:xfrm>
-          <a:prstGeom prst="line">
-            <a:avLst/>
-          </a:prstGeom>
-          <a:ln w="76200"/>
-        </p:spPr>
-        <p:style>
-          <a:lnRef idx="1">
-            <a:schemeClr val="accent2"/>
-          </a:lnRef>
-          <a:fillRef idx="0">
-            <a:schemeClr val="accent2"/>
-          </a:fillRef>
-          <a:effectRef idx="0">
-            <a:schemeClr val="accent2"/>
-          </a:effectRef>
-          <a:fontRef idx="minor">
-            <a:schemeClr val="tx1"/>
-          </a:fontRef>
-        </p:style>
-      </p:cxnSp>
-      <p:cxnSp>
-        <p:nvCxnSpPr>
-          <p:cNvPr id="20" name="Straight Connector 19">
-            <a:extLst>
-              <a:ext uri="{FF2B5EF4-FFF2-40B4-BE49-F238E27FC236}">
-                <a16:creationId xmlns:a16="http://schemas.microsoft.com/office/drawing/2014/main" id="{D4EB4058-70CB-43F0-A0BC-B01D76B33F36}"/>
-              </a:ext>
-            </a:extLst>
-          </p:cNvPr>
-          <p:cNvCxnSpPr>
-            <a:cxnSpLocks/>
-          </p:cNvCxnSpPr>
-          <p:nvPr/>
-        </p:nvCxnSpPr>
-        <p:spPr>
-          <a:xfrm rot="19800000">
-            <a:off x="6330306" y="3443654"/>
-            <a:ext cx="1767600" cy="0"/>
-          </a:xfrm>
-          <a:prstGeom prst="line">
-            <a:avLst/>
-          </a:prstGeom>
-          <a:ln w="76200"/>
-        </p:spPr>
-        <p:style>
-          <a:lnRef idx="1">
-            <a:schemeClr val="accent2"/>
-          </a:lnRef>
-          <a:fillRef idx="0">
-            <a:schemeClr val="accent2"/>
-          </a:fillRef>
-          <a:effectRef idx="0">
-            <a:schemeClr val="accent2"/>
           </a:effectRef>
           <a:fontRef idx="minor">
             <a:schemeClr val="tx1"/>
@@ -4677,7 +4081,7 @@
         </p:nvCxnSpPr>
         <p:spPr>
           <a:xfrm rot="1800000" flipV="1">
-            <a:off x="3717505" y="5312217"/>
+            <a:off x="2318759" y="3626448"/>
             <a:ext cx="0" cy="1620000"/>
           </a:xfrm>
           <a:prstGeom prst="straightConnector1">
@@ -4685,9 +4089,7 @@
           </a:prstGeom>
           <a:ln w="123825">
             <a:solidFill>
-              <a:schemeClr val="accent4">
-                <a:lumMod val="50000"/>
-              </a:schemeClr>
+              <a:srgbClr val="000000"/>
             </a:solidFill>
             <a:tailEnd type="triangle"/>
           </a:ln>
@@ -4723,7 +4125,7 @@
         </p:nvCxnSpPr>
         <p:spPr>
           <a:xfrm rot="1800000">
-            <a:off x="3506801" y="4829259"/>
+            <a:off x="1166826" y="4864401"/>
             <a:ext cx="1767600" cy="0"/>
           </a:xfrm>
           <a:prstGeom prst="line">
@@ -4762,7 +4164,7 @@
         </p:nvCxnSpPr>
         <p:spPr>
           <a:xfrm rot="1800000">
-            <a:off x="3888227" y="4150977"/>
+            <a:off x="1548252" y="4186119"/>
             <a:ext cx="1767600" cy="0"/>
           </a:xfrm>
           <a:prstGeom prst="line">
@@ -4801,7 +4203,7 @@
         </p:nvCxnSpPr>
         <p:spPr>
           <a:xfrm rot="1800000">
-            <a:off x="4285189" y="3461709"/>
+            <a:off x="1945214" y="3496851"/>
             <a:ext cx="1767600" cy="0"/>
           </a:xfrm>
           <a:prstGeom prst="line">
@@ -4838,7 +4240,7 @@
         </p:nvGrpSpPr>
         <p:grpSpPr>
           <a:xfrm>
-            <a:off x="4783404" y="2358405"/>
+            <a:off x="2443430" y="2393547"/>
             <a:ext cx="1530787" cy="867206"/>
             <a:chOff x="4783404" y="2358405"/>
             <a:chExt cx="1530787" cy="867206"/>
@@ -4995,7 +4397,7 @@
         </p:nvSpPr>
         <p:spPr>
           <a:xfrm>
-            <a:off x="5184775" y="1644650"/>
+            <a:off x="2844800" y="1679792"/>
             <a:ext cx="1530350" cy="889508"/>
           </a:xfrm>
           <a:custGeom>
@@ -5108,7 +4510,7 @@
         </p:nvSpPr>
         <p:spPr>
           <a:xfrm>
-            <a:off x="5559699" y="963925"/>
+            <a:off x="3219725" y="999067"/>
             <a:ext cx="1533251" cy="986652"/>
           </a:xfrm>
           <a:custGeom>
@@ -5221,7 +4623,7 @@
         </p:nvSpPr>
         <p:spPr>
           <a:xfrm>
-            <a:off x="5956301" y="285750"/>
+            <a:off x="3616326" y="320892"/>
             <a:ext cx="1530350" cy="1024425"/>
           </a:xfrm>
           <a:custGeom>
@@ -5310,12 +4712,115 @@
           </a:p>
         </p:txBody>
       </p:sp>
+      <p:sp>
+        <p:nvSpPr>
+          <p:cNvPr id="57" name="Freeform: Shape 56">
+            <a:extLst>
+              <a:ext uri="{FF2B5EF4-FFF2-40B4-BE49-F238E27FC236}">
+                <a16:creationId xmlns:a16="http://schemas.microsoft.com/office/drawing/2014/main" id="{378C9B0C-8609-40D0-B134-174493F664C8}"/>
+              </a:ext>
+            </a:extLst>
+          </p:cNvPr>
+          <p:cNvSpPr/>
+          <p:nvPr/>
+        </p:nvSpPr>
+        <p:spPr>
+          <a:xfrm>
+            <a:off x="4019178" y="-378644"/>
+            <a:ext cx="1530350" cy="1024425"/>
+          </a:xfrm>
+          <a:custGeom>
+            <a:avLst/>
+            <a:gdLst>
+              <a:gd name="connsiteX0" fmla="*/ 1514475 w 1514475"/>
+              <a:gd name="connsiteY0" fmla="*/ 876300 h 1024425"/>
+              <a:gd name="connsiteX1" fmla="*/ 1120775 w 1514475"/>
+              <a:gd name="connsiteY1" fmla="*/ 990600 h 1024425"/>
+              <a:gd name="connsiteX2" fmla="*/ 996950 w 1514475"/>
+              <a:gd name="connsiteY2" fmla="*/ 346075 h 1024425"/>
+              <a:gd name="connsiteX3" fmla="*/ 368300 w 1514475"/>
+              <a:gd name="connsiteY3" fmla="*/ 219075 h 1024425"/>
+              <a:gd name="connsiteX4" fmla="*/ 0 w 1514475"/>
+              <a:gd name="connsiteY4" fmla="*/ 0 h 1024425"/>
+            </a:gdLst>
+            <a:ahLst/>
+            <a:cxnLst>
+              <a:cxn ang="0">
+                <a:pos x="connsiteX0" y="connsiteY0"/>
+              </a:cxn>
+              <a:cxn ang="0">
+                <a:pos x="connsiteX1" y="connsiteY1"/>
+              </a:cxn>
+              <a:cxn ang="0">
+                <a:pos x="connsiteX2" y="connsiteY2"/>
+              </a:cxn>
+              <a:cxn ang="0">
+                <a:pos x="connsiteX3" y="connsiteY3"/>
+              </a:cxn>
+              <a:cxn ang="0">
+                <a:pos x="connsiteX4" y="connsiteY4"/>
+              </a:cxn>
+            </a:cxnLst>
+            <a:rect l="l" t="t" r="r" b="b"/>
+            <a:pathLst>
+              <a:path w="1514475" h="1024425">
+                <a:moveTo>
+                  <a:pt x="1514475" y="876300"/>
+                </a:moveTo>
+                <a:cubicBezTo>
+                  <a:pt x="1360752" y="977635"/>
+                  <a:pt x="1207029" y="1078971"/>
+                  <a:pt x="1120775" y="990600"/>
+                </a:cubicBezTo>
+                <a:cubicBezTo>
+                  <a:pt x="1034521" y="902229"/>
+                  <a:pt x="1122362" y="474662"/>
+                  <a:pt x="996950" y="346075"/>
+                </a:cubicBezTo>
+                <a:cubicBezTo>
+                  <a:pt x="871538" y="217488"/>
+                  <a:pt x="534458" y="276754"/>
+                  <a:pt x="368300" y="219075"/>
+                </a:cubicBezTo>
+                <a:cubicBezTo>
+                  <a:pt x="202142" y="161396"/>
+                  <a:pt x="101071" y="80698"/>
+                  <a:pt x="0" y="0"/>
+                </a:cubicBezTo>
+              </a:path>
+            </a:pathLst>
+          </a:custGeom>
+          <a:ln w="76200"/>
+        </p:spPr>
+        <p:style>
+          <a:lnRef idx="1">
+            <a:schemeClr val="accent4"/>
+          </a:lnRef>
+          <a:fillRef idx="0">
+            <a:schemeClr val="accent4"/>
+          </a:fillRef>
+          <a:effectRef idx="0">
+            <a:schemeClr val="accent4"/>
+          </a:effectRef>
+          <a:fontRef idx="minor">
+            <a:schemeClr val="tx1"/>
+          </a:fontRef>
+        </p:style>
+        <p:txBody>
+          <a:bodyPr rtlCol="0" anchor="ctr"/>
+          <a:lstStyle/>
+          <a:p>
+            <a:pPr algn="ctr"/>
+            <a:endParaRPr lang="en-GB"/>
+          </a:p>
+        </p:txBody>
+      </p:sp>
       <p:grpSp>
         <p:nvGrpSpPr>
-          <p:cNvPr id="69" name="Group 68">
+          <p:cNvPr id="2" name="Group 1">
             <a:extLst>
               <a:ext uri="{FF2B5EF4-FFF2-40B4-BE49-F238E27FC236}">
-                <a16:creationId xmlns:a16="http://schemas.microsoft.com/office/drawing/2014/main" id="{C11A7F53-D669-463D-9CAF-66DC6F85FC3F}"/>
+                <a16:creationId xmlns:a16="http://schemas.microsoft.com/office/drawing/2014/main" id="{009B13EA-C236-4C0D-A2EB-DF8A8AFA9974}"/>
               </a:ext>
             </a:extLst>
           </p:cNvPr>
@@ -5324,18 +4829,18 @@
         </p:nvGrpSpPr>
         <p:grpSpPr>
           <a:xfrm>
-            <a:off x="6053439" y="2371725"/>
-            <a:ext cx="1574630" cy="833105"/>
-            <a:chOff x="6053439" y="2371725"/>
-            <a:chExt cx="1574630" cy="833105"/>
+            <a:off x="2161601" y="-359998"/>
+            <a:ext cx="4376184" cy="5206603"/>
+            <a:chOff x="2161601" y="-359998"/>
+            <a:chExt cx="4376184" cy="5206603"/>
           </a:xfrm>
         </p:grpSpPr>
         <p:cxnSp>
           <p:nvCxnSpPr>
-            <p:cNvPr id="21" name="Straight Connector 20">
+            <p:cNvPr id="14" name="Straight Connector 13">
               <a:extLst>
                 <a:ext uri="{FF2B5EF4-FFF2-40B4-BE49-F238E27FC236}">
-                  <a16:creationId xmlns:a16="http://schemas.microsoft.com/office/drawing/2014/main" id="{84E6E8A4-D0FF-461B-AA8F-D05CB566673D}"/>
+                  <a16:creationId xmlns:a16="http://schemas.microsoft.com/office/drawing/2014/main" id="{282F4C9F-27E0-496A-8657-34ABD0028B9B}"/>
                 </a:ext>
               </a:extLst>
             </p:cNvPr>
@@ -5345,14 +4850,18 @@
             <p:nvPr/>
           </p:nvCxnSpPr>
           <p:spPr>
-            <a:xfrm flipV="1">
-              <a:off x="6053439" y="2640905"/>
-              <a:ext cx="976747" cy="563925"/>
+            <a:xfrm rot="19800000">
+              <a:off x="4770185" y="4846605"/>
+              <a:ext cx="1767600" cy="0"/>
             </a:xfrm>
             <a:prstGeom prst="line">
               <a:avLst/>
             </a:prstGeom>
-            <a:ln w="76200"/>
+            <a:ln w="76200">
+              <a:solidFill>
+                <a:schemeClr val="accent3"/>
+              </a:solidFill>
+            </a:ln>
           </p:spPr>
           <p:style>
             <a:lnRef idx="1">
@@ -5369,12 +4878,259 @@
             </a:fontRef>
           </p:style>
         </p:cxnSp>
+        <p:cxnSp>
+          <p:nvCxnSpPr>
+            <p:cNvPr id="15" name="Straight Connector 14">
+              <a:extLst>
+                <a:ext uri="{FF2B5EF4-FFF2-40B4-BE49-F238E27FC236}">
+                  <a16:creationId xmlns:a16="http://schemas.microsoft.com/office/drawing/2014/main" id="{3926046B-5F29-4CC8-AE98-209B9AE62449}"/>
+                </a:ext>
+              </a:extLst>
+            </p:cNvPr>
+            <p:cNvCxnSpPr>
+              <a:cxnSpLocks/>
+            </p:cNvCxnSpPr>
+            <p:nvPr/>
+          </p:nvCxnSpPr>
+          <p:spPr>
+            <a:xfrm rot="19800000">
+              <a:off x="4374911" y="4165881"/>
+              <a:ext cx="1767600" cy="0"/>
+            </a:xfrm>
+            <a:prstGeom prst="line">
+              <a:avLst/>
+            </a:prstGeom>
+            <a:ln w="76200">
+              <a:solidFill>
+                <a:schemeClr val="accent3"/>
+              </a:solidFill>
+            </a:ln>
+          </p:spPr>
+          <p:style>
+            <a:lnRef idx="1">
+              <a:schemeClr val="accent2"/>
+            </a:lnRef>
+            <a:fillRef idx="0">
+              <a:schemeClr val="accent2"/>
+            </a:fillRef>
+            <a:effectRef idx="0">
+              <a:schemeClr val="accent2"/>
+            </a:effectRef>
+            <a:fontRef idx="minor">
+              <a:schemeClr val="tx1"/>
+            </a:fontRef>
+          </p:style>
+        </p:cxnSp>
+        <p:cxnSp>
+          <p:nvCxnSpPr>
+            <p:cNvPr id="20" name="Straight Connector 19">
+              <a:extLst>
+                <a:ext uri="{FF2B5EF4-FFF2-40B4-BE49-F238E27FC236}">
+                  <a16:creationId xmlns:a16="http://schemas.microsoft.com/office/drawing/2014/main" id="{D4EB4058-70CB-43F0-A0BC-B01D76B33F36}"/>
+                </a:ext>
+              </a:extLst>
+            </p:cNvPr>
+            <p:cNvCxnSpPr>
+              <a:cxnSpLocks/>
+            </p:cNvCxnSpPr>
+            <p:nvPr/>
+          </p:nvCxnSpPr>
+          <p:spPr>
+            <a:xfrm rot="19800000">
+              <a:off x="3990331" y="3478796"/>
+              <a:ext cx="1767600" cy="0"/>
+            </a:xfrm>
+            <a:prstGeom prst="line">
+              <a:avLst/>
+            </a:prstGeom>
+            <a:ln w="76200">
+              <a:solidFill>
+                <a:schemeClr val="accent3"/>
+              </a:solidFill>
+            </a:ln>
+          </p:spPr>
+          <p:style>
+            <a:lnRef idx="1">
+              <a:schemeClr val="accent2"/>
+            </a:lnRef>
+            <a:fillRef idx="0">
+              <a:schemeClr val="accent2"/>
+            </a:fillRef>
+            <a:effectRef idx="0">
+              <a:schemeClr val="accent2"/>
+            </a:effectRef>
+            <a:fontRef idx="minor">
+              <a:schemeClr val="tx1"/>
+            </a:fontRef>
+          </p:style>
+        </p:cxnSp>
+        <p:grpSp>
+          <p:nvGrpSpPr>
+            <p:cNvPr id="69" name="Group 68">
+              <a:extLst>
+                <a:ext uri="{FF2B5EF4-FFF2-40B4-BE49-F238E27FC236}">
+                  <a16:creationId xmlns:a16="http://schemas.microsoft.com/office/drawing/2014/main" id="{C11A7F53-D669-463D-9CAF-66DC6F85FC3F}"/>
+                </a:ext>
+              </a:extLst>
+            </p:cNvPr>
+            <p:cNvGrpSpPr/>
+            <p:nvPr/>
+          </p:nvGrpSpPr>
+          <p:grpSpPr>
+            <a:xfrm>
+              <a:off x="3713464" y="2406868"/>
+              <a:ext cx="1574630" cy="833105"/>
+              <a:chOff x="6053439" y="2371725"/>
+              <a:chExt cx="1574630" cy="833105"/>
+            </a:xfrm>
+          </p:grpSpPr>
+          <p:cxnSp>
+            <p:nvCxnSpPr>
+              <p:cNvPr id="21" name="Straight Connector 20">
+                <a:extLst>
+                  <a:ext uri="{FF2B5EF4-FFF2-40B4-BE49-F238E27FC236}">
+                    <a16:creationId xmlns:a16="http://schemas.microsoft.com/office/drawing/2014/main" id="{84E6E8A4-D0FF-461B-AA8F-D05CB566673D}"/>
+                  </a:ext>
+                </a:extLst>
+              </p:cNvPr>
+              <p:cNvCxnSpPr>
+                <a:cxnSpLocks/>
+              </p:cNvCxnSpPr>
+              <p:nvPr/>
+            </p:nvCxnSpPr>
+            <p:spPr>
+              <a:xfrm flipV="1">
+                <a:off x="6053439" y="2640905"/>
+                <a:ext cx="976747" cy="563925"/>
+              </a:xfrm>
+              <a:prstGeom prst="line">
+                <a:avLst/>
+              </a:prstGeom>
+              <a:ln w="76200">
+                <a:solidFill>
+                  <a:schemeClr val="accent3"/>
+                </a:solidFill>
+              </a:ln>
+            </p:spPr>
+            <p:style>
+              <a:lnRef idx="1">
+                <a:schemeClr val="accent2"/>
+              </a:lnRef>
+              <a:fillRef idx="0">
+                <a:schemeClr val="accent2"/>
+              </a:fillRef>
+              <a:effectRef idx="0">
+                <a:schemeClr val="accent2"/>
+              </a:effectRef>
+              <a:fontRef idx="minor">
+                <a:schemeClr val="tx1"/>
+              </a:fontRef>
+            </p:style>
+          </p:cxnSp>
+          <p:sp>
+            <p:nvSpPr>
+              <p:cNvPr id="65" name="Freeform: Shape 64">
+                <a:extLst>
+                  <a:ext uri="{FF2B5EF4-FFF2-40B4-BE49-F238E27FC236}">
+                    <a16:creationId xmlns:a16="http://schemas.microsoft.com/office/drawing/2014/main" id="{CEA16070-5592-4C8D-ABEC-B6411F3AC6E4}"/>
+                  </a:ext>
+                </a:extLst>
+              </p:cNvPr>
+              <p:cNvSpPr/>
+              <p:nvPr/>
+            </p:nvSpPr>
+            <p:spPr>
+              <a:xfrm>
+                <a:off x="6999517" y="2371725"/>
+                <a:ext cx="628552" cy="297917"/>
+              </a:xfrm>
+              <a:custGeom>
+                <a:avLst/>
+                <a:gdLst>
+                  <a:gd name="connsiteX0" fmla="*/ 0 w 590550"/>
+                  <a:gd name="connsiteY0" fmla="*/ 273050 h 297917"/>
+                  <a:gd name="connsiteX1" fmla="*/ 346075 w 590550"/>
+                  <a:gd name="connsiteY1" fmla="*/ 295275 h 297917"/>
+                  <a:gd name="connsiteX2" fmla="*/ 539750 w 590550"/>
+                  <a:gd name="connsiteY2" fmla="*/ 219075 h 297917"/>
+                  <a:gd name="connsiteX3" fmla="*/ 590550 w 590550"/>
+                  <a:gd name="connsiteY3" fmla="*/ 0 h 297917"/>
+                </a:gdLst>
+                <a:ahLst/>
+                <a:cxnLst>
+                  <a:cxn ang="0">
+                    <a:pos x="connsiteX0" y="connsiteY0"/>
+                  </a:cxn>
+                  <a:cxn ang="0">
+                    <a:pos x="connsiteX1" y="connsiteY1"/>
+                  </a:cxn>
+                  <a:cxn ang="0">
+                    <a:pos x="connsiteX2" y="connsiteY2"/>
+                  </a:cxn>
+                  <a:cxn ang="0">
+                    <a:pos x="connsiteX3" y="connsiteY3"/>
+                  </a:cxn>
+                </a:cxnLst>
+                <a:rect l="l" t="t" r="r" b="b"/>
+                <a:pathLst>
+                  <a:path w="590550" h="297917">
+                    <a:moveTo>
+                      <a:pt x="0" y="273050"/>
+                    </a:moveTo>
+                    <a:cubicBezTo>
+                      <a:pt x="128058" y="288660"/>
+                      <a:pt x="256117" y="304271"/>
+                      <a:pt x="346075" y="295275"/>
+                    </a:cubicBezTo>
+                    <a:cubicBezTo>
+                      <a:pt x="436033" y="286279"/>
+                      <a:pt x="499004" y="268287"/>
+                      <a:pt x="539750" y="219075"/>
+                    </a:cubicBezTo>
+                    <a:cubicBezTo>
+                      <a:pt x="580496" y="169863"/>
+                      <a:pt x="585523" y="84931"/>
+                      <a:pt x="590550" y="0"/>
+                    </a:cubicBezTo>
+                  </a:path>
+                </a:pathLst>
+              </a:custGeom>
+              <a:ln w="76200">
+                <a:solidFill>
+                  <a:schemeClr val="accent3"/>
+                </a:solidFill>
+              </a:ln>
+            </p:spPr>
+            <p:style>
+              <a:lnRef idx="1">
+                <a:schemeClr val="accent2"/>
+              </a:lnRef>
+              <a:fillRef idx="0">
+                <a:schemeClr val="accent2"/>
+              </a:fillRef>
+              <a:effectRef idx="0">
+                <a:schemeClr val="accent2"/>
+              </a:effectRef>
+              <a:fontRef idx="minor">
+                <a:schemeClr val="tx1"/>
+              </a:fontRef>
+            </p:style>
+            <p:txBody>
+              <a:bodyPr rtlCol="0" anchor="ctr"/>
+              <a:lstStyle/>
+              <a:p>
+                <a:pPr algn="ctr"/>
+                <a:endParaRPr lang="en-GB"/>
+              </a:p>
+            </p:txBody>
+          </p:sp>
+        </p:grpSp>
         <p:sp>
           <p:nvSpPr>
-            <p:cNvPr id="65" name="Freeform: Shape 64">
+            <p:cNvPr id="66" name="Freeform: Shape 65">
               <a:extLst>
                 <a:ext uri="{FF2B5EF4-FFF2-40B4-BE49-F238E27FC236}">
-                  <a16:creationId xmlns:a16="http://schemas.microsoft.com/office/drawing/2014/main" id="{CEA16070-5592-4C8D-ABEC-B6411F3AC6E4}"/>
+                  <a16:creationId xmlns:a16="http://schemas.microsoft.com/office/drawing/2014/main" id="{20B9A957-8F2B-4A52-AC7F-208A38BC69BE}"/>
                 </a:ext>
               </a:extLst>
             </p:cNvPr>
@@ -5383,20 +5139,22 @@
           </p:nvSpPr>
           <p:spPr>
             <a:xfrm>
-              <a:off x="6999517" y="2371725"/>
-              <a:ext cx="628552" cy="297917"/>
+              <a:off x="3330575" y="1667093"/>
+              <a:ext cx="1530350" cy="873125"/>
             </a:xfrm>
             <a:custGeom>
               <a:avLst/>
               <a:gdLst>
-                <a:gd name="connsiteX0" fmla="*/ 0 w 590550"/>
-                <a:gd name="connsiteY0" fmla="*/ 273050 h 297917"/>
-                <a:gd name="connsiteX1" fmla="*/ 346075 w 590550"/>
-                <a:gd name="connsiteY1" fmla="*/ 295275 h 297917"/>
-                <a:gd name="connsiteX2" fmla="*/ 539750 w 590550"/>
-                <a:gd name="connsiteY2" fmla="*/ 219075 h 297917"/>
-                <a:gd name="connsiteX3" fmla="*/ 590550 w 590550"/>
-                <a:gd name="connsiteY3" fmla="*/ 0 h 297917"/>
+                <a:gd name="connsiteX0" fmla="*/ 0 w 1530350"/>
+                <a:gd name="connsiteY0" fmla="*/ 873125 h 873125"/>
+                <a:gd name="connsiteX1" fmla="*/ 209550 w 1530350"/>
+                <a:gd name="connsiteY1" fmla="*/ 660400 h 873125"/>
+                <a:gd name="connsiteX2" fmla="*/ 809625 w 1530350"/>
+                <a:gd name="connsiteY2" fmla="*/ 412750 h 873125"/>
+                <a:gd name="connsiteX3" fmla="*/ 1365250 w 1530350"/>
+                <a:gd name="connsiteY3" fmla="*/ 361950 h 873125"/>
+                <a:gd name="connsiteX4" fmla="*/ 1530350 w 1530350"/>
+                <a:gd name="connsiteY4" fmla="*/ 0 h 873125"/>
               </a:gdLst>
               <a:ahLst/>
               <a:cxnLst>
@@ -5412,32 +5170,395 @@
                 <a:cxn ang="0">
                   <a:pos x="connsiteX3" y="connsiteY3"/>
                 </a:cxn>
+                <a:cxn ang="0">
+                  <a:pos x="connsiteX4" y="connsiteY4"/>
+                </a:cxn>
               </a:cxnLst>
               <a:rect l="l" t="t" r="r" b="b"/>
               <a:pathLst>
-                <a:path w="590550" h="297917">
+                <a:path w="1530350" h="873125">
                   <a:moveTo>
-                    <a:pt x="0" y="273050"/>
+                    <a:pt x="0" y="873125"/>
                   </a:moveTo>
                   <a:cubicBezTo>
-                    <a:pt x="128058" y="288660"/>
-                    <a:pt x="256117" y="304271"/>
-                    <a:pt x="346075" y="295275"/>
+                    <a:pt x="37306" y="805127"/>
+                    <a:pt x="74613" y="737129"/>
+                    <a:pt x="209550" y="660400"/>
                   </a:cubicBezTo>
                   <a:cubicBezTo>
-                    <a:pt x="436033" y="286279"/>
-                    <a:pt x="499004" y="268287"/>
-                    <a:pt x="539750" y="219075"/>
+                    <a:pt x="344487" y="583671"/>
+                    <a:pt x="617008" y="462492"/>
+                    <a:pt x="809625" y="412750"/>
                   </a:cubicBezTo>
                   <a:cubicBezTo>
-                    <a:pt x="580496" y="169863"/>
-                    <a:pt x="585523" y="84931"/>
-                    <a:pt x="590550" y="0"/>
+                    <a:pt x="1002242" y="363008"/>
+                    <a:pt x="1245129" y="430742"/>
+                    <a:pt x="1365250" y="361950"/>
+                  </a:cubicBezTo>
+                  <a:cubicBezTo>
+                    <a:pt x="1485371" y="293158"/>
+                    <a:pt x="1507860" y="146579"/>
+                    <a:pt x="1530350" y="0"/>
                   </a:cubicBezTo>
                 </a:path>
               </a:pathLst>
             </a:custGeom>
-            <a:ln w="76200"/>
+            <a:ln w="76200">
+              <a:solidFill>
+                <a:schemeClr val="accent3"/>
+              </a:solidFill>
+            </a:ln>
+          </p:spPr>
+          <p:style>
+            <a:lnRef idx="1">
+              <a:schemeClr val="accent2"/>
+            </a:lnRef>
+            <a:fillRef idx="0">
+              <a:schemeClr val="accent2"/>
+            </a:fillRef>
+            <a:effectRef idx="0">
+              <a:schemeClr val="accent2"/>
+            </a:effectRef>
+            <a:fontRef idx="minor">
+              <a:schemeClr val="tx1"/>
+            </a:fontRef>
+          </p:style>
+          <p:txBody>
+            <a:bodyPr rtlCol="0" anchor="ctr"/>
+            <a:lstStyle/>
+            <a:p>
+              <a:pPr algn="ctr"/>
+              <a:endParaRPr lang="en-GB"/>
+            </a:p>
+          </p:txBody>
+        </p:sp>
+        <p:sp>
+          <p:nvSpPr>
+            <p:cNvPr id="67" name="Freeform: Shape 66">
+              <a:extLst>
+                <a:ext uri="{FF2B5EF4-FFF2-40B4-BE49-F238E27FC236}">
+                  <a16:creationId xmlns:a16="http://schemas.microsoft.com/office/drawing/2014/main" id="{ADDB7391-982E-418F-9459-8B70C38F0058}"/>
+                </a:ext>
+              </a:extLst>
+            </p:cNvPr>
+            <p:cNvSpPr/>
+            <p:nvPr/>
+          </p:nvSpPr>
+          <p:spPr>
+            <a:xfrm>
+              <a:off x="2930525" y="987642"/>
+              <a:ext cx="1524870" cy="882650"/>
+            </a:xfrm>
+            <a:custGeom>
+              <a:avLst/>
+              <a:gdLst>
+                <a:gd name="connsiteX0" fmla="*/ 0 w 1524870"/>
+                <a:gd name="connsiteY0" fmla="*/ 882650 h 882650"/>
+                <a:gd name="connsiteX1" fmla="*/ 225425 w 1524870"/>
+                <a:gd name="connsiteY1" fmla="*/ 625475 h 882650"/>
+                <a:gd name="connsiteX2" fmla="*/ 654050 w 1524870"/>
+                <a:gd name="connsiteY2" fmla="*/ 666750 h 882650"/>
+                <a:gd name="connsiteX3" fmla="*/ 835025 w 1524870"/>
+                <a:gd name="connsiteY3" fmla="*/ 419100 h 882650"/>
+                <a:gd name="connsiteX4" fmla="*/ 1422400 w 1524870"/>
+                <a:gd name="connsiteY4" fmla="*/ 419100 h 882650"/>
+                <a:gd name="connsiteX5" fmla="*/ 1520825 w 1524870"/>
+                <a:gd name="connsiteY5" fmla="*/ 0 h 882650"/>
+              </a:gdLst>
+              <a:ahLst/>
+              <a:cxnLst>
+                <a:cxn ang="0">
+                  <a:pos x="connsiteX0" y="connsiteY0"/>
+                </a:cxn>
+                <a:cxn ang="0">
+                  <a:pos x="connsiteX1" y="connsiteY1"/>
+                </a:cxn>
+                <a:cxn ang="0">
+                  <a:pos x="connsiteX2" y="connsiteY2"/>
+                </a:cxn>
+                <a:cxn ang="0">
+                  <a:pos x="connsiteX3" y="connsiteY3"/>
+                </a:cxn>
+                <a:cxn ang="0">
+                  <a:pos x="connsiteX4" y="connsiteY4"/>
+                </a:cxn>
+                <a:cxn ang="0">
+                  <a:pos x="connsiteX5" y="connsiteY5"/>
+                </a:cxn>
+              </a:cxnLst>
+              <a:rect l="l" t="t" r="r" b="b"/>
+              <a:pathLst>
+                <a:path w="1524870" h="882650">
+                  <a:moveTo>
+                    <a:pt x="0" y="882650"/>
+                  </a:moveTo>
+                  <a:cubicBezTo>
+                    <a:pt x="58208" y="772054"/>
+                    <a:pt x="116417" y="661458"/>
+                    <a:pt x="225425" y="625475"/>
+                  </a:cubicBezTo>
+                  <a:cubicBezTo>
+                    <a:pt x="334433" y="589492"/>
+                    <a:pt x="552450" y="701146"/>
+                    <a:pt x="654050" y="666750"/>
+                  </a:cubicBezTo>
+                  <a:cubicBezTo>
+                    <a:pt x="755650" y="632354"/>
+                    <a:pt x="706967" y="460375"/>
+                    <a:pt x="835025" y="419100"/>
+                  </a:cubicBezTo>
+                  <a:cubicBezTo>
+                    <a:pt x="963083" y="377825"/>
+                    <a:pt x="1308100" y="488950"/>
+                    <a:pt x="1422400" y="419100"/>
+                  </a:cubicBezTo>
+                  <a:cubicBezTo>
+                    <a:pt x="1536700" y="349250"/>
+                    <a:pt x="1528762" y="174625"/>
+                    <a:pt x="1520825" y="0"/>
+                  </a:cubicBezTo>
+                </a:path>
+              </a:pathLst>
+            </a:custGeom>
+            <a:ln w="76200">
+              <a:solidFill>
+                <a:schemeClr val="accent3"/>
+              </a:solidFill>
+            </a:ln>
+          </p:spPr>
+          <p:style>
+            <a:lnRef idx="1">
+              <a:schemeClr val="accent2"/>
+            </a:lnRef>
+            <a:fillRef idx="0">
+              <a:schemeClr val="accent2"/>
+            </a:fillRef>
+            <a:effectRef idx="0">
+              <a:schemeClr val="accent2"/>
+            </a:effectRef>
+            <a:fontRef idx="minor">
+              <a:schemeClr val="tx1"/>
+            </a:fontRef>
+          </p:style>
+          <p:txBody>
+            <a:bodyPr rtlCol="0" anchor="ctr"/>
+            <a:lstStyle/>
+            <a:p>
+              <a:pPr algn="ctr"/>
+              <a:endParaRPr lang="en-GB"/>
+            </a:p>
+          </p:txBody>
+        </p:sp>
+        <p:sp>
+          <p:nvSpPr>
+            <p:cNvPr id="68" name="Freeform: Shape 67">
+              <a:extLst>
+                <a:ext uri="{FF2B5EF4-FFF2-40B4-BE49-F238E27FC236}">
+                  <a16:creationId xmlns:a16="http://schemas.microsoft.com/office/drawing/2014/main" id="{34A8E8A2-A0C2-4C6F-87C6-AC01D48A5666}"/>
+                </a:ext>
+              </a:extLst>
+            </p:cNvPr>
+            <p:cNvSpPr/>
+            <p:nvPr/>
+          </p:nvSpPr>
+          <p:spPr>
+            <a:xfrm>
+              <a:off x="2549526" y="305017"/>
+              <a:ext cx="1520825" cy="882650"/>
+            </a:xfrm>
+            <a:custGeom>
+              <a:avLst/>
+              <a:gdLst>
+                <a:gd name="connsiteX0" fmla="*/ 0 w 1520825"/>
+                <a:gd name="connsiteY0" fmla="*/ 882650 h 882650"/>
+                <a:gd name="connsiteX1" fmla="*/ 158750 w 1520825"/>
+                <a:gd name="connsiteY1" fmla="*/ 612775 h 882650"/>
+                <a:gd name="connsiteX2" fmla="*/ 708025 w 1520825"/>
+                <a:gd name="connsiteY2" fmla="*/ 800100 h 882650"/>
+                <a:gd name="connsiteX3" fmla="*/ 923925 w 1520825"/>
+                <a:gd name="connsiteY3" fmla="*/ 533400 h 882650"/>
+                <a:gd name="connsiteX4" fmla="*/ 1339850 w 1520825"/>
+                <a:gd name="connsiteY4" fmla="*/ 447675 h 882650"/>
+                <a:gd name="connsiteX5" fmla="*/ 1520825 w 1520825"/>
+                <a:gd name="connsiteY5" fmla="*/ 0 h 882650"/>
+              </a:gdLst>
+              <a:ahLst/>
+              <a:cxnLst>
+                <a:cxn ang="0">
+                  <a:pos x="connsiteX0" y="connsiteY0"/>
+                </a:cxn>
+                <a:cxn ang="0">
+                  <a:pos x="connsiteX1" y="connsiteY1"/>
+                </a:cxn>
+                <a:cxn ang="0">
+                  <a:pos x="connsiteX2" y="connsiteY2"/>
+                </a:cxn>
+                <a:cxn ang="0">
+                  <a:pos x="connsiteX3" y="connsiteY3"/>
+                </a:cxn>
+                <a:cxn ang="0">
+                  <a:pos x="connsiteX4" y="connsiteY4"/>
+                </a:cxn>
+                <a:cxn ang="0">
+                  <a:pos x="connsiteX5" y="connsiteY5"/>
+                </a:cxn>
+              </a:cxnLst>
+              <a:rect l="l" t="t" r="r" b="b"/>
+              <a:pathLst>
+                <a:path w="1520825" h="882650">
+                  <a:moveTo>
+                    <a:pt x="0" y="882650"/>
+                  </a:moveTo>
+                  <a:cubicBezTo>
+                    <a:pt x="20373" y="754591"/>
+                    <a:pt x="40746" y="626533"/>
+                    <a:pt x="158750" y="612775"/>
+                  </a:cubicBezTo>
+                  <a:cubicBezTo>
+                    <a:pt x="276754" y="599017"/>
+                    <a:pt x="580496" y="813329"/>
+                    <a:pt x="708025" y="800100"/>
+                  </a:cubicBezTo>
+                  <a:cubicBezTo>
+                    <a:pt x="835554" y="786871"/>
+                    <a:pt x="818621" y="592137"/>
+                    <a:pt x="923925" y="533400"/>
+                  </a:cubicBezTo>
+                  <a:cubicBezTo>
+                    <a:pt x="1029229" y="474663"/>
+                    <a:pt x="1240367" y="536575"/>
+                    <a:pt x="1339850" y="447675"/>
+                  </a:cubicBezTo>
+                  <a:cubicBezTo>
+                    <a:pt x="1439333" y="358775"/>
+                    <a:pt x="1480079" y="179387"/>
+                    <a:pt x="1520825" y="0"/>
+                  </a:cubicBezTo>
+                </a:path>
+              </a:pathLst>
+            </a:custGeom>
+            <a:ln w="76200">
+              <a:solidFill>
+                <a:schemeClr val="accent3"/>
+              </a:solidFill>
+            </a:ln>
+          </p:spPr>
+          <p:style>
+            <a:lnRef idx="1">
+              <a:schemeClr val="accent2"/>
+            </a:lnRef>
+            <a:fillRef idx="0">
+              <a:schemeClr val="accent2"/>
+            </a:fillRef>
+            <a:effectRef idx="0">
+              <a:schemeClr val="accent2"/>
+            </a:effectRef>
+            <a:fontRef idx="minor">
+              <a:schemeClr val="tx1"/>
+            </a:fontRef>
+          </p:style>
+          <p:txBody>
+            <a:bodyPr rtlCol="0" anchor="ctr"/>
+            <a:lstStyle/>
+            <a:p>
+              <a:pPr algn="ctr"/>
+              <a:endParaRPr lang="en-GB"/>
+            </a:p>
+          </p:txBody>
+        </p:sp>
+        <p:sp>
+          <p:nvSpPr>
+            <p:cNvPr id="63" name="Freeform: Shape 62">
+              <a:extLst>
+                <a:ext uri="{FF2B5EF4-FFF2-40B4-BE49-F238E27FC236}">
+                  <a16:creationId xmlns:a16="http://schemas.microsoft.com/office/drawing/2014/main" id="{F58EC456-6951-46FD-AA77-DAB9365AAF8A}"/>
+                </a:ext>
+              </a:extLst>
+            </p:cNvPr>
+            <p:cNvSpPr/>
+            <p:nvPr/>
+          </p:nvSpPr>
+          <p:spPr>
+            <a:xfrm>
+              <a:off x="2161601" y="-359998"/>
+              <a:ext cx="1520825" cy="882650"/>
+            </a:xfrm>
+            <a:custGeom>
+              <a:avLst/>
+              <a:gdLst>
+                <a:gd name="connsiteX0" fmla="*/ 0 w 1520825"/>
+                <a:gd name="connsiteY0" fmla="*/ 882650 h 882650"/>
+                <a:gd name="connsiteX1" fmla="*/ 158750 w 1520825"/>
+                <a:gd name="connsiteY1" fmla="*/ 612775 h 882650"/>
+                <a:gd name="connsiteX2" fmla="*/ 708025 w 1520825"/>
+                <a:gd name="connsiteY2" fmla="*/ 800100 h 882650"/>
+                <a:gd name="connsiteX3" fmla="*/ 923925 w 1520825"/>
+                <a:gd name="connsiteY3" fmla="*/ 533400 h 882650"/>
+                <a:gd name="connsiteX4" fmla="*/ 1339850 w 1520825"/>
+                <a:gd name="connsiteY4" fmla="*/ 447675 h 882650"/>
+                <a:gd name="connsiteX5" fmla="*/ 1520825 w 1520825"/>
+                <a:gd name="connsiteY5" fmla="*/ 0 h 882650"/>
+              </a:gdLst>
+              <a:ahLst/>
+              <a:cxnLst>
+                <a:cxn ang="0">
+                  <a:pos x="connsiteX0" y="connsiteY0"/>
+                </a:cxn>
+                <a:cxn ang="0">
+                  <a:pos x="connsiteX1" y="connsiteY1"/>
+                </a:cxn>
+                <a:cxn ang="0">
+                  <a:pos x="connsiteX2" y="connsiteY2"/>
+                </a:cxn>
+                <a:cxn ang="0">
+                  <a:pos x="connsiteX3" y="connsiteY3"/>
+                </a:cxn>
+                <a:cxn ang="0">
+                  <a:pos x="connsiteX4" y="connsiteY4"/>
+                </a:cxn>
+                <a:cxn ang="0">
+                  <a:pos x="connsiteX5" y="connsiteY5"/>
+                </a:cxn>
+              </a:cxnLst>
+              <a:rect l="l" t="t" r="r" b="b"/>
+              <a:pathLst>
+                <a:path w="1520825" h="882650">
+                  <a:moveTo>
+                    <a:pt x="0" y="882650"/>
+                  </a:moveTo>
+                  <a:cubicBezTo>
+                    <a:pt x="20373" y="754591"/>
+                    <a:pt x="40746" y="626533"/>
+                    <a:pt x="158750" y="612775"/>
+                  </a:cubicBezTo>
+                  <a:cubicBezTo>
+                    <a:pt x="276754" y="599017"/>
+                    <a:pt x="580496" y="813329"/>
+                    <a:pt x="708025" y="800100"/>
+                  </a:cubicBezTo>
+                  <a:cubicBezTo>
+                    <a:pt x="835554" y="786871"/>
+                    <a:pt x="818621" y="592137"/>
+                    <a:pt x="923925" y="533400"/>
+                  </a:cubicBezTo>
+                  <a:cubicBezTo>
+                    <a:pt x="1029229" y="474663"/>
+                    <a:pt x="1240367" y="536575"/>
+                    <a:pt x="1339850" y="447675"/>
+                  </a:cubicBezTo>
+                  <a:cubicBezTo>
+                    <a:pt x="1439333" y="358775"/>
+                    <a:pt x="1480079" y="179387"/>
+                    <a:pt x="1520825" y="0"/>
+                  </a:cubicBezTo>
+                </a:path>
+              </a:pathLst>
+            </a:custGeom>
+            <a:ln w="76200">
+              <a:solidFill>
+                <a:schemeClr val="accent3"/>
+              </a:solidFill>
+            </a:ln>
           </p:spPr>
           <p:style>
             <a:lnRef idx="1">
@@ -5465,10 +5586,10 @@
       </p:grpSp>
       <p:sp>
         <p:nvSpPr>
-          <p:cNvPr id="66" name="Freeform: Shape 65">
+          <p:cNvPr id="46" name="Oval 45">
             <a:extLst>
               <a:ext uri="{FF2B5EF4-FFF2-40B4-BE49-F238E27FC236}">
-                <a16:creationId xmlns:a16="http://schemas.microsoft.com/office/drawing/2014/main" id="{20B9A957-8F2B-4A52-AC7F-208A38BC69BE}"/>
+                <a16:creationId xmlns:a16="http://schemas.microsoft.com/office/drawing/2014/main" id="{C3A8AD2A-AFDA-4E14-B353-B0A7BFC0DEFB}"/>
               </a:ext>
             </a:extLst>
           </p:cNvPr>
@@ -5477,84 +5598,39 @@
         </p:nvSpPr>
         <p:spPr>
           <a:xfrm>
-            <a:off x="5670550" y="1631950"/>
-            <a:ext cx="1530350" cy="873125"/>
+            <a:off x="2095822" y="1586726"/>
+            <a:ext cx="779800" cy="373657"/>
           </a:xfrm>
-          <a:custGeom>
+          <a:prstGeom prst="ellipse">
             <a:avLst/>
-            <a:gdLst>
-              <a:gd name="connsiteX0" fmla="*/ 0 w 1530350"/>
-              <a:gd name="connsiteY0" fmla="*/ 873125 h 873125"/>
-              <a:gd name="connsiteX1" fmla="*/ 209550 w 1530350"/>
-              <a:gd name="connsiteY1" fmla="*/ 660400 h 873125"/>
-              <a:gd name="connsiteX2" fmla="*/ 809625 w 1530350"/>
-              <a:gd name="connsiteY2" fmla="*/ 412750 h 873125"/>
-              <a:gd name="connsiteX3" fmla="*/ 1365250 w 1530350"/>
-              <a:gd name="connsiteY3" fmla="*/ 361950 h 873125"/>
-              <a:gd name="connsiteX4" fmla="*/ 1530350 w 1530350"/>
-              <a:gd name="connsiteY4" fmla="*/ 0 h 873125"/>
-            </a:gdLst>
-            <a:ahLst/>
-            <a:cxnLst>
-              <a:cxn ang="0">
-                <a:pos x="connsiteX0" y="connsiteY0"/>
-              </a:cxn>
-              <a:cxn ang="0">
-                <a:pos x="connsiteX1" y="connsiteY1"/>
-              </a:cxn>
-              <a:cxn ang="0">
-                <a:pos x="connsiteX2" y="connsiteY2"/>
-              </a:cxn>
-              <a:cxn ang="0">
-                <a:pos x="connsiteX3" y="connsiteY3"/>
-              </a:cxn>
-              <a:cxn ang="0">
-                <a:pos x="connsiteX4" y="connsiteY4"/>
-              </a:cxn>
-            </a:cxnLst>
-            <a:rect l="l" t="t" r="r" b="b"/>
-            <a:pathLst>
-              <a:path w="1530350" h="873125">
-                <a:moveTo>
-                  <a:pt x="0" y="873125"/>
-                </a:moveTo>
-                <a:cubicBezTo>
-                  <a:pt x="37306" y="805127"/>
-                  <a:pt x="74613" y="737129"/>
-                  <a:pt x="209550" y="660400"/>
-                </a:cubicBezTo>
-                <a:cubicBezTo>
-                  <a:pt x="344487" y="583671"/>
-                  <a:pt x="617008" y="462492"/>
-                  <a:pt x="809625" y="412750"/>
-                </a:cubicBezTo>
-                <a:cubicBezTo>
-                  <a:pt x="1002242" y="363008"/>
-                  <a:pt x="1245129" y="430742"/>
-                  <a:pt x="1365250" y="361950"/>
-                </a:cubicBezTo>
-                <a:cubicBezTo>
-                  <a:pt x="1485371" y="293158"/>
-                  <a:pt x="1507860" y="146579"/>
-                  <a:pt x="1530350" y="0"/>
-                </a:cubicBezTo>
-              </a:path>
-            </a:pathLst>
-          </a:custGeom>
-          <a:ln w="76200"/>
+          </a:prstGeom>
+          <a:solidFill>
+            <a:srgbClr val="936CC0">
+              <a:alpha val="60000"/>
+            </a:srgbClr>
+          </a:solidFill>
+          <a:ln>
+            <a:solidFill>
+              <a:srgbClr val="7030A0">
+                <a:alpha val="60000"/>
+              </a:srgbClr>
+            </a:solidFill>
+          </a:ln>
         </p:spPr>
         <p:style>
-          <a:lnRef idx="1">
-            <a:schemeClr val="accent2"/>
+          <a:lnRef idx="2">
+            <a:schemeClr val="accent3">
+              <a:shade val="50000"/>
+            </a:schemeClr>
           </a:lnRef>
-          <a:fillRef idx="0">
-            <a:schemeClr val="accent2"/>
+          <a:fillRef idx="1">
+            <a:schemeClr val="accent3"/>
           </a:fillRef>
           <a:effectRef idx="0">
-            <a:schemeClr val="accent2"/>
+            <a:schemeClr val="accent3"/>
           </a:effectRef>
           <a:fontRef idx="minor">
-            <a:schemeClr val="tx1"/>
+            <a:schemeClr val="lt1"/>
           </a:fontRef>
         </p:style>
         <p:txBody>
@@ -5562,16 +5638,16 @@
           <a:lstStyle/>
           <a:p>
             <a:pPr algn="ctr"/>
-            <a:endParaRPr lang="en-GB"/>
-          </a:p>
-        </p:txBody>
-      </p:sp>
-      <p:sp>
-        <p:nvSpPr>
-          <p:cNvPr id="67" name="Freeform: Shape 66">
+            <a:endParaRPr lang="en-GB" dirty="0"/>
+          </a:p>
+        </p:txBody>
+      </p:sp>
+      <p:sp>
+        <p:nvSpPr>
+          <p:cNvPr id="47" name="Oval 46">
             <a:extLst>
               <a:ext uri="{FF2B5EF4-FFF2-40B4-BE49-F238E27FC236}">
-                <a16:creationId xmlns:a16="http://schemas.microsoft.com/office/drawing/2014/main" id="{ADDB7391-982E-418F-9459-8B70C38F0058}"/>
+                <a16:creationId xmlns:a16="http://schemas.microsoft.com/office/drawing/2014/main" id="{25F0ABF1-8C82-4B7D-999E-FD4AAB50F0FC}"/>
               </a:ext>
             </a:extLst>
           </p:cNvPr>
@@ -5579,95 +5655,40 @@
           <p:nvPr/>
         </p:nvSpPr>
         <p:spPr>
-          <a:xfrm>
-            <a:off x="5270500" y="952500"/>
-            <a:ext cx="1524870" cy="882650"/>
+          <a:xfrm rot="170055">
+            <a:off x="1989781" y="1374723"/>
+            <a:ext cx="870104" cy="286812"/>
           </a:xfrm>
-          <a:custGeom>
+          <a:prstGeom prst="ellipse">
             <a:avLst/>
-            <a:gdLst>
-              <a:gd name="connsiteX0" fmla="*/ 0 w 1524870"/>
-              <a:gd name="connsiteY0" fmla="*/ 882650 h 882650"/>
-              <a:gd name="connsiteX1" fmla="*/ 225425 w 1524870"/>
-              <a:gd name="connsiteY1" fmla="*/ 625475 h 882650"/>
-              <a:gd name="connsiteX2" fmla="*/ 654050 w 1524870"/>
-              <a:gd name="connsiteY2" fmla="*/ 666750 h 882650"/>
-              <a:gd name="connsiteX3" fmla="*/ 835025 w 1524870"/>
-              <a:gd name="connsiteY3" fmla="*/ 419100 h 882650"/>
-              <a:gd name="connsiteX4" fmla="*/ 1422400 w 1524870"/>
-              <a:gd name="connsiteY4" fmla="*/ 419100 h 882650"/>
-              <a:gd name="connsiteX5" fmla="*/ 1520825 w 1524870"/>
-              <a:gd name="connsiteY5" fmla="*/ 0 h 882650"/>
-            </a:gdLst>
-            <a:ahLst/>
-            <a:cxnLst>
-              <a:cxn ang="0">
-                <a:pos x="connsiteX0" y="connsiteY0"/>
-              </a:cxn>
-              <a:cxn ang="0">
-                <a:pos x="connsiteX1" y="connsiteY1"/>
-              </a:cxn>
-              <a:cxn ang="0">
-                <a:pos x="connsiteX2" y="connsiteY2"/>
-              </a:cxn>
-              <a:cxn ang="0">
-                <a:pos x="connsiteX3" y="connsiteY3"/>
-              </a:cxn>
-              <a:cxn ang="0">
-                <a:pos x="connsiteX4" y="connsiteY4"/>
-              </a:cxn>
-              <a:cxn ang="0">
-                <a:pos x="connsiteX5" y="connsiteY5"/>
-              </a:cxn>
-            </a:cxnLst>
-            <a:rect l="l" t="t" r="r" b="b"/>
-            <a:pathLst>
-              <a:path w="1524870" h="882650">
-                <a:moveTo>
-                  <a:pt x="0" y="882650"/>
-                </a:moveTo>
-                <a:cubicBezTo>
-                  <a:pt x="58208" y="772054"/>
-                  <a:pt x="116417" y="661458"/>
-                  <a:pt x="225425" y="625475"/>
-                </a:cubicBezTo>
-                <a:cubicBezTo>
-                  <a:pt x="334433" y="589492"/>
-                  <a:pt x="552450" y="701146"/>
-                  <a:pt x="654050" y="666750"/>
-                </a:cubicBezTo>
-                <a:cubicBezTo>
-                  <a:pt x="755650" y="632354"/>
-                  <a:pt x="706967" y="460375"/>
-                  <a:pt x="835025" y="419100"/>
-                </a:cubicBezTo>
-                <a:cubicBezTo>
-                  <a:pt x="963083" y="377825"/>
-                  <a:pt x="1308100" y="488950"/>
-                  <a:pt x="1422400" y="419100"/>
-                </a:cubicBezTo>
-                <a:cubicBezTo>
-                  <a:pt x="1536700" y="349250"/>
-                  <a:pt x="1528762" y="174625"/>
-                  <a:pt x="1520825" y="0"/>
-                </a:cubicBezTo>
-              </a:path>
-            </a:pathLst>
-          </a:custGeom>
-          <a:ln w="76200"/>
+          </a:prstGeom>
+          <a:solidFill>
+            <a:srgbClr val="936CC0">
+              <a:alpha val="60000"/>
+            </a:srgbClr>
+          </a:solidFill>
+          <a:ln>
+            <a:solidFill>
+              <a:srgbClr val="7030A0">
+                <a:alpha val="60000"/>
+              </a:srgbClr>
+            </a:solidFill>
+          </a:ln>
         </p:spPr>
         <p:style>
-          <a:lnRef idx="1">
-            <a:schemeClr val="accent2"/>
+          <a:lnRef idx="2">
+            <a:schemeClr val="accent3">
+              <a:shade val="50000"/>
+            </a:schemeClr>
           </a:lnRef>
-          <a:fillRef idx="0">
-            <a:schemeClr val="accent2"/>
+          <a:fillRef idx="1">
+            <a:schemeClr val="accent3"/>
           </a:fillRef>
           <a:effectRef idx="0">
-            <a:schemeClr val="accent2"/>
+            <a:schemeClr val="accent3"/>
           </a:effectRef>
           <a:fontRef idx="minor">
-            <a:schemeClr val="tx1"/>
+            <a:schemeClr val="lt1"/>
           </a:fontRef>
         </p:style>
         <p:txBody>
@@ -5675,120 +5696,7 @@
           <a:lstStyle/>
           <a:p>
             <a:pPr algn="ctr"/>
-            <a:endParaRPr lang="en-GB"/>
-          </a:p>
-        </p:txBody>
-      </p:sp>
-      <p:sp>
-        <p:nvSpPr>
-          <p:cNvPr id="68" name="Freeform: Shape 67">
-            <a:extLst>
-              <a:ext uri="{FF2B5EF4-FFF2-40B4-BE49-F238E27FC236}">
-                <a16:creationId xmlns:a16="http://schemas.microsoft.com/office/drawing/2014/main" id="{34A8E8A2-A0C2-4C6F-87C6-AC01D48A5666}"/>
-              </a:ext>
-            </a:extLst>
-          </p:cNvPr>
-          <p:cNvSpPr/>
-          <p:nvPr/>
-        </p:nvSpPr>
-        <p:spPr>
-          <a:xfrm>
-            <a:off x="4889500" y="269875"/>
-            <a:ext cx="1520825" cy="882650"/>
-          </a:xfrm>
-          <a:custGeom>
-            <a:avLst/>
-            <a:gdLst>
-              <a:gd name="connsiteX0" fmla="*/ 0 w 1520825"/>
-              <a:gd name="connsiteY0" fmla="*/ 882650 h 882650"/>
-              <a:gd name="connsiteX1" fmla="*/ 158750 w 1520825"/>
-              <a:gd name="connsiteY1" fmla="*/ 612775 h 882650"/>
-              <a:gd name="connsiteX2" fmla="*/ 708025 w 1520825"/>
-              <a:gd name="connsiteY2" fmla="*/ 800100 h 882650"/>
-              <a:gd name="connsiteX3" fmla="*/ 923925 w 1520825"/>
-              <a:gd name="connsiteY3" fmla="*/ 533400 h 882650"/>
-              <a:gd name="connsiteX4" fmla="*/ 1339850 w 1520825"/>
-              <a:gd name="connsiteY4" fmla="*/ 447675 h 882650"/>
-              <a:gd name="connsiteX5" fmla="*/ 1520825 w 1520825"/>
-              <a:gd name="connsiteY5" fmla="*/ 0 h 882650"/>
-            </a:gdLst>
-            <a:ahLst/>
-            <a:cxnLst>
-              <a:cxn ang="0">
-                <a:pos x="connsiteX0" y="connsiteY0"/>
-              </a:cxn>
-              <a:cxn ang="0">
-                <a:pos x="connsiteX1" y="connsiteY1"/>
-              </a:cxn>
-              <a:cxn ang="0">
-                <a:pos x="connsiteX2" y="connsiteY2"/>
-              </a:cxn>
-              <a:cxn ang="0">
-                <a:pos x="connsiteX3" y="connsiteY3"/>
-              </a:cxn>
-              <a:cxn ang="0">
-                <a:pos x="connsiteX4" y="connsiteY4"/>
-              </a:cxn>
-              <a:cxn ang="0">
-                <a:pos x="connsiteX5" y="connsiteY5"/>
-              </a:cxn>
-            </a:cxnLst>
-            <a:rect l="l" t="t" r="r" b="b"/>
-            <a:pathLst>
-              <a:path w="1520825" h="882650">
-                <a:moveTo>
-                  <a:pt x="0" y="882650"/>
-                </a:moveTo>
-                <a:cubicBezTo>
-                  <a:pt x="20373" y="754591"/>
-                  <a:pt x="40746" y="626533"/>
-                  <a:pt x="158750" y="612775"/>
-                </a:cubicBezTo>
-                <a:cubicBezTo>
-                  <a:pt x="276754" y="599017"/>
-                  <a:pt x="580496" y="813329"/>
-                  <a:pt x="708025" y="800100"/>
-                </a:cubicBezTo>
-                <a:cubicBezTo>
-                  <a:pt x="835554" y="786871"/>
-                  <a:pt x="818621" y="592137"/>
-                  <a:pt x="923925" y="533400"/>
-                </a:cubicBezTo>
-                <a:cubicBezTo>
-                  <a:pt x="1029229" y="474663"/>
-                  <a:pt x="1240367" y="536575"/>
-                  <a:pt x="1339850" y="447675"/>
-                </a:cubicBezTo>
-                <a:cubicBezTo>
-                  <a:pt x="1439333" y="358775"/>
-                  <a:pt x="1480079" y="179387"/>
-                  <a:pt x="1520825" y="0"/>
-                </a:cubicBezTo>
-              </a:path>
-            </a:pathLst>
-          </a:custGeom>
-          <a:ln w="76200"/>
-        </p:spPr>
-        <p:style>
-          <a:lnRef idx="1">
-            <a:schemeClr val="accent2"/>
-          </a:lnRef>
-          <a:fillRef idx="0">
-            <a:schemeClr val="accent2"/>
-          </a:fillRef>
-          <a:effectRef idx="0">
-            <a:schemeClr val="accent2"/>
-          </a:effectRef>
-          <a:fontRef idx="minor">
-            <a:schemeClr val="tx1"/>
-          </a:fontRef>
-        </p:style>
-        <p:txBody>
-          <a:bodyPr rtlCol="0" anchor="ctr"/>
-          <a:lstStyle/>
-          <a:p>
-            <a:pPr algn="ctr"/>
-            <a:endParaRPr lang="en-GB"/>
+            <a:endParaRPr lang="en-GB" dirty="0"/>
           </a:p>
         </p:txBody>
       </p:sp>
@@ -5846,7 +5754,7 @@
         <a:srgbClr val="954F72"/>
       </a:folHlink>
     </a:clrScheme>
-    <a:fontScheme name="Office">
+    <a:fontScheme name="Office Theme">
       <a:majorFont>
         <a:latin typeface="Calibri Light" panose="020F0302020204030204"/>
         <a:ea typeface=""/>
@@ -5881,23 +5789,6 @@
         <a:font script="Viet" typeface="Times New Roman"/>
         <a:font script="Uigh" typeface="Microsoft Uighur"/>
         <a:font script="Geor" typeface="Sylfaen"/>
-        <a:font script="Armn" typeface="Arial"/>
-        <a:font script="Bugi" typeface="Leelawadee UI"/>
-        <a:font script="Bopo" typeface="Microsoft JhengHei"/>
-        <a:font script="Java" typeface="Javanese Text"/>
-        <a:font script="Lisu" typeface="Segoe UI"/>
-        <a:font script="Mymr" typeface="Myanmar Text"/>
-        <a:font script="Nkoo" typeface="Ebrima"/>
-        <a:font script="Olck" typeface="Nirmala UI"/>
-        <a:font script="Osma" typeface="Ebrima"/>
-        <a:font script="Phag" typeface="Phagspa"/>
-        <a:font script="Syrn" typeface="Estrangelo Edessa"/>
-        <a:font script="Syrj" typeface="Estrangelo Edessa"/>
-        <a:font script="Syre" typeface="Estrangelo Edessa"/>
-        <a:font script="Sora" typeface="Nirmala UI"/>
-        <a:font script="Tale" typeface="Microsoft Tai Le"/>
-        <a:font script="Talu" typeface="Microsoft New Tai Lue"/>
-        <a:font script="Tfng" typeface="Ebrima"/>
       </a:majorFont>
       <a:minorFont>
         <a:latin typeface="Calibri" panose="020F0502020204030204"/>
@@ -5933,26 +5824,9 @@
         <a:font script="Viet" typeface="Arial"/>
         <a:font script="Uigh" typeface="Microsoft Uighur"/>
         <a:font script="Geor" typeface="Sylfaen"/>
-        <a:font script="Armn" typeface="Arial"/>
-        <a:font script="Bugi" typeface="Leelawadee UI"/>
-        <a:font script="Bopo" typeface="Microsoft JhengHei"/>
-        <a:font script="Java" typeface="Javanese Text"/>
-        <a:font script="Lisu" typeface="Segoe UI"/>
-        <a:font script="Mymr" typeface="Myanmar Text"/>
-        <a:font script="Nkoo" typeface="Ebrima"/>
-        <a:font script="Olck" typeface="Nirmala UI"/>
-        <a:font script="Osma" typeface="Ebrima"/>
-        <a:font script="Phag" typeface="Phagspa"/>
-        <a:font script="Syrn" typeface="Estrangelo Edessa"/>
-        <a:font script="Syrj" typeface="Estrangelo Edessa"/>
-        <a:font script="Syre" typeface="Estrangelo Edessa"/>
-        <a:font script="Sora" typeface="Nirmala UI"/>
-        <a:font script="Tale" typeface="Microsoft Tai Le"/>
-        <a:font script="Talu" typeface="Microsoft New Tai Lue"/>
-        <a:font script="Tfng" typeface="Ebrima"/>
       </a:minorFont>
     </a:fontScheme>
-    <a:fmtScheme name="Office">
+    <a:fmtScheme name="Office Theme">
       <a:fillStyleLst>
         <a:solidFill>
           <a:schemeClr val="phClr"/>

</xml_diff>